<commit_message>
Expand comprehensive demo to showcase all library features with detailed examples and documentation
- Add comprehensive documentation header explaining all demonstrated features
- Import all builder APIs: SlideLayout, Table/TableBuilder, Chart/ChartBuilder, ImageBuilder, TextFormat, Shape
- Organize demo into 7 parts with visual separators and progress logging
- Part 1: Demonstrate all 6 slide layouts (CenteredTitle, TitleOnly, TitleAndContent, TitleAndBigContent, TwoColumn, Blank)
- Part 2: Show
</commit_message>
<xml_diff>
--- a/comprehensive_demo.pptx
+++ b/comprehensive_demo.pptx
@@ -15,6 +15,10 @@
     <p:sldId id="264" r:id="rId10"/>
     <p:sldId id="265" r:id="rId11"/>
     <p:sldId id="266" r:id="rId12"/>
+    <p:sldId id="267" r:id="rId13"/>
+    <p:sldId id="268" r:id="rId14"/>
+    <p:sldId id="269" r:id="rId15"/>
+    <p:sldId id="270" r:id="rId16"/>
   </p:sldIdLst>
   <p:sldSz cx="9144000" cy="6858000" type="screen4x3"/>
   <p:notesSz cx="6858000" cy="9144000"/>
@@ -106,86 +110,31 @@
             <a:spLocks noGrp="1"/>
           </p:cNvSpPr>
           <p:nvPr>
-            <p:ph type="title"/>
-          </p:nvPr>
-        </p:nvSpPr>
-        <p:spPr>
-          <a:xfrm>
-            <a:off x="457200" y="274638"/>
-            <a:ext cx="8230200" cy="1143000"/>
-          </a:xfrm>
-          <a:prstGeom prst="rect">
-            <a:avLst/>
-          </a:prstGeom>
-          <a:noFill/>
-        </p:spPr>
-        <p:txBody>
-          <a:bodyPr/>
-          <a:lstStyle/>
-          <a:p>
-            <a:r>
-              <a:rPr lang="en-US" sz="4400" b="1" i="0"/>
-              <a:t>PPTX-RS Capabilities</a:t>
-            </a:r>
-          </a:p>
-        </p:txBody>
-      </p:sp>
-      <p:sp>
-        <p:nvSpPr>
-          <p:cNvPr id="3" name="Content"/>
-          <p:cNvSpPr>
-            <a:spLocks noGrp="1"/>
-          </p:cNvSpPr>
-          <p:nvPr>
-            <p:ph type="body" idx="1"/>
-          </p:nvPr>
-        </p:nvSpPr>
-        <p:spPr>
-          <a:xfrm>
-            <a:off x="457200" y="1600200"/>
-            <a:ext cx="8230200" cy="4572000"/>
-          </a:xfrm>
-          <a:prstGeom prst="rect">
-            <a:avLst/>
-          </a:prstGeom>
-          <a:noFill/>
-        </p:spPr>
-        <p:txBody>
-          <a:bodyPr/>
-          <a:lstStyle/>
-          <a:p>
-            <a:pPr lvl="0"/>
-            <a:r>
-              <a:rPr lang="en-US" sz="2800" b="0" i="0"/>
-              <a:t>Text formatting (bold, italic, underline, colors)</a:t>
-            </a:r>
-          </a:p>
-          <a:p>
-            <a:pPr lvl="0"/>
-            <a:r>
-              <a:rPr lang="en-US" sz="2800" b="0" i="0"/>
-              <a:t>Tables with custom styling</a:t>
-            </a:r>
-          </a:p>
-          <a:p>
-            <a:pPr lvl="0"/>
-            <a:r>
-              <a:rPr lang="en-US" sz="2800" b="0" i="0"/>
-              <a:t>Images with positioning</a:t>
-            </a:r>
-          </a:p>
-          <a:p>
-            <a:pPr lvl="0"/>
-            <a:r>
-              <a:rPr lang="en-US" sz="2800" b="0" i="0"/>
-              <a:t>Charts (bar, line, pie)</a:t>
-            </a:r>
-          </a:p>
-          <a:p>
-            <a:pPr lvl="0"/>
-            <a:r>
-              <a:rPr lang="en-US" sz="2800" b="0" i="0"/>
-              <a:t>Reading and inspecting PPTX files</a:t>
+            <p:ph type="ctrTitle"/>
+          </p:nvPr>
+        </p:nvSpPr>
+        <p:spPr>
+          <a:xfrm>
+            <a:off x="457200" y="2743200"/>
+            <a:ext cx="8230200" cy="1371600"/>
+          </a:xfrm>
+          <a:prstGeom prst="rect">
+            <a:avLst/>
+          </a:prstGeom>
+          <a:noFill/>
+        </p:spPr>
+        <p:txBody>
+          <a:bodyPr/>
+          <a:lstStyle/>
+          <a:p>
+            <a:pPr algn="ctr"/>
+            <a:r>
+              <a:rPr lang="en-US" sz="5400" b="1" i="0">
+                <a:solidFill>
+                  <a:srgbClr val="1F497D"/>
+                </a:solidFill>
+              </a:rPr>
+              <a:t>PPTX-RS Library Demo</a:t>
             </a:r>
           </a:p>
         </p:txBody>
@@ -246,7 +195,7 @@
           <a:p>
             <a:r>
               <a:rPr lang="en-US" sz="4400" b="1" i="0"/>
-              <a:t>Summary &amp; Next Steps</a:t>
+              <a:t>Line Chart: Revenue Trend</a:t>
             </a:r>
           </a:p>
         </p:txBody>
@@ -278,35 +227,502 @@
             <a:pPr lvl="0"/>
             <a:r>
               <a:rPr lang="en-US" sz="2800" b="0" i="0"/>
-              <a:t>✓ Comprehensive PPTX generation</a:t>
-            </a:r>
-          </a:p>
-          <a:p>
-            <a:pPr lvl="0"/>
-            <a:r>
-              <a:rPr lang="en-US" sz="2800" b="0" i="0"/>
-              <a:t>✓ Advanced content support</a:t>
-            </a:r>
-          </a:p>
-          <a:p>
-            <a:pPr lvl="0"/>
-            <a:r>
-              <a:rPr lang="en-US" sz="2800" b="0" i="0"/>
-              <a:t>✓ Reading capabilities</a:t>
-            </a:r>
-          </a:p>
-          <a:p>
-            <a:pPr lvl="0"/>
-            <a:r>
-              <a:rPr lang="en-US" sz="2800" b="0" i="0"/>
-              <a:t>→ XML parsing (in progress)</a:t>
-            </a:r>
-          </a:p>
-          <a:p>
-            <a:pPr lvl="0"/>
-            <a:r>
-              <a:rPr lang="en-US" sz="2800" b="0" i="0"/>
-              <a:t>→ Slide modification (planned)</a:t>
+              <a:t>6-month upward trend</a:t>
+            </a:r>
+          </a:p>
+          <a:p>
+            <a:pPr lvl="0"/>
+            <a:r>
+              <a:rPr lang="en-US" sz="2800" b="0" i="0"/>
+              <a:t>Exceeded targets in May-Jun</a:t>
+            </a:r>
+          </a:p>
+          <a:p>
+            <a:pPr lvl="0"/>
+            <a:r>
+              <a:rPr lang="en-US" sz="2800" b="0" i="0"/>
+              <a:t>40% growth Jan to Jun</a:t>
+            </a:r>
+          </a:p>
+        </p:txBody>
+      </p:sp>
+    </p:spTree>
+  </p:cSld>
+  <p:clrMapOvr>
+    <a:masterClrMapping/>
+  </p:clrMapOvr>
+</p:sld>
+</file>
+
+<file path=ppt/slides/slide11.xml><?xml version="1.0" encoding="utf-8"?>
+<p:sld xmlns:a="http://schemas.openxmlformats.org/drawingml/2006/main" xmlns:r="http://schemas.openxmlformats.org/officeDocument/2006/relationships" xmlns:p="http://schemas.openxmlformats.org/presentationml/2006/main">
+  <p:cSld>
+    <p:bg>
+      <p:bgRef idx="1001">
+        <a:schemeClr val="bg1"/>
+      </p:bgRef>
+    </p:bg>
+    <p:spTree>
+      <p:nvGrpSpPr>
+        <p:cNvPr id="1" name=""/>
+        <p:cNvGrpSpPr/>
+        <p:nvPr/>
+      </p:nvGrpSpPr>
+      <p:grpSpPr>
+        <a:xfrm>
+          <a:off x="0" y="0"/>
+          <a:ext cx="9144000" cy="6858000"/>
+          <a:chOff x="0" y="0"/>
+          <a:chExt cx="9144000" cy="6858000"/>
+        </a:xfrm>
+      </p:grpSpPr>
+      <p:sp>
+        <p:nvSpPr>
+          <p:cNvPr id="2" name="Title"/>
+          <p:cNvSpPr>
+            <a:spLocks noGrp="1"/>
+          </p:cNvSpPr>
+          <p:nvPr>
+            <p:ph type="title"/>
+          </p:nvPr>
+        </p:nvSpPr>
+        <p:spPr>
+          <a:xfrm>
+            <a:off x="457200" y="274638"/>
+            <a:ext cx="8230200" cy="1143000"/>
+          </a:xfrm>
+          <a:prstGeom prst="rect">
+            <a:avLst/>
+          </a:prstGeom>
+          <a:noFill/>
+        </p:spPr>
+        <p:txBody>
+          <a:bodyPr/>
+          <a:lstStyle/>
+          <a:p>
+            <a:r>
+              <a:rPr lang="en-US" sz="4400" b="1" i="0"/>
+              <a:t>Pie Chart: Market Share</a:t>
+            </a:r>
+          </a:p>
+        </p:txBody>
+      </p:sp>
+      <p:sp>
+        <p:nvSpPr>
+          <p:cNvPr id="3" name="Content"/>
+          <p:cNvSpPr>
+            <a:spLocks noGrp="1"/>
+          </p:cNvSpPr>
+          <p:nvPr>
+            <p:ph type="body" idx="1"/>
+          </p:nvPr>
+        </p:nvSpPr>
+        <p:spPr>
+          <a:xfrm>
+            <a:off x="457200" y="1600200"/>
+            <a:ext cx="8230200" cy="4572000"/>
+          </a:xfrm>
+          <a:prstGeom prst="rect">
+            <a:avLst/>
+          </a:prstGeom>
+          <a:noFill/>
+        </p:spPr>
+        <p:txBody>
+          <a:bodyPr/>
+          <a:lstStyle/>
+          <a:p>
+            <a:pPr lvl="0"/>
+            <a:r>
+              <a:rPr lang="en-US" sz="2800" b="0" i="0"/>
+              <a:t>Product A leads with 35%</a:t>
+            </a:r>
+          </a:p>
+          <a:p>
+            <a:pPr lvl="0"/>
+            <a:r>
+              <a:rPr lang="en-US" sz="2800" b="0" i="0"/>
+              <a:t>Products B &amp; C tied at 25%</a:t>
+            </a:r>
+          </a:p>
+          <a:p>
+            <a:pPr lvl="0"/>
+            <a:r>
+              <a:rPr lang="en-US" sz="2800" b="0" i="0"/>
+              <a:t>Product D: Growth opportunity</a:t>
+            </a:r>
+          </a:p>
+        </p:txBody>
+      </p:sp>
+    </p:spTree>
+  </p:cSld>
+  <p:clrMapOvr>
+    <a:masterClrMapping/>
+  </p:clrMapOvr>
+</p:sld>
+</file>
+
+<file path=ppt/slides/slide12.xml><?xml version="1.0" encoding="utf-8"?>
+<p:sld xmlns:a="http://schemas.openxmlformats.org/drawingml/2006/main" xmlns:r="http://schemas.openxmlformats.org/officeDocument/2006/relationships" xmlns:p="http://schemas.openxmlformats.org/presentationml/2006/main">
+  <p:cSld>
+    <p:bg>
+      <p:bgRef idx="1001">
+        <a:schemeClr val="bg1"/>
+      </p:bgRef>
+    </p:bg>
+    <p:spTree>
+      <p:nvGrpSpPr>
+        <p:cNvPr id="1" name=""/>
+        <p:cNvGrpSpPr/>
+        <p:nvPr/>
+      </p:nvGrpSpPr>
+      <p:grpSpPr>
+        <a:xfrm>
+          <a:off x="0" y="0"/>
+          <a:ext cx="9144000" cy="6858000"/>
+          <a:chOff x="0" y="0"/>
+          <a:chExt cx="9144000" cy="6858000"/>
+        </a:xfrm>
+      </p:grpSpPr>
+      <p:sp>
+        <p:nvSpPr>
+          <p:cNvPr id="2" name="Title"/>
+          <p:cNvSpPr>
+            <a:spLocks noGrp="1"/>
+          </p:cNvSpPr>
+          <p:nvPr>
+            <p:ph type="title"/>
+          </p:nvPr>
+        </p:nvSpPr>
+        <p:spPr>
+          <a:xfrm>
+            <a:off x="457200" y="274638"/>
+            <a:ext cx="8230200" cy="1143000"/>
+          </a:xfrm>
+          <a:prstGeom prst="rect">
+            <a:avLst/>
+          </a:prstGeom>
+          <a:noFill/>
+        </p:spPr>
+        <p:txBody>
+          <a:bodyPr/>
+          <a:lstStyle/>
+          <a:p>
+            <a:r>
+              <a:rPr lang="en-US" sz="4400" b="1" i="0"/>
+              <a:t>Image Support</a:t>
+            </a:r>
+          </a:p>
+        </p:txBody>
+      </p:sp>
+      <p:sp>
+        <p:nvSpPr>
+          <p:cNvPr id="3" name="Content"/>
+          <p:cNvSpPr>
+            <a:spLocks noGrp="1"/>
+          </p:cNvSpPr>
+          <p:nvPr>
+            <p:ph type="body" idx="1"/>
+          </p:nvPr>
+        </p:nvSpPr>
+        <p:spPr>
+          <a:xfrm>
+            <a:off x="457200" y="1600200"/>
+            <a:ext cx="8230200" cy="4572000"/>
+          </a:xfrm>
+          <a:prstGeom prst="rect">
+            <a:avLst/>
+          </a:prstGeom>
+          <a:noFill/>
+        </p:spPr>
+        <p:txBody>
+          <a:bodyPr/>
+          <a:lstStyle/>
+          <a:p>
+            <a:pPr lvl="0"/>
+            <a:r>
+              <a:rPr lang="en-US" sz="2800" b="0" i="0"/>
+              <a:t>PNG, JPG, GIF, BMP, TIFF formats</a:t>
+            </a:r>
+          </a:p>
+          <a:p>
+            <a:pPr lvl="0"/>
+            <a:r>
+              <a:rPr lang="en-US" sz="2800" b="0" i="0"/>
+              <a:t>Custom positioning (x, y)</a:t>
+            </a:r>
+          </a:p>
+          <a:p>
+            <a:pPr lvl="0"/>
+            <a:r>
+              <a:rPr lang="en-US" sz="2800" b="0" i="0"/>
+              <a:t>Flexible sizing (width, height)</a:t>
+            </a:r>
+          </a:p>
+          <a:p>
+            <a:pPr lvl="0"/>
+            <a:r>
+              <a:rPr lang="en-US" sz="2800" b="0" i="0"/>
+              <a:t>Scale to width/height</a:t>
+            </a:r>
+          </a:p>
+          <a:p>
+            <a:pPr lvl="0"/>
+            <a:r>
+              <a:rPr lang="en-US" sz="2800" b="0" i="0"/>
+              <a:t>Aspect ratio preservation</a:t>
+            </a:r>
+          </a:p>
+        </p:txBody>
+      </p:sp>
+    </p:spTree>
+  </p:cSld>
+  <p:clrMapOvr>
+    <a:masterClrMapping/>
+  </p:clrMapOvr>
+</p:sld>
+</file>
+
+<file path=ppt/slides/slide13.xml><?xml version="1.0" encoding="utf-8"?>
+<p:sld xmlns:a="http://schemas.openxmlformats.org/drawingml/2006/main" xmlns:r="http://schemas.openxmlformats.org/officeDocument/2006/relationships" xmlns:p="http://schemas.openxmlformats.org/presentationml/2006/main">
+  <p:cSld>
+    <p:bg>
+      <p:bgRef idx="1001">
+        <a:schemeClr val="bg1"/>
+      </p:bgRef>
+    </p:bg>
+    <p:spTree>
+      <p:nvGrpSpPr>
+        <p:cNvPr id="1" name=""/>
+        <p:cNvGrpSpPr/>
+        <p:nvPr/>
+      </p:nvGrpSpPr>
+      <p:grpSpPr>
+        <a:xfrm>
+          <a:off x="0" y="0"/>
+          <a:ext cx="9144000" cy="6858000"/>
+          <a:chOff x="0" y="0"/>
+          <a:chExt cx="9144000" cy="6858000"/>
+        </a:xfrm>
+      </p:grpSpPr>
+      <p:sp>
+        <p:nvSpPr>
+          <p:cNvPr id="2" name="Title"/>
+          <p:cNvSpPr>
+            <a:spLocks noGrp="1"/>
+          </p:cNvSpPr>
+          <p:nvPr>
+            <p:ph type="title"/>
+          </p:nvPr>
+        </p:nvSpPr>
+        <p:spPr>
+          <a:xfrm>
+            <a:off x="457200" y="274638"/>
+            <a:ext cx="8230200" cy="1143000"/>
+          </a:xfrm>
+          <a:prstGeom prst="rect">
+            <a:avLst/>
+          </a:prstGeom>
+          <a:noFill/>
+        </p:spPr>
+        <p:txBody>
+          <a:bodyPr/>
+          <a:lstStyle/>
+          <a:p>
+            <a:r>
+              <a:rPr lang="en-US" sz="4400" b="1" i="0"/>
+              <a:t>Shape Support</a:t>
+            </a:r>
+          </a:p>
+        </p:txBody>
+      </p:sp>
+      <p:sp>
+        <p:nvSpPr>
+          <p:cNvPr id="3" name="Content"/>
+          <p:cNvSpPr>
+            <a:spLocks noGrp="1"/>
+          </p:cNvSpPr>
+          <p:nvPr>
+            <p:ph type="body" idx="1"/>
+          </p:nvPr>
+        </p:nvSpPr>
+        <p:spPr>
+          <a:xfrm>
+            <a:off x="457200" y="1600200"/>
+            <a:ext cx="8230200" cy="4572000"/>
+          </a:xfrm>
+          <a:prstGeom prst="rect">
+            <a:avLst/>
+          </a:prstGeom>
+          <a:noFill/>
+        </p:spPr>
+        <p:txBody>
+          <a:bodyPr/>
+          <a:lstStyle/>
+          <a:p>
+            <a:pPr lvl="0"/>
+            <a:r>
+              <a:rPr lang="en-US" sz="2800" b="0" i="0"/>
+              <a:t>Rectangle, Circle, Triangle</a:t>
+            </a:r>
+          </a:p>
+          <a:p>
+            <a:pPr lvl="0"/>
+            <a:r>
+              <a:rPr lang="en-US" sz="2800" b="0" i="0"/>
+              <a:t>Diamond, Arrow, Star, Hexagon</a:t>
+            </a:r>
+          </a:p>
+          <a:p>
+            <a:pPr lvl="0"/>
+            <a:r>
+              <a:rPr lang="en-US" sz="2800" b="0" i="0"/>
+              <a:t>Solid color fills with transparency</a:t>
+            </a:r>
+          </a:p>
+          <a:p>
+            <a:pPr lvl="0"/>
+            <a:r>
+              <a:rPr lang="en-US" sz="2800" b="0" i="0"/>
+              <a:t>Border/line styling</a:t>
+            </a:r>
+          </a:p>
+          <a:p>
+            <a:pPr lvl="0"/>
+            <a:r>
+              <a:rPr lang="en-US" sz="2800" b="0" i="0"/>
+              <a:t>Text inside shapes</a:t>
+            </a:r>
+          </a:p>
+        </p:txBody>
+      </p:sp>
+    </p:spTree>
+  </p:cSld>
+  <p:clrMapOvr>
+    <a:masterClrMapping/>
+  </p:clrMapOvr>
+</p:sld>
+</file>
+
+<file path=ppt/slides/slide14.xml><?xml version="1.0" encoding="utf-8"?>
+<p:sld xmlns:a="http://schemas.openxmlformats.org/drawingml/2006/main" xmlns:r="http://schemas.openxmlformats.org/officeDocument/2006/relationships" xmlns:p="http://schemas.openxmlformats.org/presentationml/2006/main">
+  <p:cSld>
+    <p:bg>
+      <p:bgRef idx="1001">
+        <a:schemeClr val="bg1"/>
+      </p:bgRef>
+    </p:bg>
+    <p:spTree>
+      <p:nvGrpSpPr>
+        <p:cNvPr id="1" name=""/>
+        <p:cNvGrpSpPr/>
+        <p:nvPr/>
+      </p:nvGrpSpPr>
+      <p:grpSpPr>
+        <a:xfrm>
+          <a:off x="0" y="0"/>
+          <a:ext cx="9144000" cy="6858000"/>
+          <a:chOff x="0" y="0"/>
+          <a:chExt cx="9144000" cy="6858000"/>
+        </a:xfrm>
+      </p:grpSpPr>
+      <p:sp>
+        <p:nvSpPr>
+          <p:cNvPr id="2" name="Title"/>
+          <p:cNvSpPr>
+            <a:spLocks noGrp="1"/>
+          </p:cNvSpPr>
+          <p:nvPr>
+            <p:ph type="title"/>
+          </p:nvPr>
+        </p:nvSpPr>
+        <p:spPr>
+          <a:xfrm>
+            <a:off x="457200" y="274638"/>
+            <a:ext cx="8230200" cy="914400"/>
+          </a:xfrm>
+          <a:prstGeom prst="rect">
+            <a:avLst/>
+          </a:prstGeom>
+          <a:noFill/>
+        </p:spPr>
+        <p:txBody>
+          <a:bodyPr/>
+          <a:lstStyle/>
+          <a:p>
+            <a:r>
+              <a:rPr lang="en-US" sz="4400" b="1" i="0">
+                <a:solidFill>
+                  <a:srgbClr val="1F497D"/>
+                </a:solidFill>
+              </a:rPr>
+              <a:t>Summary</a:t>
+            </a:r>
+          </a:p>
+        </p:txBody>
+      </p:sp>
+      <p:sp>
+        <p:nvSpPr>
+          <p:cNvPr id="3" name="Content"/>
+          <p:cNvSpPr>
+            <a:spLocks noGrp="1"/>
+          </p:cNvSpPr>
+          <p:nvPr>
+            <p:ph type="body" idx="1"/>
+          </p:nvPr>
+        </p:nvSpPr>
+        <p:spPr>
+          <a:xfrm>
+            <a:off x="457200" y="1189200"/>
+            <a:ext cx="8230200" cy="5668800"/>
+          </a:xfrm>
+          <a:prstGeom prst="rect">
+            <a:avLst/>
+          </a:prstGeom>
+          <a:noFill/>
+        </p:spPr>
+        <p:txBody>
+          <a:bodyPr/>
+          <a:lstStyle/>
+          <a:p>
+            <a:pPr lvl="0"/>
+            <a:r>
+              <a:rPr lang="en-US" sz="2800" b="1" i="0"/>
+              <a:t>✓ 6 Slide Layouts</a:t>
+            </a:r>
+          </a:p>
+          <a:p>
+            <a:pPr lvl="0"/>
+            <a:r>
+              <a:rPr lang="en-US" sz="2800" b="1" i="0"/>
+              <a:t>✓ Rich Text Formatting</a:t>
+            </a:r>
+          </a:p>
+          <a:p>
+            <a:pPr lvl="0"/>
+            <a:r>
+              <a:rPr lang="en-US" sz="2800" b="1" i="0"/>
+              <a:t>✓ Tables with Styling</a:t>
+            </a:r>
+          </a:p>
+          <a:p>
+            <a:pPr lvl="0"/>
+            <a:r>
+              <a:rPr lang="en-US" sz="2800" b="1" i="0"/>
+              <a:t>✓ Charts (Bar, Line, Pie)</a:t>
+            </a:r>
+          </a:p>
+          <a:p>
+            <a:pPr lvl="0"/>
+            <a:r>
+              <a:rPr lang="en-US" sz="2800" b="1" i="0"/>
+              <a:t>✓ Image Embedding</a:t>
+            </a:r>
+          </a:p>
+          <a:p>
+            <a:pPr lvl="0"/>
+            <a:r>
+              <a:rPr lang="en-US" sz="2800" b="1" i="0"/>
+              <a:t>✓ Shape Drawing</a:t>
             </a:r>
           </a:p>
         </p:txBody>
@@ -368,70 +784,10 @@
             <a:r>
               <a:rPr lang="en-US" sz="4400" b="1" i="0">
                 <a:solidFill>
-                  <a:srgbClr val="1F497D"/>
+                  <a:srgbClr val="C0504D"/>
                 </a:solidFill>
               </a:rPr>
-              <a:t>Text Formatting Features</a:t>
-            </a:r>
-          </a:p>
-        </p:txBody>
-      </p:sp>
-      <p:sp>
-        <p:nvSpPr>
-          <p:cNvPr id="3" name="Content"/>
-          <p:cNvSpPr>
-            <a:spLocks noGrp="1"/>
-          </p:cNvSpPr>
-          <p:nvPr>
-            <p:ph type="body" idx="1"/>
-          </p:nvPr>
-        </p:nvSpPr>
-        <p:spPr>
-          <a:xfrm>
-            <a:off x="457200" y="1600200"/>
-            <a:ext cx="8230200" cy="4572000"/>
-          </a:xfrm>
-          <a:prstGeom prst="rect">
-            <a:avLst/>
-          </a:prstGeom>
-          <a:noFill/>
-        </p:spPr>
-        <p:txBody>
-          <a:bodyPr/>
-          <a:lstStyle/>
-          <a:p>
-            <a:pPr lvl="0"/>
-            <a:r>
-              <a:rPr lang="en-US" sz="2800" b="0" i="0"/>
-              <a:t>Bold text support</a:t>
-            </a:r>
-          </a:p>
-          <a:p>
-            <a:pPr lvl="0"/>
-            <a:r>
-              <a:rPr lang="en-US" sz="2800" b="0" i="0"/>
-              <a:t>Italic text support</a:t>
-            </a:r>
-          </a:p>
-          <a:p>
-            <a:pPr lvl="0"/>
-            <a:r>
-              <a:rPr lang="en-US" sz="2800" b="0" i="0"/>
-              <a:t>Underline support</a:t>
-            </a:r>
-          </a:p>
-          <a:p>
-            <a:pPr lvl="0"/>
-            <a:r>
-              <a:rPr lang="en-US" sz="2800" b="0" i="0"/>
-              <a:t>Custom colors (RGB hex)</a:t>
-            </a:r>
-          </a:p>
-          <a:p>
-            <a:pPr lvl="0"/>
-            <a:r>
-              <a:rPr lang="en-US" sz="2800" b="0" i="0"/>
-              <a:t>Font size customization</a:t>
+              <a:t>Section: Slide Layouts</a:t>
             </a:r>
           </a:p>
         </p:txBody>
@@ -492,7 +848,7 @@
           <a:p>
             <a:r>
               <a:rPr lang="en-US" sz="4400" b="1" i="0"/>
-              <a:t>Table Support: Quarterly Sales</a:t>
+              <a:t>Available Layouts</a:t>
             </a:r>
           </a:p>
         </p:txBody>
@@ -524,35 +880,42 @@
             <a:pPr lvl="0"/>
             <a:r>
               <a:rPr lang="en-US" sz="2800" b="0" i="0"/>
-              <a:t>Create tables with custom cells</a:t>
-            </a:r>
-          </a:p>
-          <a:p>
-            <a:pPr lvl="0"/>
-            <a:r>
-              <a:rPr lang="en-US" sz="2800" b="0" i="0"/>
-              <a:t>Cell formatting: bold, background colors</a:t>
-            </a:r>
-          </a:p>
-          <a:p>
-            <a:pPr lvl="0"/>
-            <a:r>
-              <a:rPr lang="en-US" sz="2800" b="0" i="0"/>
-              <a:t>Row height customization</a:t>
-            </a:r>
-          </a:p>
-          <a:p>
-            <a:pPr lvl="0"/>
-            <a:r>
-              <a:rPr lang="en-US" sz="2800" b="0" i="0"/>
-              <a:t>Column width management</a:t>
-            </a:r>
-          </a:p>
-          <a:p>
-            <a:pPr lvl="0"/>
-            <a:r>
-              <a:rPr lang="en-US" sz="2800" b="0" i="0"/>
-              <a:t>Q1: $100K | Q2: $150K | Q3: $180K | Q4: $220K</a:t>
+              <a:t>CenteredTitle - Cover slides</a:t>
+            </a:r>
+          </a:p>
+          <a:p>
+            <a:pPr lvl="0"/>
+            <a:r>
+              <a:rPr lang="en-US" sz="2800" b="0" i="0"/>
+              <a:t>TitleOnly - Section headers</a:t>
+            </a:r>
+          </a:p>
+          <a:p>
+            <a:pPr lvl="0"/>
+            <a:r>
+              <a:rPr lang="en-US" sz="2800" b="0" i="0"/>
+              <a:t>TitleAndContent - Standard slides</a:t>
+            </a:r>
+          </a:p>
+          <a:p>
+            <a:pPr lvl="0"/>
+            <a:r>
+              <a:rPr lang="en-US" sz="2800" b="0" i="0"/>
+              <a:t>TitleAndBigContent - More content space</a:t>
+            </a:r>
+          </a:p>
+          <a:p>
+            <a:pPr lvl="0"/>
+            <a:r>
+              <a:rPr lang="en-US" sz="2800" b="0" i="0"/>
+              <a:t>TwoColumn - Side-by-side comparison</a:t>
+            </a:r>
+          </a:p>
+          <a:p>
+            <a:pPr lvl="0"/>
+            <a:r>
+              <a:rPr lang="en-US" sz="2800" b="0" i="0"/>
+              <a:t>Blank - Custom content</a:t>
             </a:r>
           </a:p>
         </p:txBody>
@@ -600,7 +963,7 @@
         <p:spPr>
           <a:xfrm>
             <a:off x="457200" y="274638"/>
-            <a:ext cx="8230200" cy="1143000"/>
+            <a:ext cx="8230200" cy="914400"/>
           </a:xfrm>
           <a:prstGeom prst="rect">
             <a:avLst/>
@@ -613,14 +976,14 @@
           <a:p>
             <a:r>
               <a:rPr lang="en-US" sz="4400" b="1" i="0"/>
-              <a:t>Image Embedding</a:t>
-            </a:r>
-          </a:p>
-        </p:txBody>
-      </p:sp>
-      <p:sp>
-        <p:nvSpPr>
-          <p:cNvPr id="3" name="Content"/>
+              <a:t>Comparison View</a:t>
+            </a:r>
+          </a:p>
+        </p:txBody>
+      </p:sp>
+      <p:sp>
+        <p:nvSpPr>
+          <p:cNvPr id="3" name="Left Content"/>
           <p:cNvSpPr>
             <a:spLocks noGrp="1"/>
           </p:cNvSpPr>
@@ -630,50 +993,82 @@
         </p:nvSpPr>
         <p:spPr>
           <a:xfrm>
-            <a:off x="457200" y="1600200"/>
-            <a:ext cx="8230200" cy="4572000"/>
-          </a:xfrm>
-          <a:prstGeom prst="rect">
-            <a:avLst/>
-          </a:prstGeom>
-          <a:noFill/>
-        </p:spPr>
-        <p:txBody>
-          <a:bodyPr/>
-          <a:lstStyle/>
-          <a:p>
-            <a:pPr lvl="0"/>
-            <a:r>
-              <a:rPr lang="en-US" sz="2800" b="0" i="0"/>
-              <a:t>Support for PNG, JPG, GIF formats</a:t>
-            </a:r>
-          </a:p>
-          <a:p>
-            <a:pPr lvl="0"/>
-            <a:r>
-              <a:rPr lang="en-US" sz="2800" b="0" i="0"/>
-              <a:t>Custom positioning and sizing</a:t>
-            </a:r>
-          </a:p>
-          <a:p>
-            <a:pPr lvl="0"/>
-            <a:r>
-              <a:rPr lang="en-US" sz="2800" b="0" i="0"/>
-              <a:t>Aspect ratio preservation</a:t>
-            </a:r>
-          </a:p>
-          <a:p>
-            <a:pPr lvl="0"/>
-            <a:r>
-              <a:rPr lang="en-US" sz="2800" b="0" i="0"/>
-              <a:t>Automatic format detection</a:t>
-            </a:r>
-          </a:p>
-          <a:p>
-            <a:pPr lvl="0"/>
-            <a:r>
-              <a:rPr lang="en-US" sz="2800" b="0" i="0"/>
-              <a:t>Proper ZIP package integration</a:t>
+            <a:off x="457200" y="1189200"/>
+            <a:ext cx="4115100" cy="5668800"/>
+          </a:xfrm>
+          <a:prstGeom prst="rect">
+            <a:avLst/>
+          </a:prstGeom>
+          <a:noFill/>
+        </p:spPr>
+        <p:txBody>
+          <a:bodyPr/>
+          <a:lstStyle/>
+          <a:p>
+            <a:pPr lvl="0"/>
+            <a:r>
+              <a:rPr lang="en-US" sz="2800" b="0" i="0"/>
+              <a:t>Left: Feature A</a:t>
+            </a:r>
+          </a:p>
+          <a:p>
+            <a:pPr lvl="0"/>
+            <a:r>
+              <a:rPr lang="en-US" sz="2800" b="0" i="0"/>
+              <a:t>Left: Feature B</a:t>
+            </a:r>
+          </a:p>
+          <a:p>
+            <a:pPr lvl="0"/>
+            <a:r>
+              <a:rPr lang="en-US" sz="2800" b="0" i="0"/>
+              <a:t>Left: Feature C</a:t>
+            </a:r>
+          </a:p>
+        </p:txBody>
+      </p:sp>
+      <p:sp>
+        <p:nvSpPr>
+          <p:cNvPr id="4" name="Right Content"/>
+          <p:cNvSpPr>
+            <a:spLocks noGrp="1"/>
+          </p:cNvSpPr>
+          <p:nvPr>
+            <p:ph type="body" idx="2"/>
+          </p:nvPr>
+        </p:nvSpPr>
+        <p:spPr>
+          <a:xfrm>
+            <a:off x="4572300" y="1189200"/>
+            <a:ext cx="4115100" cy="5668800"/>
+          </a:xfrm>
+          <a:prstGeom prst="rect">
+            <a:avLst/>
+          </a:prstGeom>
+          <a:noFill/>
+        </p:spPr>
+        <p:txBody>
+          <a:bodyPr/>
+          <a:lstStyle/>
+          <a:p>
+            <a:pPr lvl="0"/>
+            <a:r>
+              <a:rPr lang="en-US" sz="2800" b="0" i="0"/>
+              <a:t>Right: Benefit A</a:t>
+            </a:r>
+          </a:p>
+          <a:p>
+            <a:pPr lvl="0"/>
+            <a:r>
+              <a:rPr lang="en-US" sz="2800" b="0" i="0"/>
+              <a:t>Right: Benefit B</a:t>
+            </a:r>
+          </a:p>
+          <a:p>
+            <a:pPr lvl="0"/>
+            <a:r>
+              <a:rPr lang="en-US" sz="2800" b="0" i="0"/>
+              <a:t>Right: Benefit C</a:t>
             </a:r>
           </a:p>
         </p:txBody>
@@ -733,8 +1128,12 @@
           <a:lstStyle/>
           <a:p>
             <a:r>
-              <a:rPr lang="en-US" sz="4400" b="1" i="0"/>
-              <a:t>Bar Charts: Regional Sales</a:t>
+              <a:rPr lang="en-US" sz="4400" b="1" i="0">
+                <a:solidFill>
+                  <a:srgbClr val="4F81BD"/>
+                </a:solidFill>
+              </a:rPr>
+              <a:t>Text Formatting Demo</a:t>
             </a:r>
           </a:p>
         </p:txBody>
@@ -765,36 +1164,45 @@
           <a:p>
             <a:pPr lvl="0"/>
             <a:r>
-              <a:rPr lang="en-US" sz="2800" b="0" i="0"/>
-              <a:t>Q1: North=$45K, South=$38K, East=$52K, West=$41K</a:t>
-            </a:r>
-          </a:p>
-          <a:p>
-            <a:pPr lvl="0"/>
-            <a:r>
-              <a:rPr lang="en-US" sz="2800" b="0" i="0"/>
-              <a:t>Q2: North=$52K, South=$42K, East=$58K, West=$48K</a:t>
-            </a:r>
-          </a:p>
-          <a:p>
-            <a:pPr lvl="0"/>
-            <a:r>
-              <a:rPr lang="en-US" sz="2800" b="0" i="0"/>
-              <a:t>Q3: North=$58K, South=$45K, East=$62K, West=$52K</a:t>
-            </a:r>
-          </a:p>
-          <a:p>
-            <a:pPr lvl="0"/>
-            <a:r>
-              <a:rPr lang="en-US" sz="2800" b="0" i="0"/>
-              <a:t>Multiple data series support</a:t>
-            </a:r>
-          </a:p>
-          <a:p>
-            <a:pPr lvl="0"/>
-            <a:r>
-              <a:rPr lang="en-US" sz="2800" b="0" i="0"/>
-              <a:t>ECMA-376 compliant XML</a:t>
+              <a:rPr lang="en-US" sz="2400" b="0" i="0">
+                <a:solidFill>
+                  <a:srgbClr val="333333"/>
+                </a:solidFill>
+              </a:rPr>
+              <a:t>Bold titles with custom colors</a:t>
+            </a:r>
+          </a:p>
+          <a:p>
+            <a:pPr lvl="0"/>
+            <a:r>
+              <a:rPr lang="en-US" sz="2400" b="0" i="0">
+                <a:solidFill>
+                  <a:srgbClr val="333333"/>
+                </a:solidFill>
+              </a:rPr>
+              <a:t>Italic content support</a:t>
+            </a:r>
+          </a:p>
+          <a:p>
+            <a:pPr lvl="0"/>
+            <a:r>
+              <a:rPr lang="en-US" sz="2400" b="0" i="0">
+                <a:solidFill>
+                  <a:srgbClr val="333333"/>
+                </a:solidFill>
+              </a:rPr>
+              <a:t>Underline emphasis</a:t>
+            </a:r>
+          </a:p>
+          <a:p>
+            <a:pPr lvl="0"/>
+            <a:r>
+              <a:rPr lang="en-US" sz="2400" b="0" i="0">
+                <a:solidFill>
+                  <a:srgbClr val="333333"/>
+                </a:solidFill>
+              </a:rPr>
+              <a:t>Font sizes from 8pt to 96pt</a:t>
             </a:r>
           </a:p>
         </p:txBody>
@@ -854,8 +1262,12 @@
           <a:lstStyle/>
           <a:p>
             <a:r>
-              <a:rPr lang="en-US" sz="4400" b="1" i="0"/>
-              <a:t>Line Charts: Revenue Trend</a:t>
+              <a:rPr lang="en-US" sz="4400" b="1" i="0">
+                <a:solidFill>
+                  <a:srgbClr val="9BBB59"/>
+                </a:solidFill>
+              </a:rPr>
+              <a:t>Color Palette</a:t>
             </a:r>
           </a:p>
         </p:txBody>
@@ -887,35 +1299,35 @@
             <a:pPr lvl="0"/>
             <a:r>
               <a:rPr lang="en-US" sz="2800" b="0" i="0"/>
-              <a:t>Jan-Jun Revenue: $50K, $55K, $60K, $58K, $65K, $70K</a:t>
-            </a:r>
-          </a:p>
-          <a:p>
-            <a:pPr lvl="0"/>
-            <a:r>
-              <a:rPr lang="en-US" sz="2800" b="0" i="0"/>
-              <a:t>Target: $55K, $55K, $60K, $60K, $65K, $70K</a:t>
-            </a:r>
-          </a:p>
-          <a:p>
-            <a:pPr lvl="0"/>
-            <a:r>
-              <a:rPr lang="en-US" sz="2800" b="0" i="0"/>
-              <a:t>Line markers support</a:t>
-            </a:r>
-          </a:p>
-          <a:p>
-            <a:pPr lvl="0"/>
-            <a:r>
-              <a:rPr lang="en-US" sz="2800" b="0" i="0"/>
-              <a:t>Multiple series visualization</a:t>
-            </a:r>
-          </a:p>
-          <a:p>
-            <a:pPr lvl="0"/>
-            <a:r>
-              <a:rPr lang="en-US" sz="2800" b="0" i="0"/>
-              <a:t>Trend analysis ready</a:t>
+              <a:t>Primary: #1F497D (Blue)</a:t>
+            </a:r>
+          </a:p>
+          <a:p>
+            <a:pPr lvl="0"/>
+            <a:r>
+              <a:rPr lang="en-US" sz="2800" b="0" i="0"/>
+              <a:t>Accent 1: #4F81BD (Light Blue)</a:t>
+            </a:r>
+          </a:p>
+          <a:p>
+            <a:pPr lvl="0"/>
+            <a:r>
+              <a:rPr lang="en-US" sz="2800" b="0" i="0"/>
+              <a:t>Accent 2: #C0504D (Red)</a:t>
+            </a:r>
+          </a:p>
+          <a:p>
+            <a:pPr lvl="0"/>
+            <a:r>
+              <a:rPr lang="en-US" sz="2800" b="0" i="0"/>
+              <a:t>Accent 3: #9BBB59 (Green)</a:t>
+            </a:r>
+          </a:p>
+          <a:p>
+            <a:pPr lvl="0"/>
+            <a:r>
+              <a:rPr lang="en-US" sz="2800" b="0" i="0"/>
+              <a:t>Accent 4: #8064A2 (Purple)</a:t>
             </a:r>
           </a:p>
         </p:txBody>
@@ -975,72 +1387,319 @@
           <a:lstStyle/>
           <a:p>
             <a:r>
-              <a:rPr lang="en-US" sz="4400" b="1" i="0"/>
-              <a:t>Pie Charts: Market Distribution</a:t>
-            </a:r>
-          </a:p>
-        </p:txBody>
-      </p:sp>
-      <p:sp>
-        <p:nvSpPr>
-          <p:cNvPr id="3" name="Content"/>
-          <p:cNvSpPr>
-            <a:spLocks noGrp="1"/>
-          </p:cNvSpPr>
-          <p:nvPr>
-            <p:ph type="body" idx="1"/>
-          </p:nvPr>
-        </p:nvSpPr>
-        <p:spPr>
-          <a:xfrm>
-            <a:off x="457200" y="1600200"/>
-            <a:ext cx="8230200" cy="4572000"/>
-          </a:xfrm>
-          <a:prstGeom prst="rect">
-            <a:avLst/>
-          </a:prstGeom>
-          <a:noFill/>
-        </p:spPr>
-        <p:txBody>
-          <a:bodyPr/>
-          <a:lstStyle/>
-          <a:p>
-            <a:pPr lvl="0"/>
-            <a:r>
-              <a:rPr lang="en-US" sz="2800" b="0" i="0"/>
-              <a:t>Product A: 35%</a:t>
-            </a:r>
-          </a:p>
-          <a:p>
-            <a:pPr lvl="0"/>
-            <a:r>
-              <a:rPr lang="en-US" sz="2800" b="0" i="0"/>
-              <a:t>Product B: 25%</a:t>
-            </a:r>
-          </a:p>
-          <a:p>
-            <a:pPr lvl="0"/>
-            <a:r>
-              <a:rPr lang="en-US" sz="2800" b="0" i="0"/>
-              <a:t>Product C: 25%</a:t>
-            </a:r>
-          </a:p>
-          <a:p>
-            <a:pPr lvl="0"/>
-            <a:r>
-              <a:rPr lang="en-US" sz="2800" b="0" i="0"/>
-              <a:t>Product D: 15%</a:t>
-            </a:r>
-          </a:p>
-          <a:p>
-            <a:pPr lvl="0"/>
-            <a:r>
-              <a:rPr lang="en-US" sz="2800" b="0" i="0"/>
-              <a:t>Percentage display and category labels</a:t>
-            </a:r>
-          </a:p>
-        </p:txBody>
-      </p:sp>
+              <a:rPr lang="en-US" sz="4400" b="1" i="0">
+                <a:solidFill>
+                  <a:srgbClr val="1F497D"/>
+                </a:solidFill>
+              </a:rPr>
+              <a:t>Quarterly Revenue</a:t>
+            </a:r>
+          </a:p>
+        </p:txBody>
+      </p:sp>
+      <p:graphicFrame>
+        <p:nvGraphicFramePr>
+          <p:cNvPr id="3" name="Table 3"/>
+          <p:cNvGraphicFramePr/>
+          <p:nvPr/>
+        </p:nvGraphicFramePr>
+        <p:xfrm>
+          <a:off x="0" y="0"/>
+          <a:ext cx="4500000" cy="2000000"/>
+        </p:xfrm>
+        <a:graphic>
+          <a:graphicData uri="http://schemas.openxmlformats.org/drawingml/2006/table">
+            <a:tbl>
+              <a:tblPr firstRow="1" bandHVals="1"/>
+              <a:tblGrid>
+                <a:gridCol w="1500000"/>
+                <a:gridCol w="1500000"/>
+                <a:gridCol w="1500000"/>
+              </a:tblGrid>
+              <a:tr h="400000">
+                <a:tc>
+                  <a:tcPr marL="91440" marR="91440" marT="45720" marB="45720" anchor="ctr" anchorCtr="0">
+                    <a:solidFill>
+                      <a:srgbClr val="4F81BD"/>
+                    </a:solidFill>
+                  </a:tcPr>
+                  <a:txBody>
+                    <a:bodyPr rot="0" vert="horz" anchor="ctr" anchorCtr="0"/>
+                    <a:lstStyle/>
+                    <a:p>
+                      <a:pPr algn="ctr"/>
+                      <a:r>
+                        <a:rPr lang="en-US" sz="2000" b="1"/>
+                        <a:t>Quarter</a:t>
+                      </a:r>
+                    </a:p>
+                  </a:txBody>
+                </a:tc>
+                <a:tc>
+                  <a:tcPr marL="91440" marR="91440" marT="45720" marB="45720" anchor="ctr" anchorCtr="0">
+                    <a:solidFill>
+                      <a:srgbClr val="4F81BD"/>
+                    </a:solidFill>
+                  </a:tcPr>
+                  <a:txBody>
+                    <a:bodyPr rot="0" vert="horz" anchor="ctr" anchorCtr="0"/>
+                    <a:lstStyle/>
+                    <a:p>
+                      <a:pPr algn="ctr"/>
+                      <a:r>
+                        <a:rPr lang="en-US" sz="2000" b="1"/>
+                        <a:t>Revenue</a:t>
+                      </a:r>
+                    </a:p>
+                  </a:txBody>
+                </a:tc>
+                <a:tc>
+                  <a:tcPr marL="91440" marR="91440" marT="45720" marB="45720" anchor="ctr" anchorCtr="0">
+                    <a:solidFill>
+                      <a:srgbClr val="4F81BD"/>
+                    </a:solidFill>
+                  </a:tcPr>
+                  <a:txBody>
+                    <a:bodyPr rot="0" vert="horz" anchor="ctr" anchorCtr="0"/>
+                    <a:lstStyle/>
+                    <a:p>
+                      <a:pPr algn="ctr"/>
+                      <a:r>
+                        <a:rPr lang="en-US" sz="2000" b="1"/>
+                        <a:t>Growth</a:t>
+                      </a:r>
+                    </a:p>
+                  </a:txBody>
+                </a:tc>
+              </a:tr>
+              <a:tr h="400000">
+                <a:tc>
+                  <a:tcPr marL="91440" marR="91440" marT="45720" marB="45720" anchor="ctr" anchorCtr="0">
+                    <a:solidFill>
+                      <a:srgbClr val="F2F2F2"/>
+                    </a:solidFill>
+                  </a:tcPr>
+                  <a:txBody>
+                    <a:bodyPr rot="0" vert="horz" anchor="ctr" anchorCtr="0"/>
+                    <a:lstStyle/>
+                    <a:p>
+                      <a:pPr algn="ctr"/>
+                      <a:r>
+                        <a:rPr lang="en-US" sz="2000" b="0"/>
+                        <a:t>Q1 2024</a:t>
+                      </a:r>
+                    </a:p>
+                  </a:txBody>
+                </a:tc>
+                <a:tc>
+                  <a:tcPr marL="91440" marR="91440" marT="45720" marB="45720" anchor="ctr" anchorCtr="0">
+                    <a:solidFill>
+                      <a:srgbClr val="F2F2F2"/>
+                    </a:solidFill>
+                  </a:tcPr>
+                  <a:txBody>
+                    <a:bodyPr rot="0" vert="horz" anchor="ctr" anchorCtr="0"/>
+                    <a:lstStyle/>
+                    <a:p>
+                      <a:pPr algn="ctr"/>
+                      <a:r>
+                        <a:rPr lang="en-US" sz="2000" b="0"/>
+                        <a:t>$1.2M</a:t>
+                      </a:r>
+                    </a:p>
+                  </a:txBody>
+                </a:tc>
+                <a:tc>
+                  <a:tcPr marL="91440" marR="91440" marT="45720" marB="45720" anchor="ctr" anchorCtr="0">
+                    <a:solidFill>
+                      <a:srgbClr val="F2F2F2"/>
+                    </a:solidFill>
+                  </a:tcPr>
+                  <a:txBody>
+                    <a:bodyPr rot="0" vert="horz" anchor="ctr" anchorCtr="0"/>
+                    <a:lstStyle/>
+                    <a:p>
+                      <a:pPr algn="ctr"/>
+                      <a:r>
+                        <a:rPr lang="en-US" sz="2000" b="0"/>
+                        <a:t>+15%</a:t>
+                      </a:r>
+                    </a:p>
+                  </a:txBody>
+                </a:tc>
+              </a:tr>
+              <a:tr h="400000">
+                <a:tc>
+                  <a:tcPr marL="91440" marR="91440" marT="45720" marB="45720" anchor="ctr" anchorCtr="0">
+                    <a:solidFill>
+                      <a:srgbClr val="F2F2F2"/>
+                    </a:solidFill>
+                  </a:tcPr>
+                  <a:txBody>
+                    <a:bodyPr rot="0" vert="horz" anchor="ctr" anchorCtr="0"/>
+                    <a:lstStyle/>
+                    <a:p>
+                      <a:pPr algn="ctr"/>
+                      <a:r>
+                        <a:rPr lang="en-US" sz="2000" b="0"/>
+                        <a:t>Q2 2024</a:t>
+                      </a:r>
+                    </a:p>
+                  </a:txBody>
+                </a:tc>
+                <a:tc>
+                  <a:tcPr marL="91440" marR="91440" marT="45720" marB="45720" anchor="ctr" anchorCtr="0">
+                    <a:solidFill>
+                      <a:srgbClr val="F2F2F2"/>
+                    </a:solidFill>
+                  </a:tcPr>
+                  <a:txBody>
+                    <a:bodyPr rot="0" vert="horz" anchor="ctr" anchorCtr="0"/>
+                    <a:lstStyle/>
+                    <a:p>
+                      <a:pPr algn="ctr"/>
+                      <a:r>
+                        <a:rPr lang="en-US" sz="2000" b="0"/>
+                        <a:t>$1.5M</a:t>
+                      </a:r>
+                    </a:p>
+                  </a:txBody>
+                </a:tc>
+                <a:tc>
+                  <a:tcPr marL="91440" marR="91440" marT="45720" marB="45720" anchor="ctr" anchorCtr="0">
+                    <a:solidFill>
+                      <a:srgbClr val="F2F2F2"/>
+                    </a:solidFill>
+                  </a:tcPr>
+                  <a:txBody>
+                    <a:bodyPr rot="0" vert="horz" anchor="ctr" anchorCtr="0"/>
+                    <a:lstStyle/>
+                    <a:p>
+                      <a:pPr algn="ctr"/>
+                      <a:r>
+                        <a:rPr lang="en-US" sz="2000" b="0"/>
+                        <a:t>+25%</a:t>
+                      </a:r>
+                    </a:p>
+                  </a:txBody>
+                </a:tc>
+              </a:tr>
+              <a:tr h="400000">
+                <a:tc>
+                  <a:tcPr marL="91440" marR="91440" marT="45720" marB="45720" anchor="ctr" anchorCtr="0">
+                    <a:solidFill>
+                      <a:srgbClr val="F2F2F2"/>
+                    </a:solidFill>
+                  </a:tcPr>
+                  <a:txBody>
+                    <a:bodyPr rot="0" vert="horz" anchor="ctr" anchorCtr="0"/>
+                    <a:lstStyle/>
+                    <a:p>
+                      <a:pPr algn="ctr"/>
+                      <a:r>
+                        <a:rPr lang="en-US" sz="2000" b="0"/>
+                        <a:t>Q3 2024</a:t>
+                      </a:r>
+                    </a:p>
+                  </a:txBody>
+                </a:tc>
+                <a:tc>
+                  <a:tcPr marL="91440" marR="91440" marT="45720" marB="45720" anchor="ctr" anchorCtr="0">
+                    <a:solidFill>
+                      <a:srgbClr val="F2F2F2"/>
+                    </a:solidFill>
+                  </a:tcPr>
+                  <a:txBody>
+                    <a:bodyPr rot="0" vert="horz" anchor="ctr" anchorCtr="0"/>
+                    <a:lstStyle/>
+                    <a:p>
+                      <a:pPr algn="ctr"/>
+                      <a:r>
+                        <a:rPr lang="en-US" sz="2000" b="0"/>
+                        <a:t>$1.8M</a:t>
+                      </a:r>
+                    </a:p>
+                  </a:txBody>
+                </a:tc>
+                <a:tc>
+                  <a:tcPr marL="91440" marR="91440" marT="45720" marB="45720" anchor="ctr" anchorCtr="0">
+                    <a:solidFill>
+                      <a:srgbClr val="F2F2F2"/>
+                    </a:solidFill>
+                  </a:tcPr>
+                  <a:txBody>
+                    <a:bodyPr rot="0" vert="horz" anchor="ctr" anchorCtr="0"/>
+                    <a:lstStyle/>
+                    <a:p>
+                      <a:pPr algn="ctr"/>
+                      <a:r>
+                        <a:rPr lang="en-US" sz="2000" b="0"/>
+                        <a:t>+20%</a:t>
+                      </a:r>
+                    </a:p>
+                  </a:txBody>
+                </a:tc>
+              </a:tr>
+              <a:tr h="400000">
+                <a:tc>
+                  <a:tcPr marL="91440" marR="91440" marT="45720" marB="45720" anchor="ctr" anchorCtr="0">
+                    <a:solidFill>
+                      <a:srgbClr val="F2F2F2"/>
+                    </a:solidFill>
+                  </a:tcPr>
+                  <a:txBody>
+                    <a:bodyPr rot="0" vert="horz" anchor="ctr" anchorCtr="0"/>
+                    <a:lstStyle/>
+                    <a:p>
+                      <a:pPr algn="ctr"/>
+                      <a:r>
+                        <a:rPr lang="en-US" sz="2000" b="1"/>
+                        <a:t>Q4 2024</a:t>
+                      </a:r>
+                    </a:p>
+                  </a:txBody>
+                </a:tc>
+                <a:tc>
+                  <a:tcPr marL="91440" marR="91440" marT="45720" marB="45720" anchor="ctr" anchorCtr="0">
+                    <a:solidFill>
+                      <a:srgbClr val="F2F2F2"/>
+                    </a:solidFill>
+                  </a:tcPr>
+                  <a:txBody>
+                    <a:bodyPr rot="0" vert="horz" anchor="ctr" anchorCtr="0"/>
+                    <a:lstStyle/>
+                    <a:p>
+                      <a:pPr algn="ctr"/>
+                      <a:r>
+                        <a:rPr lang="en-US" sz="2000" b="1"/>
+                        <a:t>$2.2M</a:t>
+                      </a:r>
+                    </a:p>
+                  </a:txBody>
+                </a:tc>
+                <a:tc>
+                  <a:tcPr marL="91440" marR="91440" marT="45720" marB="45720" anchor="ctr" anchorCtr="0">
+                    <a:solidFill>
+                      <a:srgbClr val="9BBB59"/>
+                    </a:solidFill>
+                  </a:tcPr>
+                  <a:txBody>
+                    <a:bodyPr rot="0" vert="horz" anchor="ctr" anchorCtr="0"/>
+                    <a:lstStyle/>
+                    <a:p>
+                      <a:pPr algn="ctr"/>
+                      <a:r>
+                        <a:rPr lang="en-US" sz="2000" b="1"/>
+                        <a:t>+22%</a:t>
+                      </a:r>
+                    </a:p>
+                  </a:txBody>
+                </a:tc>
+              </a:tr>
+            </a:tbl>
+          </a:graphicData>
+        </a:graphic>
+      </p:graphicFrame>
     </p:spTree>
   </p:cSld>
   <p:clrMapOvr>
@@ -1097,7 +1756,7 @@
           <a:p>
             <a:r>
               <a:rPr lang="en-US" sz="4400" b="1" i="0"/>
-              <a:t>Package Management</a:t>
+              <a:t>Product Inventory</a:t>
             </a:r>
           </a:p>
         </p:txBody>
@@ -1129,35 +1788,21 @@
             <a:pPr lvl="0"/>
             <a:r>
               <a:rPr lang="en-US" sz="2800" b="0" i="0"/>
-              <a:t>Read existing PPTX files</a:t>
-            </a:r>
-          </a:p>
-          <a:p>
-            <a:pPr lvl="0"/>
-            <a:r>
-              <a:rPr lang="en-US" sz="2800" b="0" i="0"/>
-              <a:t>Write PPTX files</a:t>
-            </a:r>
-          </a:p>
-          <a:p>
-            <a:pPr lvl="0"/>
-            <a:r>
-              <a:rPr lang="en-US" sz="2800" b="0" i="0"/>
-              <a:t>Part management (get, add, list)</a:t>
-            </a:r>
-          </a:p>
-          <a:p>
-            <a:pPr lvl="0"/>
-            <a:r>
-              <a:rPr lang="en-US" sz="2800" b="0" i="0"/>
-              <a:t>ZIP archive handling</a:t>
-            </a:r>
-          </a:p>
-          <a:p>
-            <a:pPr lvl="0"/>
-            <a:r>
-              <a:rPr lang="en-US" sz="2800" b="0" i="0"/>
-              <a:t>Foundation for modification</a:t>
+              <a:t>Widget A: 1,500 units @ $29.99</a:t>
+            </a:r>
+          </a:p>
+          <a:p>
+            <a:pPr lvl="0"/>
+            <a:r>
+              <a:rPr lang="en-US" sz="2800" b="0" i="0"/>
+              <a:t>Widget B: 2,300 units @ $19.99</a:t>
+            </a:r>
+          </a:p>
+          <a:p>
+            <a:pPr lvl="0"/>
+            <a:r>
+              <a:rPr lang="en-US" sz="2800" b="0" i="0"/>
+              <a:t>Widget C: 890 units @ $49.99</a:t>
             </a:r>
           </a:p>
         </p:txBody>
@@ -1218,7 +1863,7 @@
           <a:p>
             <a:r>
               <a:rPr lang="en-US" sz="4400" b="1" i="0"/>
-              <a:t>Fluent Builder APIs</a:t>
+              <a:t>Bar Chart: Regional Sales</a:t>
             </a:r>
           </a:p>
         </p:txBody>
@@ -1250,35 +1895,28 @@
             <a:pPr lvl="0"/>
             <a:r>
               <a:rPr lang="en-US" sz="2800" b="0" i="0"/>
-              <a:t>ChartBuilder - Create charts fluently</a:t>
-            </a:r>
-          </a:p>
-          <a:p>
-            <a:pPr lvl="0"/>
-            <a:r>
-              <a:rPr lang="en-US" sz="2800" b="0" i="0"/>
-              <a:t>TableBuilder - Build tables step by step</a:t>
-            </a:r>
-          </a:p>
-          <a:p>
-            <a:pPr lvl="0"/>
-            <a:r>
-              <a:rPr lang="en-US" sz="2800" b="0" i="0"/>
-              <a:t>ImageBuilder - Configure images</a:t>
-            </a:r>
-          </a:p>
-          <a:p>
-            <a:pPr lvl="0"/>
-            <a:r>
-              <a:rPr lang="en-US" sz="2800" b="0" i="0"/>
-              <a:t>SlideContent - Build slide content</a:t>
-            </a:r>
-          </a:p>
-          <a:p>
-            <a:pPr lvl="0"/>
-            <a:r>
-              <a:rPr lang="en-US" sz="2800" b="0" i="0"/>
-              <a:t>PresentationBuilder - Create presentations</a:t>
+              <a:t>North: Strong Q2 growth (+15%)</a:t>
+            </a:r>
+          </a:p>
+          <a:p>
+            <a:pPr lvl="0"/>
+            <a:r>
+              <a:rPr lang="en-US" sz="2800" b="0" i="0"/>
+              <a:t>East: Highest performer</a:t>
+            </a:r>
+          </a:p>
+          <a:p>
+            <a:pPr lvl="0"/>
+            <a:r>
+              <a:rPr lang="en-US" sz="2800" b="0" i="0"/>
+              <a:t>South: Steady improvement</a:t>
+            </a:r>
+          </a:p>
+          <a:p>
+            <a:pPr lvl="0"/>
+            <a:r>
+              <a:rPr lang="en-US" sz="2800" b="0" i="0"/>
+              <a:t>West: Consistent growth</a:t>
             </a:r>
           </a:p>
         </p:txBody>

</xml_diff>

<commit_message>
Update TODO.md to reflect v1.0.12 completion with 9 advanced features and 42 new tests
- Mark completed: TablePart enhancements (cell alignment, borders, margins, merged cells), Animation (50+ effects), SlideTransition (27 effects), HandoutMasterPart, CustomXmlPart, VbaProjectPart, EmbeddedFontPart, SmartArtPart (25 layouts), Model3DPart (5 formats)
- Update test count from 550 to 592 tests passing
- Move 8 future enhancements from pending to completed with version tags
- Add 5 new remaining future
</commit_message>
<xml_diff>
--- a/comprehensive_demo.pptx
+++ b/comprehensive_demo.pptx
@@ -15,10 +15,236 @@
     <p:sldId id="264" r:id="rId10"/>
     <p:sldId id="265" r:id="rId11"/>
     <p:sldId id="266" r:id="rId12"/>
+    <p:sldId id="267" r:id="rId13"/>
+    <p:sldId id="268" r:id="rId14"/>
+    <p:sldId id="269" r:id="rId15"/>
+    <p:sldId id="270" r:id="rId16"/>
+    <p:sldId id="271" r:id="rId17"/>
+    <p:sldId id="272" r:id="rId18"/>
+    <p:sldId id="273" r:id="rId19"/>
+    <p:sldId id="274" r:id="rId20"/>
+    <p:sldId id="275" r:id="rId21"/>
+    <p:sldId id="276" r:id="rId22"/>
   </p:sldIdLst>
   <p:sldSz cx="9144000" cy="6858000" type="screen4x3"/>
   <p:notesSz cx="6858000" cy="9144000"/>
 </p:presentation>
+</file>
+
+<file path=ppt/notesMasters/notesMaster1.xml><?xml version="1.0" encoding="utf-8"?>
+<p:notesMaster xmlns:a="http://schemas.openxmlformats.org/drawingml/2006/main" xmlns:r="http://schemas.openxmlformats.org/officeDocument/2006/relationships" xmlns:p="http://schemas.openxmlformats.org/presentationml/2006/main">
+  <p:cSld>
+    <p:spTree>
+      <p:nvGrpSpPr>
+        <p:cNvPr id="1" name=""/>
+        <p:cNvGrpSpPr/>
+        <p:nvPr/>
+      </p:nvGrpSpPr>
+      <p:grpSpPr>
+        <a:xfrm>
+          <a:off x="0" y="0"/>
+          <a:ext cx="0" cy="0"/>
+          <a:chOff x="0" y="0"/>
+          <a:chExt cx="0" cy="0"/>
+        </a:xfrm>
+      </p:grpSpPr>
+      <p:sp>
+        <p:nvSpPr>
+          <p:cNvPr id="2" name="Header Placeholder 1"/>
+          <p:cNvSpPr>
+            <a:spLocks noGrp="1"/>
+          </p:cNvSpPr>
+          <p:nvPr>
+            <p:ph type="hdr" sz="quarter"/>
+          </p:nvPr>
+        </p:nvSpPr>
+        <p:spPr>
+          <a:xfrm>
+            <a:off x="0" y="0"/>
+            <a:ext cx="2971800" cy="458788"/>
+          </a:xfrm>
+          <a:prstGeom prst="rect">
+            <a:avLst/>
+          </a:prstGeom>
+        </p:spPr>
+        <p:txBody>
+          <a:bodyPr vert="horz" lIns="91440" tIns="45720" rIns="91440" bIns="45720" rtlCol="0"/>
+          <a:lstStyle>
+            <a:lvl1pPr algn="l">
+              <a:defRPr sz="1200"/>
+            </a:lvl1pPr>
+          </a:lstStyle>
+          <a:p>
+            <a:endParaRPr lang="en-US"/>
+          </a:p>
+        </p:txBody>
+      </p:sp>
+      <p:sp>
+        <p:nvSpPr>
+          <p:cNvPr id="3" name="Slide Image Placeholder 2"/>
+          <p:cNvSpPr>
+            <a:spLocks noGrp="1" noRot="1" noChangeAspect="1"/>
+          </p:cNvSpPr>
+          <p:nvPr>
+            <p:ph type="sldImg" idx="2"/>
+          </p:nvPr>
+        </p:nvSpPr>
+        <p:spPr>
+          <a:xfrm>
+            <a:off x="685800" y="1143000"/>
+            <a:ext cx="5486400" cy="3086100"/>
+          </a:xfrm>
+          <a:prstGeom prst="rect">
+            <a:avLst/>
+          </a:prstGeom>
+          <a:noFill/>
+          <a:ln w="12700">
+            <a:solidFill>
+              <a:prstClr val="black"/>
+            </a:solidFill>
+          </a:ln>
+        </p:spPr>
+        <p:txBody>
+          <a:bodyPr vert="horz" lIns="91440" tIns="45720" rIns="91440" bIns="45720" rtlCol="0" anchor="ctr"/>
+          <a:lstStyle/>
+          <a:p>
+            <a:endParaRPr lang="en-US"/>
+          </a:p>
+        </p:txBody>
+      </p:sp>
+      <p:sp>
+        <p:nvSpPr>
+          <p:cNvPr id="4" name="Notes Placeholder 3"/>
+          <p:cNvSpPr>
+            <a:spLocks noGrp="1"/>
+          </p:cNvSpPr>
+          <p:nvPr>
+            <p:ph type="body" sz="quarter" idx="3"/>
+          </p:nvPr>
+        </p:nvSpPr>
+        <p:spPr>
+          <a:xfrm>
+            <a:off x="685800" y="4400550"/>
+            <a:ext cx="5486400" cy="3600450"/>
+          </a:xfrm>
+          <a:prstGeom prst="rect">
+            <a:avLst/>
+          </a:prstGeom>
+        </p:spPr>
+        <p:txBody>
+          <a:bodyPr vert="horz" lIns="91440" tIns="45720" rIns="91440" bIns="45720" rtlCol="0"/>
+          <a:lstStyle/>
+          <a:p>
+            <a:pPr lvl="0"/>
+            <a:r>
+              <a:rPr lang="en-US"/>
+              <a:t>Click to edit Master text styles</a:t>
+            </a:r>
+          </a:p>
+        </p:txBody>
+      </p:sp>
+    </p:spTree>
+  </p:cSld>
+  <p:clrMap bg1="lt1" tx1="dk1" bg2="lt2" tx2="dk2" accent1="accent1" accent2="accent2" accent3="accent3" accent4="accent4" accent5="accent5" accent6="accent6" hlink="hlink" folHlink="folHlink"/>
+  <p:notesStyle>
+    <a:lvl1pPr marL="0" algn="l" defTabSz="914400" rtl="0" eaLnBrk="1" latinLnBrk="0" hangingPunct="1">
+      <a:defRPr sz="1200" kern="1200">
+        <a:solidFill>
+          <a:schemeClr val="tx1"/>
+        </a:solidFill>
+        <a:latin typeface="+mn-lt"/>
+        <a:ea typeface="+mn-ea"/>
+        <a:cs typeface="+mn-cs"/>
+      </a:defRPr>
+    </a:lvl1pPr>
+  </p:notesStyle>
+</p:notesMaster>
+</file>
+
+<file path=ppt/notesSlides/notesSlide20.xml><?xml version="1.0" encoding="utf-8"?>
+<p:notes xmlns:a="http://schemas.openxmlformats.org/drawingml/2006/main" xmlns:r="http://schemas.openxmlformats.org/officeDocument/2006/relationships" xmlns:p="http://schemas.openxmlformats.org/presentationml/2006/main">
+  <p:cSld>
+    <p:spTree>
+      <p:nvGrpSpPr>
+        <p:cNvPr id="1" name=""/>
+        <p:cNvGrpSpPr/>
+        <p:nvPr/>
+      </p:nvGrpSpPr>
+      <p:grpSpPr>
+        <a:xfrm>
+          <a:off x="0" y="0"/>
+          <a:ext cx="0" cy="0"/>
+          <a:chOff x="0" y="0"/>
+          <a:chExt cx="0" cy="0"/>
+        </a:xfrm>
+      </p:grpSpPr>
+      <p:sp>
+        <p:nvSpPr>
+          <p:cNvPr id="2" name="Slide Image Placeholder 1"/>
+          <p:cNvSpPr>
+            <a:spLocks noGrp="1" noRot="1" noChangeAspect="1"/>
+          </p:cNvSpPr>
+          <p:nvPr>
+            <p:ph type="sldImg"/>
+          </p:nvPr>
+        </p:nvSpPr>
+        <p:spPr/>
+      </p:sp>
+      <p:sp>
+        <p:nvSpPr>
+          <p:cNvPr id="3" name="Notes Placeholder 2"/>
+          <p:cNvSpPr>
+            <a:spLocks noGrp="1"/>
+          </p:cNvSpPr>
+          <p:nvPr>
+            <p:ph type="body" idx="1"/>
+          </p:nvPr>
+        </p:nvSpPr>
+        <p:spPr/>
+        <p:txBody>
+          <a:bodyPr/>
+          <a:lstStyle/>
+          <a:p>
+            <a:r>
+              <a:rPr lang="en-US" dirty="0"/>
+              <a:t>Speaker Notes:
+1. Emphasize the progress made
+2. Highlight key achievements
+3. Address any concerns about timeline
+4. Open for Q&amp;A</a:t>
+            </a:r>
+          </a:p>
+        </p:txBody>
+      </p:sp>
+      <p:sp>
+        <p:nvSpPr>
+          <p:cNvPr id="4" name="Slide Number Placeholder 3"/>
+          <p:cNvSpPr>
+            <a:spLocks noGrp="1"/>
+          </p:cNvSpPr>
+          <p:nvPr>
+            <p:ph type="sldNum" sz="quarter" idx="10"/>
+          </p:nvPr>
+        </p:nvSpPr>
+        <p:spPr/>
+        <p:txBody>
+          <a:bodyPr/>
+          <a:lstStyle/>
+          <a:p>
+            <a:fld id="{B0E4A5D7-2C3F-4A8B-9E1D-000000000014}" type="slidenum">
+              <a:rPr lang="en-US"/>
+              <a:t>20</a:t>
+            </a:fld>
+            <a:endParaRPr lang="en-US"/>
+          </a:p>
+        </p:txBody>
+      </p:sp>
+    </p:spTree>
+  </p:cSld>
+  <p:clrMapOvr>
+    <a:masterClrMapping/>
+  </p:clrMapOvr>
+</p:notes>
 </file>
 
 <file path=ppt/slideLayouts/slideLayout1.xml><?xml version="1.0" encoding="utf-8"?>
@@ -306,6 +532,3420 @@
 </p:sld>
 </file>
 
+<file path=ppt/slides/slide11.xml><?xml version="1.0" encoding="utf-8"?>
+<p:sld xmlns:a="http://schemas.openxmlformats.org/drawingml/2006/main" xmlns:r="http://schemas.openxmlformats.org/officeDocument/2006/relationships" xmlns:p="http://schemas.openxmlformats.org/presentationml/2006/main">
+  <p:cSld>
+    <p:bg>
+      <p:bgRef idx="1001">
+        <a:schemeClr val="bg1"/>
+      </p:bgRef>
+    </p:bg>
+    <p:spTree>
+      <p:nvGrpSpPr>
+        <p:cNvPr id="1" name=""/>
+        <p:cNvGrpSpPr/>
+        <p:nvPr/>
+      </p:nvGrpSpPr>
+      <p:grpSpPr>
+        <a:xfrm>
+          <a:off x="0" y="0"/>
+          <a:ext cx="9144000" cy="6858000"/>
+          <a:chOff x="0" y="0"/>
+          <a:chExt cx="9144000" cy="6858000"/>
+        </a:xfrm>
+      </p:grpSpPr>
+      <p:sp>
+        <p:nvSpPr>
+          <p:cNvPr id="2" name="Title"/>
+          <p:cNvSpPr txBox="1"/>
+          <p:nvPr/>
+        </p:nvSpPr>
+        <p:spPr>
+          <a:xfrm>
+            <a:off x="457200" y="274638"/>
+            <a:ext cx="8230200" cy="1143000"/>
+          </a:xfrm>
+          <a:prstGeom prst="rect">
+            <a:avLst/>
+          </a:prstGeom>
+          <a:noFill/>
+        </p:spPr>
+        <p:txBody>
+          <a:bodyPr wrap="square" rtlCol="0" anchor="ctr"/>
+          <a:lstStyle/>
+          <a:p>
+            <a:pPr algn="l"/>
+            <a:r>
+              <a:rPr lang="en-US" sz="4400" b="1" i="0" dirty="0">
+                <a:solidFill>
+                  <a:srgbClr val="1F4E79"/>
+                </a:solidFill>
+              </a:rPr>
+              <a:t>Financial Report - Advanced Table</a:t>
+            </a:r>
+          </a:p>
+        </p:txBody>
+      </p:sp>
+      <p:graphicFrame>
+        <p:nvGraphicFramePr>
+          <p:cNvPr id="3" name="Table 3"/>
+          <p:cNvGraphicFramePr/>
+          <p:nvPr/>
+        </p:nvGraphicFramePr>
+        <p:xfrm>
+          <a:off x="300000" y="1600000"/>
+          <a:ext cx="8000000" cy="2000000"/>
+        </p:xfrm>
+        <a:graphic>
+          <a:graphicData uri="http://schemas.openxmlformats.org/drawingml/2006/table">
+            <a:tbl>
+              <a:tblPr firstRow="1" bandHVals="1"/>
+              <a:tblGrid>
+                <a:gridCol w="2000000"/>
+                <a:gridCol w="2000000"/>
+                <a:gridCol w="2000000"/>
+                <a:gridCol w="2000000"/>
+              </a:tblGrid>
+              <a:tr h="400000">
+                <a:tc>
+                  <a:tcPr marL="91440" marR="91440" marT="45720" marB="45720" anchor="ctr" anchorCtr="0">
+                    <a:solidFill>
+                      <a:srgbClr val="1F4E79"/>
+                    </a:solidFill>
+                  </a:tcPr>
+                  <a:txBody>
+                    <a:bodyPr rot="0" vert="horz" anchor="ctr" anchorCtr="0" wrap="square"/>
+                    <a:lstStyle/>
+                    <a:p>
+                      <a:pPr algn="ctr"/>
+                      <a:r>
+                        <a:rPr lang="en-US" sz="1400" b="1" i="0">
+                          <a:solidFill>
+                            <a:srgbClr val="FFFFFF"/>
+                          </a:solidFill>
+                          <a:latin typeface="Calibri"/>
+                          <a:ea typeface="Calibri"/>
+                          <a:cs typeface="Calibri"/>
+                        </a:rPr>
+                        <a:t>Q1 2024 Financial Report</a:t>
+                      </a:r>
+                    </a:p>
+                  </a:txBody>
+                </a:tc>
+                <a:tc>
+                  <a:tcPr marL="91440" marR="91440" marT="45720" marB="45720" anchor="ctr" anchorCtr="0">
+                    <a:solidFill>
+                      <a:srgbClr val="1F4E79"/>
+                    </a:solidFill>
+                  </a:tcPr>
+                  <a:txBody>
+                    <a:bodyPr rot="0" vert="horz" anchor="ctr" anchorCtr="0" wrap="square"/>
+                    <a:lstStyle/>
+                    <a:p>
+                      <a:pPr algn="ctr"/>
+                      <a:r>
+                        <a:rPr lang="en-US" sz="2000" b="0" i="0">
+                          <a:solidFill>
+                            <a:srgbClr val="000000"/>
+                          </a:solidFill>
+                          <a:latin typeface="Calibri"/>
+                          <a:ea typeface="Calibri"/>
+                          <a:cs typeface="Calibri"/>
+                        </a:rPr>
+                        <a:t/>
+                      </a:r>
+                    </a:p>
+                  </a:txBody>
+                </a:tc>
+                <a:tc>
+                  <a:tcPr marL="91440" marR="91440" marT="45720" marB="45720" anchor="ctr" anchorCtr="0">
+                    <a:solidFill>
+                      <a:srgbClr val="1F4E79"/>
+                    </a:solidFill>
+                  </a:tcPr>
+                  <a:txBody>
+                    <a:bodyPr rot="0" vert="horz" anchor="ctr" anchorCtr="0" wrap="square"/>
+                    <a:lstStyle/>
+                    <a:p>
+                      <a:pPr algn="ctr"/>
+                      <a:r>
+                        <a:rPr lang="en-US" sz="2000" b="0" i="0">
+                          <a:solidFill>
+                            <a:srgbClr val="000000"/>
+                          </a:solidFill>
+                          <a:latin typeface="Calibri"/>
+                          <a:ea typeface="Calibri"/>
+                          <a:cs typeface="Calibri"/>
+                        </a:rPr>
+                        <a:t/>
+                      </a:r>
+                    </a:p>
+                  </a:txBody>
+                </a:tc>
+                <a:tc>
+                  <a:tcPr marL="91440" marR="91440" marT="45720" marB="45720" anchor="ctr" anchorCtr="0">
+                    <a:solidFill>
+                      <a:srgbClr val="1F4E79"/>
+                    </a:solidFill>
+                  </a:tcPr>
+                  <a:txBody>
+                    <a:bodyPr rot="0" vert="horz" anchor="ctr" anchorCtr="0" wrap="square"/>
+                    <a:lstStyle/>
+                    <a:p>
+                      <a:pPr algn="ctr"/>
+                      <a:r>
+                        <a:rPr lang="en-US" sz="2000" b="0" i="0">
+                          <a:solidFill>
+                            <a:srgbClr val="000000"/>
+                          </a:solidFill>
+                          <a:latin typeface="Calibri"/>
+                          <a:ea typeface="Calibri"/>
+                          <a:cs typeface="Calibri"/>
+                        </a:rPr>
+                        <a:t/>
+                      </a:r>
+                    </a:p>
+                  </a:txBody>
+                </a:tc>
+              </a:tr>
+              <a:tr h="400000">
+                <a:tc>
+                  <a:tcPr marL="91440" marR="91440" marT="45720" marB="45720" anchor="ctr" anchorCtr="0">
+                    <a:solidFill>
+                      <a:srgbClr val="2E75B6"/>
+                    </a:solidFill>
+                  </a:tcPr>
+                  <a:txBody>
+                    <a:bodyPr rot="0" vert="horz" anchor="ctr" anchorCtr="0" wrap="square"/>
+                    <a:lstStyle/>
+                    <a:p>
+                      <a:pPr algn="ctr"/>
+                      <a:r>
+                        <a:rPr lang="en-US" sz="2000" b="1" i="0">
+                          <a:solidFill>
+                            <a:srgbClr val="FFFFFF"/>
+                          </a:solidFill>
+                          <a:latin typeface="Calibri"/>
+                          <a:ea typeface="Calibri"/>
+                          <a:cs typeface="Calibri"/>
+                        </a:rPr>
+                        <a:t>Category</a:t>
+                      </a:r>
+                    </a:p>
+                  </a:txBody>
+                </a:tc>
+                <a:tc>
+                  <a:tcPr marL="91440" marR="91440" marT="45720" marB="45720" anchor="ctr" anchorCtr="0">
+                    <a:solidFill>
+                      <a:srgbClr val="2E75B6"/>
+                    </a:solidFill>
+                  </a:tcPr>
+                  <a:txBody>
+                    <a:bodyPr rot="0" vert="horz" anchor="ctr" anchorCtr="0" wrap="square"/>
+                    <a:lstStyle/>
+                    <a:p>
+                      <a:pPr algn="ctr"/>
+                      <a:r>
+                        <a:rPr lang="en-US" sz="2000" b="1" i="0">
+                          <a:solidFill>
+                            <a:srgbClr val="FFFFFF"/>
+                          </a:solidFill>
+                          <a:latin typeface="Calibri"/>
+                          <a:ea typeface="Calibri"/>
+                          <a:cs typeface="Calibri"/>
+                        </a:rPr>
+                        <a:t>Revenue</a:t>
+                      </a:r>
+                    </a:p>
+                  </a:txBody>
+                </a:tc>
+                <a:tc>
+                  <a:tcPr marL="91440" marR="91440" marT="45720" marB="45720" anchor="ctr" anchorCtr="0">
+                    <a:solidFill>
+                      <a:srgbClr val="2E75B6"/>
+                    </a:solidFill>
+                  </a:tcPr>
+                  <a:txBody>
+                    <a:bodyPr rot="0" vert="horz" anchor="ctr" anchorCtr="0" wrap="square"/>
+                    <a:lstStyle/>
+                    <a:p>
+                      <a:pPr algn="ctr"/>
+                      <a:r>
+                        <a:rPr lang="en-US" sz="2000" b="1" i="0">
+                          <a:solidFill>
+                            <a:srgbClr val="FFFFFF"/>
+                          </a:solidFill>
+                          <a:latin typeface="Calibri"/>
+                          <a:ea typeface="Calibri"/>
+                          <a:cs typeface="Calibri"/>
+                        </a:rPr>
+                        <a:t>Expenses</a:t>
+                      </a:r>
+                    </a:p>
+                  </a:txBody>
+                </a:tc>
+                <a:tc>
+                  <a:tcPr marL="91440" marR="91440" marT="45720" marB="45720" anchor="ctr" anchorCtr="0">
+                    <a:solidFill>
+                      <a:srgbClr val="2E75B6"/>
+                    </a:solidFill>
+                  </a:tcPr>
+                  <a:txBody>
+                    <a:bodyPr rot="0" vert="horz" anchor="ctr" anchorCtr="0" wrap="square"/>
+                    <a:lstStyle/>
+                    <a:p>
+                      <a:pPr algn="ctr"/>
+                      <a:r>
+                        <a:rPr lang="en-US" sz="2000" b="1" i="0">
+                          <a:solidFill>
+                            <a:srgbClr val="FFFFFF"/>
+                          </a:solidFill>
+                          <a:latin typeface="Calibri"/>
+                          <a:ea typeface="Calibri"/>
+                          <a:cs typeface="Calibri"/>
+                        </a:rPr>
+                        <a:t>Profit</a:t>
+                      </a:r>
+                    </a:p>
+                  </a:txBody>
+                </a:tc>
+              </a:tr>
+              <a:tr h="400000">
+                <a:tc>
+                  <a:tcPr marL="91440" marR="91440" marT="45720" marB="45720" anchor="ctr" anchorCtr="0">
+                    <a:solidFill>
+                      <a:srgbClr val="F2F2F2"/>
+                    </a:solidFill>
+                  </a:tcPr>
+                  <a:txBody>
+                    <a:bodyPr rot="0" vert="horz" anchor="ctr" anchorCtr="0" wrap="square"/>
+                    <a:lstStyle/>
+                    <a:p>
+                      <a:pPr algn="l"/>
+                      <a:r>
+                        <a:rPr lang="en-US" sz="2000" b="0" i="0">
+                          <a:solidFill>
+                            <a:srgbClr val="000000"/>
+                          </a:solidFill>
+                          <a:latin typeface="Calibri"/>
+                          <a:ea typeface="Calibri"/>
+                          <a:cs typeface="Calibri"/>
+                        </a:rPr>
+                        <a:t>Product Sales</a:t>
+                      </a:r>
+                    </a:p>
+                  </a:txBody>
+                </a:tc>
+                <a:tc>
+                  <a:tcPr marL="91440" marR="91440" marT="45720" marB="45720" anchor="ctr" anchorCtr="0">
+                    <a:solidFill>
+                      <a:srgbClr val="F2F2F2"/>
+                    </a:solidFill>
+                  </a:tcPr>
+                  <a:txBody>
+                    <a:bodyPr rot="0" vert="horz" anchor="ctr" anchorCtr="0" wrap="square"/>
+                    <a:lstStyle/>
+                    <a:p>
+                      <a:pPr algn="r"/>
+                      <a:r>
+                        <a:rPr lang="en-US" sz="2000" b="0" i="0">
+                          <a:solidFill>
+                            <a:srgbClr val="2E7D32"/>
+                          </a:solidFill>
+                          <a:latin typeface="Calibri"/>
+                          <a:ea typeface="Calibri"/>
+                          <a:cs typeface="Calibri"/>
+                        </a:rPr>
+                        <a:t>$1,250,000</a:t>
+                      </a:r>
+                    </a:p>
+                  </a:txBody>
+                </a:tc>
+                <a:tc>
+                  <a:tcPr marL="91440" marR="91440" marT="45720" marB="45720" anchor="ctr" anchorCtr="0">
+                    <a:solidFill>
+                      <a:srgbClr val="F2F2F2"/>
+                    </a:solidFill>
+                  </a:tcPr>
+                  <a:txBody>
+                    <a:bodyPr rot="0" vert="horz" anchor="ctr" anchorCtr="0" wrap="square"/>
+                    <a:lstStyle/>
+                    <a:p>
+                      <a:pPr algn="r"/>
+                      <a:r>
+                        <a:rPr lang="en-US" sz="2000" b="0" i="0">
+                          <a:solidFill>
+                            <a:srgbClr val="C62828"/>
+                          </a:solidFill>
+                          <a:latin typeface="Calibri"/>
+                          <a:ea typeface="Calibri"/>
+                          <a:cs typeface="Calibri"/>
+                        </a:rPr>
+                        <a:t>$450,000</a:t>
+                      </a:r>
+                    </a:p>
+                  </a:txBody>
+                </a:tc>
+                <a:tc>
+                  <a:tcPr marL="91440" marR="91440" marT="45720" marB="45720" anchor="ctr" anchorCtr="0">
+                    <a:solidFill>
+                      <a:srgbClr val="F2F2F2"/>
+                    </a:solidFill>
+                  </a:tcPr>
+                  <a:txBody>
+                    <a:bodyPr rot="0" vert="horz" anchor="ctr" anchorCtr="0" wrap="square"/>
+                    <a:lstStyle/>
+                    <a:p>
+                      <a:pPr algn="r"/>
+                      <a:r>
+                        <a:rPr lang="en-US" sz="2000" b="1" i="0">
+                          <a:solidFill>
+                            <a:srgbClr val="2E7D32"/>
+                          </a:solidFill>
+                          <a:latin typeface="Calibri"/>
+                          <a:ea typeface="Calibri"/>
+                          <a:cs typeface="Calibri"/>
+                        </a:rPr>
+                        <a:t>$800,000</a:t>
+                      </a:r>
+                    </a:p>
+                  </a:txBody>
+                </a:tc>
+              </a:tr>
+              <a:tr h="400000">
+                <a:tc>
+                  <a:tcPr marL="91440" marR="91440" marT="45720" marB="45720" anchor="ctr" anchorCtr="0">
+                    <a:solidFill>
+                      <a:srgbClr val="F2F2F2"/>
+                    </a:solidFill>
+                  </a:tcPr>
+                  <a:txBody>
+                    <a:bodyPr rot="0" vert="horz" anchor="ctr" anchorCtr="0" wrap="square"/>
+                    <a:lstStyle/>
+                    <a:p>
+                      <a:pPr algn="l"/>
+                      <a:r>
+                        <a:rPr lang="en-US" sz="2000" b="0" i="0">
+                          <a:solidFill>
+                            <a:srgbClr val="000000"/>
+                          </a:solidFill>
+                          <a:latin typeface="Calibri"/>
+                          <a:ea typeface="Calibri"/>
+                          <a:cs typeface="Calibri"/>
+                        </a:rPr>
+                        <a:t>Services</a:t>
+                      </a:r>
+                    </a:p>
+                  </a:txBody>
+                </a:tc>
+                <a:tc>
+                  <a:tcPr marL="91440" marR="91440" marT="45720" marB="45720" anchor="ctr" anchorCtr="0">
+                    <a:solidFill>
+                      <a:srgbClr val="F2F2F2"/>
+                    </a:solidFill>
+                  </a:tcPr>
+                  <a:txBody>
+                    <a:bodyPr rot="0" vert="horz" anchor="ctr" anchorCtr="0" wrap="square"/>
+                    <a:lstStyle/>
+                    <a:p>
+                      <a:pPr algn="r"/>
+                      <a:r>
+                        <a:rPr lang="en-US" sz="2000" b="0" i="0">
+                          <a:solidFill>
+                            <a:srgbClr val="2E7D32"/>
+                          </a:solidFill>
+                          <a:latin typeface="Calibri"/>
+                          <a:ea typeface="Calibri"/>
+                          <a:cs typeface="Calibri"/>
+                        </a:rPr>
+                        <a:t>$890,000</a:t>
+                      </a:r>
+                    </a:p>
+                  </a:txBody>
+                </a:tc>
+                <a:tc>
+                  <a:tcPr marL="91440" marR="91440" marT="45720" marB="45720" anchor="ctr" anchorCtr="0">
+                    <a:solidFill>
+                      <a:srgbClr val="F2F2F2"/>
+                    </a:solidFill>
+                  </a:tcPr>
+                  <a:txBody>
+                    <a:bodyPr rot="0" vert="horz" anchor="ctr" anchorCtr="0" wrap="square"/>
+                    <a:lstStyle/>
+                    <a:p>
+                      <a:pPr algn="r"/>
+                      <a:r>
+                        <a:rPr lang="en-US" sz="2000" b="0" i="0">
+                          <a:solidFill>
+                            <a:srgbClr val="C62828"/>
+                          </a:solidFill>
+                          <a:latin typeface="Calibri"/>
+                          <a:ea typeface="Calibri"/>
+                          <a:cs typeface="Calibri"/>
+                        </a:rPr>
+                        <a:t>$320,000</a:t>
+                      </a:r>
+                    </a:p>
+                  </a:txBody>
+                </a:tc>
+                <a:tc>
+                  <a:tcPr marL="91440" marR="91440" marT="45720" marB="45720" anchor="ctr" anchorCtr="0">
+                    <a:solidFill>
+                      <a:srgbClr val="F2F2F2"/>
+                    </a:solidFill>
+                  </a:tcPr>
+                  <a:txBody>
+                    <a:bodyPr rot="0" vert="horz" anchor="ctr" anchorCtr="0" wrap="square"/>
+                    <a:lstStyle/>
+                    <a:p>
+                      <a:pPr algn="r"/>
+                      <a:r>
+                        <a:rPr lang="en-US" sz="2000" b="1" i="0">
+                          <a:solidFill>
+                            <a:srgbClr val="2E7D32"/>
+                          </a:solidFill>
+                          <a:latin typeface="Calibri"/>
+                          <a:ea typeface="Calibri"/>
+                          <a:cs typeface="Calibri"/>
+                        </a:rPr>
+                        <a:t>$570,000</a:t>
+                      </a:r>
+                    </a:p>
+                  </a:txBody>
+                </a:tc>
+              </a:tr>
+              <a:tr h="400000">
+                <a:tc>
+                  <a:tcPr marL="91440" marR="91440" marT="45720" marB="45720" anchor="ctr" anchorCtr="0">
+                    <a:solidFill>
+                      <a:srgbClr val="E7E6E6"/>
+                    </a:solidFill>
+                  </a:tcPr>
+                  <a:txBody>
+                    <a:bodyPr rot="0" vert="horz" anchor="ctr" anchorCtr="0" wrap="square"/>
+                    <a:lstStyle/>
+                    <a:p>
+                      <a:pPr algn="l"/>
+                      <a:r>
+                        <a:rPr lang="en-US" sz="2000" b="1" i="0">
+                          <a:solidFill>
+                            <a:srgbClr val="000000"/>
+                          </a:solidFill>
+                          <a:latin typeface="Calibri"/>
+                          <a:ea typeface="Calibri"/>
+                          <a:cs typeface="Calibri"/>
+                        </a:rPr>
+                        <a:t>Total</a:t>
+                      </a:r>
+                    </a:p>
+                  </a:txBody>
+                </a:tc>
+                <a:tc>
+                  <a:tcPr marL="91440" marR="91440" marT="45720" marB="45720" anchor="ctr" anchorCtr="0">
+                    <a:solidFill>
+                      <a:srgbClr val="E7E6E6"/>
+                    </a:solidFill>
+                  </a:tcPr>
+                  <a:txBody>
+                    <a:bodyPr rot="0" vert="horz" anchor="ctr" anchorCtr="0" wrap="square"/>
+                    <a:lstStyle/>
+                    <a:p>
+                      <a:pPr algn="r"/>
+                      <a:r>
+                        <a:rPr lang="en-US" sz="2000" b="1" i="0">
+                          <a:solidFill>
+                            <a:srgbClr val="000000"/>
+                          </a:solidFill>
+                          <a:latin typeface="Calibri"/>
+                          <a:ea typeface="Calibri"/>
+                          <a:cs typeface="Calibri"/>
+                        </a:rPr>
+                        <a:t>$2,140,000</a:t>
+                      </a:r>
+                    </a:p>
+                  </a:txBody>
+                </a:tc>
+                <a:tc>
+                  <a:tcPr marL="91440" marR="91440" marT="45720" marB="45720" anchor="ctr" anchorCtr="0">
+                    <a:solidFill>
+                      <a:srgbClr val="E7E6E6"/>
+                    </a:solidFill>
+                  </a:tcPr>
+                  <a:txBody>
+                    <a:bodyPr rot="0" vert="horz" anchor="ctr" anchorCtr="0" wrap="square"/>
+                    <a:lstStyle/>
+                    <a:p>
+                      <a:pPr algn="r"/>
+                      <a:r>
+                        <a:rPr lang="en-US" sz="2000" b="1" i="0">
+                          <a:solidFill>
+                            <a:srgbClr val="000000"/>
+                          </a:solidFill>
+                          <a:latin typeface="Calibri"/>
+                          <a:ea typeface="Calibri"/>
+                          <a:cs typeface="Calibri"/>
+                        </a:rPr>
+                        <a:t>$770,000</a:t>
+                      </a:r>
+                    </a:p>
+                  </a:txBody>
+                </a:tc>
+                <a:tc>
+                  <a:tcPr marL="91440" marR="91440" marT="45720" marB="45720" anchor="ctr" anchorCtr="0">
+                    <a:solidFill>
+                      <a:srgbClr val="C6EFCE"/>
+                    </a:solidFill>
+                  </a:tcPr>
+                  <a:txBody>
+                    <a:bodyPr rot="0" vert="horz" anchor="ctr" anchorCtr="0" wrap="square"/>
+                    <a:lstStyle/>
+                    <a:p>
+                      <a:pPr algn="r"/>
+                      <a:r>
+                        <a:rPr lang="en-US" sz="2000" b="1" i="0">
+                          <a:solidFill>
+                            <a:srgbClr val="006100"/>
+                          </a:solidFill>
+                          <a:latin typeface="Calibri"/>
+                          <a:ea typeface="Calibri"/>
+                          <a:cs typeface="Calibri"/>
+                        </a:rPr>
+                        <a:t>$1,370,000</a:t>
+                      </a:r>
+                    </a:p>
+                  </a:txBody>
+                </a:tc>
+              </a:tr>
+            </a:tbl>
+          </a:graphicData>
+        </a:graphic>
+      </p:graphicFrame>
+    </p:spTree>
+  </p:cSld>
+  <p:clrMapOvr>
+    <a:masterClrMapping/>
+  </p:clrMapOvr>
+</p:sld>
+</file>
+
+<file path=ppt/slides/slide12.xml><?xml version="1.0" encoding="utf-8"?>
+<p:sld xmlns:a="http://schemas.openxmlformats.org/drawingml/2006/main" xmlns:r="http://schemas.openxmlformats.org/officeDocument/2006/relationships" xmlns:p="http://schemas.openxmlformats.org/presentationml/2006/main">
+  <p:cSld>
+    <p:bg>
+      <p:bgRef idx="1001">
+        <a:schemeClr val="bg1"/>
+      </p:bgRef>
+    </p:bg>
+    <p:spTree>
+      <p:nvGrpSpPr>
+        <p:cNvPr id="1" name=""/>
+        <p:cNvGrpSpPr/>
+        <p:nvPr/>
+      </p:nvGrpSpPr>
+      <p:grpSpPr>
+        <a:xfrm>
+          <a:off x="0" y="0"/>
+          <a:ext cx="9144000" cy="6858000"/>
+          <a:chOff x="0" y="0"/>
+          <a:chExt cx="9144000" cy="6858000"/>
+        </a:xfrm>
+      </p:grpSpPr>
+      <p:sp>
+        <p:nvSpPr>
+          <p:cNvPr id="2" name="Title"/>
+          <p:cNvSpPr txBox="1"/>
+          <p:nvPr/>
+        </p:nvSpPr>
+        <p:spPr>
+          <a:xfrm>
+            <a:off x="457200" y="274638"/>
+            <a:ext cx="8230200" cy="1143000"/>
+          </a:xfrm>
+          <a:prstGeom prst="rect">
+            <a:avLst/>
+          </a:prstGeom>
+          <a:noFill/>
+        </p:spPr>
+        <p:txBody>
+          <a:bodyPr wrap="square" rtlCol="0" anchor="ctr"/>
+          <a:lstStyle/>
+          <a:p>
+            <a:pPr algn="l"/>
+            <a:r>
+              <a:rPr lang="en-US" sz="4400" b="1" i="0" dirty="0">
+                <a:solidFill>
+                  <a:srgbClr val="4472C4"/>
+                </a:solidFill>
+              </a:rPr>
+              <a:t>Pricing Comparison Matrix</a:t>
+            </a:r>
+          </a:p>
+        </p:txBody>
+      </p:sp>
+      <p:graphicFrame>
+        <p:nvGraphicFramePr>
+          <p:cNvPr id="3" name="Table 3"/>
+          <p:cNvGraphicFramePr/>
+          <p:nvPr/>
+        </p:nvGraphicFramePr>
+        <p:xfrm>
+          <a:off x="500000" y="1600000"/>
+          <a:ext cx="6500000" cy="2400000"/>
+        </p:xfrm>
+        <a:graphic>
+          <a:graphicData uri="http://schemas.openxmlformats.org/drawingml/2006/table">
+            <a:tbl>
+              <a:tblPr firstRow="1" bandHVals="1"/>
+              <a:tblGrid>
+                <a:gridCol w="2000000"/>
+                <a:gridCol w="1500000"/>
+                <a:gridCol w="1500000"/>
+                <a:gridCol w="1500000"/>
+              </a:tblGrid>
+              <a:tr h="400000">
+                <a:tc>
+                  <a:tcPr marL="91440" marR="91440" marT="45720" marB="45720" anchor="ctr" anchorCtr="0">
+                    <a:solidFill>
+                      <a:srgbClr val="4472C4"/>
+                    </a:solidFill>
+                  </a:tcPr>
+                  <a:txBody>
+                    <a:bodyPr rot="0" vert="horz" anchor="ctr" anchorCtr="0" wrap="square"/>
+                    <a:lstStyle/>
+                    <a:p>
+                      <a:pPr algn="ctr"/>
+                      <a:r>
+                        <a:rPr lang="en-US" sz="2000" b="1" i="0">
+                          <a:solidFill>
+                            <a:srgbClr val="FFFFFF"/>
+                          </a:solidFill>
+                          <a:latin typeface="Calibri"/>
+                          <a:ea typeface="Calibri"/>
+                          <a:cs typeface="Calibri"/>
+                        </a:rPr>
+                        <a:t>Feature</a:t>
+                      </a:r>
+                    </a:p>
+                  </a:txBody>
+                </a:tc>
+                <a:tc>
+                  <a:tcPr marL="91440" marR="91440" marT="45720" marB="45720" anchor="ctr" anchorCtr="0">
+                    <a:solidFill>
+                      <a:srgbClr val="4472C4"/>
+                    </a:solidFill>
+                  </a:tcPr>
+                  <a:txBody>
+                    <a:bodyPr rot="0" vert="horz" anchor="ctr" anchorCtr="0" wrap="square"/>
+                    <a:lstStyle/>
+                    <a:p>
+                      <a:pPr algn="ctr"/>
+                      <a:r>
+                        <a:rPr lang="en-US" sz="2000" b="1" i="0">
+                          <a:solidFill>
+                            <a:srgbClr val="FFFFFF"/>
+                          </a:solidFill>
+                          <a:latin typeface="Calibri"/>
+                          <a:ea typeface="Calibri"/>
+                          <a:cs typeface="Calibri"/>
+                        </a:rPr>
+                        <a:t>Basic</a:t>
+                      </a:r>
+                    </a:p>
+                  </a:txBody>
+                </a:tc>
+                <a:tc>
+                  <a:tcPr marL="91440" marR="91440" marT="45720" marB="45720" anchor="ctr" anchorCtr="0">
+                    <a:solidFill>
+                      <a:srgbClr val="4472C4"/>
+                    </a:solidFill>
+                  </a:tcPr>
+                  <a:txBody>
+                    <a:bodyPr rot="0" vert="horz" anchor="ctr" anchorCtr="0" wrap="square"/>
+                    <a:lstStyle/>
+                    <a:p>
+                      <a:pPr algn="ctr"/>
+                      <a:r>
+                        <a:rPr lang="en-US" sz="2000" b="1" i="0">
+                          <a:solidFill>
+                            <a:srgbClr val="FFFFFF"/>
+                          </a:solidFill>
+                          <a:latin typeface="Calibri"/>
+                          <a:ea typeface="Calibri"/>
+                          <a:cs typeface="Calibri"/>
+                        </a:rPr>
+                        <a:t>Pro</a:t>
+                      </a:r>
+                    </a:p>
+                  </a:txBody>
+                </a:tc>
+                <a:tc>
+                  <a:tcPr marL="91440" marR="91440" marT="45720" marB="45720" anchor="ctr" anchorCtr="0">
+                    <a:solidFill>
+                      <a:srgbClr val="4472C4"/>
+                    </a:solidFill>
+                  </a:tcPr>
+                  <a:txBody>
+                    <a:bodyPr rot="0" vert="horz" anchor="ctr" anchorCtr="0" wrap="square"/>
+                    <a:lstStyle/>
+                    <a:p>
+                      <a:pPr algn="ctr"/>
+                      <a:r>
+                        <a:rPr lang="en-US" sz="2000" b="1" i="0">
+                          <a:solidFill>
+                            <a:srgbClr val="FFFFFF"/>
+                          </a:solidFill>
+                          <a:latin typeface="Calibri"/>
+                          <a:ea typeface="Calibri"/>
+                          <a:cs typeface="Calibri"/>
+                        </a:rPr>
+                        <a:t>Enterprise</a:t>
+                      </a:r>
+                    </a:p>
+                  </a:txBody>
+                </a:tc>
+              </a:tr>
+              <a:tr h="400000">
+                <a:tc>
+                  <a:tcPr marL="91440" marR="91440" marT="45720" marB="45720" anchor="ctr" anchorCtr="0">
+                    <a:solidFill>
+                      <a:srgbClr val="F2F2F2"/>
+                    </a:solidFill>
+                  </a:tcPr>
+                  <a:txBody>
+                    <a:bodyPr rot="0" vert="horz" anchor="ctr" anchorCtr="0" wrap="square"/>
+                    <a:lstStyle/>
+                    <a:p>
+                      <a:pPr algn="ctr"/>
+                      <a:r>
+                        <a:rPr lang="en-US" sz="2000" b="0" i="0">
+                          <a:solidFill>
+                            <a:srgbClr val="000000"/>
+                          </a:solidFill>
+                          <a:latin typeface="Calibri"/>
+                          <a:ea typeface="Calibri"/>
+                          <a:cs typeface="Calibri"/>
+                        </a:rPr>
+                        <a:t>Storage</a:t>
+                      </a:r>
+                    </a:p>
+                  </a:txBody>
+                </a:tc>
+                <a:tc>
+                  <a:tcPr marL="91440" marR="91440" marT="45720" marB="45720" anchor="ctr" anchorCtr="0">
+                    <a:solidFill>
+                      <a:srgbClr val="F2F2F2"/>
+                    </a:solidFill>
+                  </a:tcPr>
+                  <a:txBody>
+                    <a:bodyPr rot="0" vert="horz" anchor="ctr" anchorCtr="0" wrap="square"/>
+                    <a:lstStyle/>
+                    <a:p>
+                      <a:pPr algn="ctr"/>
+                      <a:r>
+                        <a:rPr lang="en-US" sz="2000" b="0" i="0">
+                          <a:solidFill>
+                            <a:srgbClr val="000000"/>
+                          </a:solidFill>
+                          <a:latin typeface="Calibri"/>
+                          <a:ea typeface="Calibri"/>
+                          <a:cs typeface="Calibri"/>
+                        </a:rPr>
+                        <a:t>5 GB</a:t>
+                      </a:r>
+                    </a:p>
+                  </a:txBody>
+                </a:tc>
+                <a:tc>
+                  <a:tcPr marL="91440" marR="91440" marT="45720" marB="45720" anchor="ctr" anchorCtr="0">
+                    <a:solidFill>
+                      <a:srgbClr val="F2F2F2"/>
+                    </a:solidFill>
+                  </a:tcPr>
+                  <a:txBody>
+                    <a:bodyPr rot="0" vert="horz" anchor="ctr" anchorCtr="0" wrap="square"/>
+                    <a:lstStyle/>
+                    <a:p>
+                      <a:pPr algn="ctr"/>
+                      <a:r>
+                        <a:rPr lang="en-US" sz="2000" b="0" i="0">
+                          <a:solidFill>
+                            <a:srgbClr val="000000"/>
+                          </a:solidFill>
+                          <a:latin typeface="Calibri"/>
+                          <a:ea typeface="Calibri"/>
+                          <a:cs typeface="Calibri"/>
+                        </a:rPr>
+                        <a:t>50 GB</a:t>
+                      </a:r>
+                    </a:p>
+                  </a:txBody>
+                </a:tc>
+                <a:tc>
+                  <a:tcPr marL="91440" marR="91440" marT="45720" marB="45720" anchor="ctr" anchorCtr="0">
+                    <a:solidFill>
+                      <a:srgbClr val="F2F2F2"/>
+                    </a:solidFill>
+                  </a:tcPr>
+                  <a:txBody>
+                    <a:bodyPr rot="0" vert="horz" anchor="ctr" anchorCtr="0" wrap="square"/>
+                    <a:lstStyle/>
+                    <a:p>
+                      <a:pPr algn="ctr"/>
+                      <a:r>
+                        <a:rPr lang="en-US" sz="2000" b="1" i="0">
+                          <a:solidFill>
+                            <a:srgbClr val="2E7D32"/>
+                          </a:solidFill>
+                          <a:latin typeface="Calibri"/>
+                          <a:ea typeface="Calibri"/>
+                          <a:cs typeface="Calibri"/>
+                        </a:rPr>
+                        <a:t>Unlimited</a:t>
+                      </a:r>
+                    </a:p>
+                  </a:txBody>
+                </a:tc>
+              </a:tr>
+              <a:tr h="400000">
+                <a:tc>
+                  <a:tcPr marL="91440" marR="91440" marT="45720" marB="45720" anchor="ctr" anchorCtr="0">
+                    <a:solidFill>
+                      <a:srgbClr val="F2F2F2"/>
+                    </a:solidFill>
+                  </a:tcPr>
+                  <a:txBody>
+                    <a:bodyPr rot="0" vert="horz" anchor="ctr" anchorCtr="0" wrap="square"/>
+                    <a:lstStyle/>
+                    <a:p>
+                      <a:pPr algn="ctr"/>
+                      <a:r>
+                        <a:rPr lang="en-US" sz="2000" b="0" i="0">
+                          <a:solidFill>
+                            <a:srgbClr val="000000"/>
+                          </a:solidFill>
+                          <a:latin typeface="Calibri"/>
+                          <a:ea typeface="Calibri"/>
+                          <a:cs typeface="Calibri"/>
+                        </a:rPr>
+                        <a:t>Users</a:t>
+                      </a:r>
+                    </a:p>
+                  </a:txBody>
+                </a:tc>
+                <a:tc>
+                  <a:tcPr marL="91440" marR="91440" marT="45720" marB="45720" anchor="ctr" anchorCtr="0">
+                    <a:solidFill>
+                      <a:srgbClr val="F2F2F2"/>
+                    </a:solidFill>
+                  </a:tcPr>
+                  <a:txBody>
+                    <a:bodyPr rot="0" vert="horz" anchor="ctr" anchorCtr="0" wrap="square"/>
+                    <a:lstStyle/>
+                    <a:p>
+                      <a:pPr algn="ctr"/>
+                      <a:r>
+                        <a:rPr lang="en-US" sz="2000" b="0" i="0">
+                          <a:solidFill>
+                            <a:srgbClr val="000000"/>
+                          </a:solidFill>
+                          <a:latin typeface="Calibri"/>
+                          <a:ea typeface="Calibri"/>
+                          <a:cs typeface="Calibri"/>
+                        </a:rPr>
+                        <a:t>1</a:t>
+                      </a:r>
+                    </a:p>
+                  </a:txBody>
+                </a:tc>
+                <a:tc>
+                  <a:tcPr marL="91440" marR="91440" marT="45720" marB="45720" anchor="ctr" anchorCtr="0">
+                    <a:solidFill>
+                      <a:srgbClr val="F2F2F2"/>
+                    </a:solidFill>
+                  </a:tcPr>
+                  <a:txBody>
+                    <a:bodyPr rot="0" vert="horz" anchor="ctr" anchorCtr="0" wrap="square"/>
+                    <a:lstStyle/>
+                    <a:p>
+                      <a:pPr algn="ctr"/>
+                      <a:r>
+                        <a:rPr lang="en-US" sz="2000" b="0" i="0">
+                          <a:solidFill>
+                            <a:srgbClr val="000000"/>
+                          </a:solidFill>
+                          <a:latin typeface="Calibri"/>
+                          <a:ea typeface="Calibri"/>
+                          <a:cs typeface="Calibri"/>
+                        </a:rPr>
+                        <a:t>10</a:t>
+                      </a:r>
+                    </a:p>
+                  </a:txBody>
+                </a:tc>
+                <a:tc>
+                  <a:tcPr marL="91440" marR="91440" marT="45720" marB="45720" anchor="ctr" anchorCtr="0">
+                    <a:solidFill>
+                      <a:srgbClr val="F2F2F2"/>
+                    </a:solidFill>
+                  </a:tcPr>
+                  <a:txBody>
+                    <a:bodyPr rot="0" vert="horz" anchor="ctr" anchorCtr="0" wrap="square"/>
+                    <a:lstStyle/>
+                    <a:p>
+                      <a:pPr algn="ctr"/>
+                      <a:r>
+                        <a:rPr lang="en-US" sz="2000" b="1" i="0">
+                          <a:solidFill>
+                            <a:srgbClr val="2E7D32"/>
+                          </a:solidFill>
+                          <a:latin typeface="Calibri"/>
+                          <a:ea typeface="Calibri"/>
+                          <a:cs typeface="Calibri"/>
+                        </a:rPr>
+                        <a:t>Unlimited</a:t>
+                      </a:r>
+                    </a:p>
+                  </a:txBody>
+                </a:tc>
+              </a:tr>
+              <a:tr h="400000">
+                <a:tc>
+                  <a:tcPr marL="91440" marR="91440" marT="45720" marB="45720" anchor="ctr" anchorCtr="0">
+                    <a:solidFill>
+                      <a:srgbClr val="F2F2F2"/>
+                    </a:solidFill>
+                  </a:tcPr>
+                  <a:txBody>
+                    <a:bodyPr rot="0" vert="horz" anchor="ctr" anchorCtr="0" wrap="square"/>
+                    <a:lstStyle/>
+                    <a:p>
+                      <a:pPr algn="ctr"/>
+                      <a:r>
+                        <a:rPr lang="en-US" sz="2000" b="0" i="0">
+                          <a:solidFill>
+                            <a:srgbClr val="000000"/>
+                          </a:solidFill>
+                          <a:latin typeface="Calibri"/>
+                          <a:ea typeface="Calibri"/>
+                          <a:cs typeface="Calibri"/>
+                        </a:rPr>
+                        <a:t>Support</a:t>
+                      </a:r>
+                    </a:p>
+                  </a:txBody>
+                </a:tc>
+                <a:tc>
+                  <a:tcPr marL="91440" marR="91440" marT="45720" marB="45720" anchor="ctr" anchorCtr="0">
+                    <a:solidFill>
+                      <a:srgbClr val="F2F2F2"/>
+                    </a:solidFill>
+                  </a:tcPr>
+                  <a:txBody>
+                    <a:bodyPr rot="0" vert="horz" anchor="ctr" anchorCtr="0" wrap="square"/>
+                    <a:lstStyle/>
+                    <a:p>
+                      <a:pPr algn="ctr"/>
+                      <a:r>
+                        <a:rPr lang="en-US" sz="2000" b="0" i="0">
+                          <a:solidFill>
+                            <a:srgbClr val="000000"/>
+                          </a:solidFill>
+                          <a:latin typeface="Calibri"/>
+                          <a:ea typeface="Calibri"/>
+                          <a:cs typeface="Calibri"/>
+                        </a:rPr>
+                        <a:t>Email</a:t>
+                      </a:r>
+                    </a:p>
+                  </a:txBody>
+                </a:tc>
+                <a:tc>
+                  <a:tcPr marL="91440" marR="91440" marT="45720" marB="45720" anchor="ctr" anchorCtr="0">
+                    <a:solidFill>
+                      <a:srgbClr val="F2F2F2"/>
+                    </a:solidFill>
+                  </a:tcPr>
+                  <a:txBody>
+                    <a:bodyPr rot="0" vert="horz" anchor="ctr" anchorCtr="0" wrap="square"/>
+                    <a:lstStyle/>
+                    <a:p>
+                      <a:pPr algn="ctr"/>
+                      <a:r>
+                        <a:rPr lang="en-US" sz="2000" b="0" i="0">
+                          <a:solidFill>
+                            <a:srgbClr val="000000"/>
+                          </a:solidFill>
+                          <a:latin typeface="Calibri"/>
+                          <a:ea typeface="Calibri"/>
+                          <a:cs typeface="Calibri"/>
+                        </a:rPr>
+                        <a:t>24/7 Chat</a:t>
+                      </a:r>
+                    </a:p>
+                  </a:txBody>
+                </a:tc>
+                <a:tc>
+                  <a:tcPr marL="91440" marR="91440" marT="45720" marB="45720" anchor="ctr" anchorCtr="0">
+                    <a:solidFill>
+                      <a:srgbClr val="F2F2F2"/>
+                    </a:solidFill>
+                  </a:tcPr>
+                  <a:txBody>
+                    <a:bodyPr rot="0" vert="horz" anchor="ctr" anchorCtr="0" wrap="square"/>
+                    <a:lstStyle/>
+                    <a:p>
+                      <a:pPr algn="ctr"/>
+                      <a:r>
+                        <a:rPr lang="en-US" sz="2000" b="1" i="0">
+                          <a:solidFill>
+                            <a:srgbClr val="2E7D32"/>
+                          </a:solidFill>
+                          <a:latin typeface="Calibri"/>
+                          <a:ea typeface="Calibri"/>
+                          <a:cs typeface="Calibri"/>
+                        </a:rPr>
+                        <a:t>Dedicated</a:t>
+                      </a:r>
+                    </a:p>
+                  </a:txBody>
+                </a:tc>
+              </a:tr>
+              <a:tr h="400000">
+                <a:tc>
+                  <a:tcPr marL="91440" marR="91440" marT="45720" marB="45720" anchor="ctr" anchorCtr="0">
+                    <a:solidFill>
+                      <a:srgbClr val="F2F2F2"/>
+                    </a:solidFill>
+                  </a:tcPr>
+                  <a:txBody>
+                    <a:bodyPr rot="0" vert="horz" anchor="ctr" anchorCtr="0" wrap="square"/>
+                    <a:lstStyle/>
+                    <a:p>
+                      <a:pPr algn="ctr"/>
+                      <a:r>
+                        <a:rPr lang="en-US" sz="2000" b="0" i="0">
+                          <a:solidFill>
+                            <a:srgbClr val="000000"/>
+                          </a:solidFill>
+                          <a:latin typeface="Calibri"/>
+                          <a:ea typeface="Calibri"/>
+                          <a:cs typeface="Calibri"/>
+                        </a:rPr>
+                        <a:t>API Access</a:t>
+                      </a:r>
+                    </a:p>
+                  </a:txBody>
+                </a:tc>
+                <a:tc>
+                  <a:tcPr marL="91440" marR="91440" marT="45720" marB="45720" anchor="ctr" anchorCtr="0">
+                    <a:solidFill>
+                      <a:srgbClr val="F2F2F2"/>
+                    </a:solidFill>
+                  </a:tcPr>
+                  <a:txBody>
+                    <a:bodyPr rot="0" vert="horz" anchor="ctr" anchorCtr="0" wrap="square"/>
+                    <a:lstStyle/>
+                    <a:p>
+                      <a:pPr algn="ctr"/>
+                      <a:r>
+                        <a:rPr lang="en-US" sz="2000" b="0" i="0">
+                          <a:solidFill>
+                            <a:srgbClr val="C62828"/>
+                          </a:solidFill>
+                          <a:latin typeface="Calibri"/>
+                          <a:ea typeface="Calibri"/>
+                          <a:cs typeface="Calibri"/>
+                        </a:rPr>
+                        <a:t>No</a:t>
+                      </a:r>
+                    </a:p>
+                  </a:txBody>
+                </a:tc>
+                <a:tc>
+                  <a:tcPr marL="91440" marR="91440" marT="45720" marB="45720" anchor="ctr" anchorCtr="0">
+                    <a:solidFill>
+                      <a:srgbClr val="F2F2F2"/>
+                    </a:solidFill>
+                  </a:tcPr>
+                  <a:txBody>
+                    <a:bodyPr rot="0" vert="horz" anchor="ctr" anchorCtr="0" wrap="square"/>
+                    <a:lstStyle/>
+                    <a:p>
+                      <a:pPr algn="ctr"/>
+                      <a:r>
+                        <a:rPr lang="en-US" sz="2000" b="0" i="0">
+                          <a:solidFill>
+                            <a:srgbClr val="2E7D32"/>
+                          </a:solidFill>
+                          <a:latin typeface="Calibri"/>
+                          <a:ea typeface="Calibri"/>
+                          <a:cs typeface="Calibri"/>
+                        </a:rPr>
+                        <a:t>Yes</a:t>
+                      </a:r>
+                    </a:p>
+                  </a:txBody>
+                </a:tc>
+                <a:tc>
+                  <a:tcPr marL="91440" marR="91440" marT="45720" marB="45720" anchor="ctr" anchorCtr="0">
+                    <a:solidFill>
+                      <a:srgbClr val="F2F2F2"/>
+                    </a:solidFill>
+                  </a:tcPr>
+                  <a:txBody>
+                    <a:bodyPr rot="0" vert="horz" anchor="ctr" anchorCtr="0" wrap="square"/>
+                    <a:lstStyle/>
+                    <a:p>
+                      <a:pPr algn="ctr"/>
+                      <a:r>
+                        <a:rPr lang="en-US" sz="2000" b="1" i="0">
+                          <a:solidFill>
+                            <a:srgbClr val="2E7D32"/>
+                          </a:solidFill>
+                          <a:latin typeface="Calibri"/>
+                          <a:ea typeface="Calibri"/>
+                          <a:cs typeface="Calibri"/>
+                        </a:rPr>
+                        <a:t>Yes + Priority</a:t>
+                      </a:r>
+                    </a:p>
+                  </a:txBody>
+                </a:tc>
+              </a:tr>
+              <a:tr h="400000">
+                <a:tc>
+                  <a:tcPr marL="91440" marR="91440" marT="45720" marB="45720" anchor="ctr" anchorCtr="0">
+                    <a:solidFill>
+                      <a:srgbClr val="F2F2F2"/>
+                    </a:solidFill>
+                  </a:tcPr>
+                  <a:txBody>
+                    <a:bodyPr rot="0" vert="horz" anchor="ctr" anchorCtr="0" wrap="square"/>
+                    <a:lstStyle/>
+                    <a:p>
+                      <a:pPr algn="ctr"/>
+                      <a:r>
+                        <a:rPr lang="en-US" sz="2000" b="1" i="0">
+                          <a:solidFill>
+                            <a:srgbClr val="000000"/>
+                          </a:solidFill>
+                          <a:latin typeface="Calibri"/>
+                          <a:ea typeface="Calibri"/>
+                          <a:cs typeface="Calibri"/>
+                        </a:rPr>
+                        <a:t>Price/month</a:t>
+                      </a:r>
+                    </a:p>
+                  </a:txBody>
+                </a:tc>
+                <a:tc>
+                  <a:tcPr marL="91440" marR="91440" marT="45720" marB="45720" anchor="ctr" anchorCtr="0">
+                    <a:solidFill>
+                      <a:srgbClr val="F2F2F2"/>
+                    </a:solidFill>
+                  </a:tcPr>
+                  <a:txBody>
+                    <a:bodyPr rot="0" vert="horz" anchor="ctr" anchorCtr="0" wrap="square"/>
+                    <a:lstStyle/>
+                    <a:p>
+                      <a:pPr algn="ctr"/>
+                      <a:r>
+                        <a:rPr lang="en-US" sz="2000" b="1" i="0">
+                          <a:solidFill>
+                            <a:srgbClr val="000000"/>
+                          </a:solidFill>
+                          <a:latin typeface="Calibri"/>
+                          <a:ea typeface="Calibri"/>
+                          <a:cs typeface="Calibri"/>
+                        </a:rPr>
+                        <a:t>$9</a:t>
+                      </a:r>
+                    </a:p>
+                  </a:txBody>
+                </a:tc>
+                <a:tc>
+                  <a:tcPr marL="91440" marR="91440" marT="45720" marB="45720" anchor="ctr" anchorCtr="0">
+                    <a:solidFill>
+                      <a:srgbClr val="F2F2F2"/>
+                    </a:solidFill>
+                  </a:tcPr>
+                  <a:txBody>
+                    <a:bodyPr rot="0" vert="horz" anchor="ctr" anchorCtr="0" wrap="square"/>
+                    <a:lstStyle/>
+                    <a:p>
+                      <a:pPr algn="ctr"/>
+                      <a:r>
+                        <a:rPr lang="en-US" sz="2000" b="1" i="0">
+                          <a:solidFill>
+                            <a:srgbClr val="000000"/>
+                          </a:solidFill>
+                          <a:latin typeface="Calibri"/>
+                          <a:ea typeface="Calibri"/>
+                          <a:cs typeface="Calibri"/>
+                        </a:rPr>
+                        <a:t>$29</a:t>
+                      </a:r>
+                    </a:p>
+                  </a:txBody>
+                </a:tc>
+                <a:tc>
+                  <a:tcPr marL="91440" marR="91440" marT="45720" marB="45720" anchor="ctr" anchorCtr="0">
+                    <a:solidFill>
+                      <a:srgbClr val="F2F2F2"/>
+                    </a:solidFill>
+                  </a:tcPr>
+                  <a:txBody>
+                    <a:bodyPr rot="0" vert="horz" anchor="ctr" anchorCtr="0" wrap="square"/>
+                    <a:lstStyle/>
+                    <a:p>
+                      <a:pPr algn="ctr"/>
+                      <a:r>
+                        <a:rPr lang="en-US" sz="2000" b="1" i="0">
+                          <a:solidFill>
+                            <a:srgbClr val="000000"/>
+                          </a:solidFill>
+                          <a:latin typeface="Calibri"/>
+                          <a:ea typeface="Calibri"/>
+                          <a:cs typeface="Calibri"/>
+                        </a:rPr>
+                        <a:t>$99</a:t>
+                      </a:r>
+                    </a:p>
+                  </a:txBody>
+                </a:tc>
+              </a:tr>
+            </a:tbl>
+          </a:graphicData>
+        </a:graphic>
+      </p:graphicFrame>
+    </p:spTree>
+  </p:cSld>
+  <p:clrMapOvr>
+    <a:masterClrMapping/>
+  </p:clrMapOvr>
+</p:sld>
+</file>
+
+<file path=ppt/slides/slide13.xml><?xml version="1.0" encoding="utf-8"?>
+<p:sld xmlns:a="http://schemas.openxmlformats.org/drawingml/2006/main" xmlns:r="http://schemas.openxmlformats.org/officeDocument/2006/relationships" xmlns:p="http://schemas.openxmlformats.org/presentationml/2006/main">
+  <p:cSld>
+    <p:bg>
+      <p:bgRef idx="1001">
+        <a:schemeClr val="bg1"/>
+      </p:bgRef>
+    </p:bg>
+    <p:spTree>
+      <p:nvGrpSpPr>
+        <p:cNvPr id="1" name=""/>
+        <p:cNvGrpSpPr/>
+        <p:nvPr/>
+      </p:nvGrpSpPr>
+      <p:grpSpPr>
+        <a:xfrm>
+          <a:off x="0" y="0"/>
+          <a:ext cx="9144000" cy="6858000"/>
+          <a:chOff x="0" y="0"/>
+          <a:chExt cx="9144000" cy="6858000"/>
+        </a:xfrm>
+      </p:grpSpPr>
+      <p:sp>
+        <p:nvSpPr>
+          <p:cNvPr id="2" name="Title"/>
+          <p:cNvSpPr txBox="1"/>
+          <p:nvPr/>
+        </p:nvSpPr>
+        <p:spPr>
+          <a:xfrm>
+            <a:off x="457200" y="274638"/>
+            <a:ext cx="8230200" cy="1143000"/>
+          </a:xfrm>
+          <a:prstGeom prst="rect">
+            <a:avLst/>
+          </a:prstGeom>
+          <a:noFill/>
+        </p:spPr>
+        <p:txBody>
+          <a:bodyPr wrap="square" rtlCol="0" anchor="ctr"/>
+          <a:lstStyle/>
+          <a:p>
+            <a:pPr algn="l"/>
+            <a:r>
+              <a:rPr lang="en-US" sz="4400" b="1" i="0" dirty="0">
+                <a:solidFill>
+                  <a:srgbClr val="1F497D"/>
+                </a:solidFill>
+              </a:rPr>
+              <a:t>Development Process Flow</a:t>
+            </a:r>
+          </a:p>
+        </p:txBody>
+      </p:sp>
+      <p:sp>
+        <p:nvSpPr>
+          <p:cNvPr id="10" name="Shape 10"/>
+          <p:cNvSpPr/>
+          <p:nvPr/>
+        </p:nvSpPr>
+        <p:spPr>
+          <a:xfrm>
+            <a:off x="300000" y="2000000"/>
+            <a:ext cx="1400000" cy="800000"/>
+          </a:xfrm>
+          <a:prstGeom prst="roundRect">
+            <a:avLst/>
+          </a:prstGeom>
+          <a:solidFill>
+            <a:srgbClr val="4472C4"/>
+          </a:solidFill>
+        </p:spPr>
+        <p:txBody>
+          <a:bodyPr wrap="square" rtlCol="0" anchor="ctr"/>
+          <a:lstStyle/>
+          <a:p>
+            <a:pPr algn="ctr"/>
+            <a:r>
+              <a:rPr lang="en-US" sz="1800" dirty="0"/>
+              <a:t>1. Research</a:t>
+            </a:r>
+          </a:p>
+        </p:txBody>
+      </p:sp>
+      <p:sp>
+        <p:nvSpPr>
+          <p:cNvPr id="11" name="Shape 11"/>
+          <p:cNvSpPr/>
+          <p:nvPr/>
+        </p:nvSpPr>
+        <p:spPr>
+          <a:xfrm>
+            <a:off x="1800000" y="2200000"/>
+            <a:ext cx="400000" cy="400000"/>
+          </a:xfrm>
+          <a:prstGeom prst="rightArrow">
+            <a:avLst/>
+          </a:prstGeom>
+          <a:solidFill>
+            <a:srgbClr val="A5A5A5"/>
+          </a:solidFill>
+        </p:spPr>
+        <p:txBody>
+          <a:bodyPr/>
+          <a:lstStyle/>
+          <a:p/>
+        </p:txBody>
+      </p:sp>
+      <p:sp>
+        <p:nvSpPr>
+          <p:cNvPr id="12" name="Shape 12"/>
+          <p:cNvSpPr/>
+          <p:nvPr/>
+        </p:nvSpPr>
+        <p:spPr>
+          <a:xfrm>
+            <a:off x="2300000" y="2000000"/>
+            <a:ext cx="1400000" cy="800000"/>
+          </a:xfrm>
+          <a:prstGeom prst="roundRect">
+            <a:avLst/>
+          </a:prstGeom>
+          <a:solidFill>
+            <a:srgbClr val="ED7D31"/>
+          </a:solidFill>
+        </p:spPr>
+        <p:txBody>
+          <a:bodyPr wrap="square" rtlCol="0" anchor="ctr"/>
+          <a:lstStyle/>
+          <a:p>
+            <a:pPr algn="ctr"/>
+            <a:r>
+              <a:rPr lang="en-US" sz="1800" dirty="0"/>
+              <a:t>2. Design</a:t>
+            </a:r>
+          </a:p>
+        </p:txBody>
+      </p:sp>
+      <p:sp>
+        <p:nvSpPr>
+          <p:cNvPr id="13" name="Shape 13"/>
+          <p:cNvSpPr/>
+          <p:nvPr/>
+        </p:nvSpPr>
+        <p:spPr>
+          <a:xfrm>
+            <a:off x="3800000" y="2200000"/>
+            <a:ext cx="400000" cy="400000"/>
+          </a:xfrm>
+          <a:prstGeom prst="rightArrow">
+            <a:avLst/>
+          </a:prstGeom>
+          <a:solidFill>
+            <a:srgbClr val="A5A5A5"/>
+          </a:solidFill>
+        </p:spPr>
+        <p:txBody>
+          <a:bodyPr/>
+          <a:lstStyle/>
+          <a:p/>
+        </p:txBody>
+      </p:sp>
+      <p:sp>
+        <p:nvSpPr>
+          <p:cNvPr id="14" name="Shape 14"/>
+          <p:cNvSpPr/>
+          <p:nvPr/>
+        </p:nvSpPr>
+        <p:spPr>
+          <a:xfrm>
+            <a:off x="4300000" y="2000000"/>
+            <a:ext cx="1400000" cy="800000"/>
+          </a:xfrm>
+          <a:prstGeom prst="roundRect">
+            <a:avLst/>
+          </a:prstGeom>
+          <a:solidFill>
+            <a:srgbClr val="70AD47"/>
+          </a:solidFill>
+        </p:spPr>
+        <p:txBody>
+          <a:bodyPr wrap="square" rtlCol="0" anchor="ctr"/>
+          <a:lstStyle/>
+          <a:p>
+            <a:pPr algn="ctr"/>
+            <a:r>
+              <a:rPr lang="en-US" sz="1800" dirty="0"/>
+              <a:t>3. Develop</a:t>
+            </a:r>
+          </a:p>
+        </p:txBody>
+      </p:sp>
+      <p:sp>
+        <p:nvSpPr>
+          <p:cNvPr id="15" name="Shape 15"/>
+          <p:cNvSpPr/>
+          <p:nvPr/>
+        </p:nvSpPr>
+        <p:spPr>
+          <a:xfrm>
+            <a:off x="5800000" y="2200000"/>
+            <a:ext cx="400000" cy="400000"/>
+          </a:xfrm>
+          <a:prstGeom prst="rightArrow">
+            <a:avLst/>
+          </a:prstGeom>
+          <a:solidFill>
+            <a:srgbClr val="A5A5A5"/>
+          </a:solidFill>
+        </p:spPr>
+        <p:txBody>
+          <a:bodyPr/>
+          <a:lstStyle/>
+          <a:p/>
+        </p:txBody>
+      </p:sp>
+      <p:sp>
+        <p:nvSpPr>
+          <p:cNvPr id="16" name="Shape 16"/>
+          <p:cNvSpPr/>
+          <p:nvPr/>
+        </p:nvSpPr>
+        <p:spPr>
+          <a:xfrm>
+            <a:off x="6300000" y="2000000"/>
+            <a:ext cx="1400000" cy="800000"/>
+          </a:xfrm>
+          <a:prstGeom prst="roundRect">
+            <a:avLst/>
+          </a:prstGeom>
+          <a:solidFill>
+            <a:srgbClr val="5B9BD5"/>
+          </a:solidFill>
+        </p:spPr>
+        <p:txBody>
+          <a:bodyPr wrap="square" rtlCol="0" anchor="ctr"/>
+          <a:lstStyle/>
+          <a:p>
+            <a:pPr algn="ctr"/>
+            <a:r>
+              <a:rPr lang="en-US" sz="1800" dirty="0"/>
+              <a:t>4. Deploy</a:t>
+            </a:r>
+          </a:p>
+        </p:txBody>
+      </p:sp>
+    </p:spTree>
+  </p:cSld>
+  <p:clrMapOvr>
+    <a:masterClrMapping/>
+  </p:clrMapOvr>
+</p:sld>
+</file>
+
+<file path=ppt/slides/slide14.xml><?xml version="1.0" encoding="utf-8"?>
+<p:sld xmlns:a="http://schemas.openxmlformats.org/drawingml/2006/main" xmlns:r="http://schemas.openxmlformats.org/officeDocument/2006/relationships" xmlns:p="http://schemas.openxmlformats.org/presentationml/2006/main">
+  <p:cSld>
+    <p:bg>
+      <p:bgRef idx="1001">
+        <a:schemeClr val="bg1"/>
+      </p:bgRef>
+    </p:bg>
+    <p:spTree>
+      <p:nvGrpSpPr>
+        <p:cNvPr id="1" name=""/>
+        <p:cNvGrpSpPr/>
+        <p:nvPr/>
+      </p:nvGrpSpPr>
+      <p:grpSpPr>
+        <a:xfrm>
+          <a:off x="0" y="0"/>
+          <a:ext cx="9144000" cy="6858000"/>
+          <a:chOff x="0" y="0"/>
+          <a:chExt cx="9144000" cy="6858000"/>
+        </a:xfrm>
+      </p:grpSpPr>
+      <p:sp>
+        <p:nvSpPr>
+          <p:cNvPr id="2" name="Title"/>
+          <p:cNvSpPr txBox="1"/>
+          <p:nvPr/>
+        </p:nvSpPr>
+        <p:spPr>
+          <a:xfrm>
+            <a:off x="457200" y="274638"/>
+            <a:ext cx="8230200" cy="1143000"/>
+          </a:xfrm>
+          <a:prstGeom prst="rect">
+            <a:avLst/>
+          </a:prstGeom>
+          <a:noFill/>
+        </p:spPr>
+        <p:txBody>
+          <a:bodyPr wrap="square" rtlCol="0" anchor="ctr"/>
+          <a:lstStyle/>
+          <a:p>
+            <a:pPr algn="l"/>
+            <a:r>
+              <a:rPr lang="en-US" sz="4400" b="1" i="0" dirty="0">
+                <a:solidFill>
+                  <a:srgbClr val="1F4E79"/>
+                </a:solidFill>
+              </a:rPr>
+              <a:t>Organization Structure</a:t>
+            </a:r>
+          </a:p>
+        </p:txBody>
+      </p:sp>
+      <p:sp>
+        <p:nvSpPr>
+          <p:cNvPr id="10" name="Shape 10"/>
+          <p:cNvSpPr/>
+          <p:nvPr/>
+        </p:nvSpPr>
+        <p:spPr>
+          <a:xfrm>
+            <a:off x="3500000" y="1400000"/>
+            <a:ext cx="2000000" cy="600000"/>
+          </a:xfrm>
+          <a:prstGeom prst="roundRect">
+            <a:avLst/>
+          </a:prstGeom>
+          <a:solidFill>
+            <a:srgbClr val="1F4E79"/>
+          </a:solidFill>
+        </p:spPr>
+        <p:txBody>
+          <a:bodyPr wrap="square" rtlCol="0" anchor="ctr"/>
+          <a:lstStyle/>
+          <a:p>
+            <a:pPr algn="ctr"/>
+            <a:r>
+              <a:rPr lang="en-US" sz="1800" dirty="0"/>
+              <a:t>CEO</a:t>
+            </a:r>
+          </a:p>
+        </p:txBody>
+      </p:sp>
+      <p:sp>
+        <p:nvSpPr>
+          <p:cNvPr id="11" name="Shape 11"/>
+          <p:cNvSpPr/>
+          <p:nvPr/>
+        </p:nvSpPr>
+        <p:spPr>
+          <a:xfrm>
+            <a:off x="4450000" y="2000000"/>
+            <a:ext cx="100000" cy="400000"/>
+          </a:xfrm>
+          <a:prstGeom prst="rect">
+            <a:avLst/>
+          </a:prstGeom>
+          <a:solidFill>
+            <a:srgbClr val="A5A5A5"/>
+          </a:solidFill>
+        </p:spPr>
+        <p:txBody>
+          <a:bodyPr/>
+          <a:lstStyle/>
+          <a:p/>
+        </p:txBody>
+      </p:sp>
+      <p:sp>
+        <p:nvSpPr>
+          <p:cNvPr id="12" name="Shape 12"/>
+          <p:cNvSpPr/>
+          <p:nvPr/>
+        </p:nvSpPr>
+        <p:spPr>
+          <a:xfrm>
+            <a:off x="1950000" y="2400000"/>
+            <a:ext cx="5100000" cy="50000"/>
+          </a:xfrm>
+          <a:prstGeom prst="rect">
+            <a:avLst/>
+          </a:prstGeom>
+          <a:solidFill>
+            <a:srgbClr val="A5A5A5"/>
+          </a:solidFill>
+        </p:spPr>
+        <p:txBody>
+          <a:bodyPr/>
+          <a:lstStyle/>
+          <a:p/>
+        </p:txBody>
+      </p:sp>
+      <p:sp>
+        <p:nvSpPr>
+          <p:cNvPr id="13" name="Shape 13"/>
+          <p:cNvSpPr/>
+          <p:nvPr/>
+        </p:nvSpPr>
+        <p:spPr>
+          <a:xfrm>
+            <a:off x="1000000" y="2600000"/>
+            <a:ext cx="1800000" cy="500000"/>
+          </a:xfrm>
+          <a:prstGeom prst="roundRect">
+            <a:avLst/>
+          </a:prstGeom>
+          <a:solidFill>
+            <a:srgbClr val="2E75B6"/>
+          </a:solidFill>
+        </p:spPr>
+        <p:txBody>
+          <a:bodyPr wrap="square" rtlCol="0" anchor="ctr"/>
+          <a:lstStyle/>
+          <a:p>
+            <a:pPr algn="ctr"/>
+            <a:r>
+              <a:rPr lang="en-US" sz="1800" dirty="0"/>
+              <a:t>CTO</a:t>
+            </a:r>
+          </a:p>
+        </p:txBody>
+      </p:sp>
+      <p:sp>
+        <p:nvSpPr>
+          <p:cNvPr id="14" name="Shape 14"/>
+          <p:cNvSpPr/>
+          <p:nvPr/>
+        </p:nvSpPr>
+        <p:spPr>
+          <a:xfrm>
+            <a:off x="3600000" y="2600000"/>
+            <a:ext cx="1800000" cy="500000"/>
+          </a:xfrm>
+          <a:prstGeom prst="roundRect">
+            <a:avLst/>
+          </a:prstGeom>
+          <a:solidFill>
+            <a:srgbClr val="2E75B6"/>
+          </a:solidFill>
+        </p:spPr>
+        <p:txBody>
+          <a:bodyPr wrap="square" rtlCol="0" anchor="ctr"/>
+          <a:lstStyle/>
+          <a:p>
+            <a:pPr algn="ctr"/>
+            <a:r>
+              <a:rPr lang="en-US" sz="1800" dirty="0"/>
+              <a:t>CFO</a:t>
+            </a:r>
+          </a:p>
+        </p:txBody>
+      </p:sp>
+      <p:sp>
+        <p:nvSpPr>
+          <p:cNvPr id="15" name="Shape 15"/>
+          <p:cNvSpPr/>
+          <p:nvPr/>
+        </p:nvSpPr>
+        <p:spPr>
+          <a:xfrm>
+            <a:off x="6200000" y="2600000"/>
+            <a:ext cx="1800000" cy="500000"/>
+          </a:xfrm>
+          <a:prstGeom prst="roundRect">
+            <a:avLst/>
+          </a:prstGeom>
+          <a:solidFill>
+            <a:srgbClr val="2E75B6"/>
+          </a:solidFill>
+        </p:spPr>
+        <p:txBody>
+          <a:bodyPr wrap="square" rtlCol="0" anchor="ctr"/>
+          <a:lstStyle/>
+          <a:p>
+            <a:pPr algn="ctr"/>
+            <a:r>
+              <a:rPr lang="en-US" sz="1800" dirty="0"/>
+              <a:t>COO</a:t>
+            </a:r>
+          </a:p>
+        </p:txBody>
+      </p:sp>
+      <p:sp>
+        <p:nvSpPr>
+          <p:cNvPr id="16" name="Shape 16"/>
+          <p:cNvSpPr/>
+          <p:nvPr/>
+        </p:nvSpPr>
+        <p:spPr>
+          <a:xfrm>
+            <a:off x="1850000" y="2450000"/>
+            <a:ext cx="50000" cy="150000"/>
+          </a:xfrm>
+          <a:prstGeom prst="rect">
+            <a:avLst/>
+          </a:prstGeom>
+          <a:solidFill>
+            <a:srgbClr val="A5A5A5"/>
+          </a:solidFill>
+        </p:spPr>
+        <p:txBody>
+          <a:bodyPr/>
+          <a:lstStyle/>
+          <a:p/>
+        </p:txBody>
+      </p:sp>
+      <p:sp>
+        <p:nvSpPr>
+          <p:cNvPr id="17" name="Shape 17"/>
+          <p:cNvSpPr/>
+          <p:nvPr/>
+        </p:nvSpPr>
+        <p:spPr>
+          <a:xfrm>
+            <a:off x="4450000" y="2450000"/>
+            <a:ext cx="50000" cy="150000"/>
+          </a:xfrm>
+          <a:prstGeom prst="rect">
+            <a:avLst/>
+          </a:prstGeom>
+          <a:solidFill>
+            <a:srgbClr val="A5A5A5"/>
+          </a:solidFill>
+        </p:spPr>
+        <p:txBody>
+          <a:bodyPr/>
+          <a:lstStyle/>
+          <a:p/>
+        </p:txBody>
+      </p:sp>
+      <p:sp>
+        <p:nvSpPr>
+          <p:cNvPr id="18" name="Shape 18"/>
+          <p:cNvSpPr/>
+          <p:nvPr/>
+        </p:nvSpPr>
+        <p:spPr>
+          <a:xfrm>
+            <a:off x="7050000" y="2450000"/>
+            <a:ext cx="50000" cy="150000"/>
+          </a:xfrm>
+          <a:prstGeom prst="rect">
+            <a:avLst/>
+          </a:prstGeom>
+          <a:solidFill>
+            <a:srgbClr val="A5A5A5"/>
+          </a:solidFill>
+        </p:spPr>
+        <p:txBody>
+          <a:bodyPr/>
+          <a:lstStyle/>
+          <a:p/>
+        </p:txBody>
+      </p:sp>
+      <p:sp>
+        <p:nvSpPr>
+          <p:cNvPr id="19" name="Shape 19"/>
+          <p:cNvSpPr/>
+          <p:nvPr/>
+        </p:nvSpPr>
+        <p:spPr>
+          <a:xfrm>
+            <a:off x="500000" y="3300000"/>
+            <a:ext cx="1200000" cy="400000"/>
+          </a:xfrm>
+          <a:prstGeom prst="rect">
+            <a:avLst/>
+          </a:prstGeom>
+          <a:solidFill>
+            <a:srgbClr val="BDD7EE"/>
+          </a:solidFill>
+        </p:spPr>
+        <p:txBody>
+          <a:bodyPr wrap="square" rtlCol="0" anchor="ctr"/>
+          <a:lstStyle/>
+          <a:p>
+            <a:pPr algn="ctr"/>
+            <a:r>
+              <a:rPr lang="en-US" sz="1800" dirty="0"/>
+              <a:t>Engineering</a:t>
+            </a:r>
+          </a:p>
+        </p:txBody>
+      </p:sp>
+      <p:sp>
+        <p:nvSpPr>
+          <p:cNvPr id="20" name="Shape 20"/>
+          <p:cNvSpPr/>
+          <p:nvPr/>
+        </p:nvSpPr>
+        <p:spPr>
+          <a:xfrm>
+            <a:off x="1800000" y="3300000"/>
+            <a:ext cx="1200000" cy="400000"/>
+          </a:xfrm>
+          <a:prstGeom prst="rect">
+            <a:avLst/>
+          </a:prstGeom>
+          <a:solidFill>
+            <a:srgbClr val="BDD7EE"/>
+          </a:solidFill>
+        </p:spPr>
+        <p:txBody>
+          <a:bodyPr wrap="square" rtlCol="0" anchor="ctr"/>
+          <a:lstStyle/>
+          <a:p>
+            <a:pPr algn="ctr"/>
+            <a:r>
+              <a:rPr lang="en-US" sz="1800" dirty="0"/>
+              <a:t>Product</a:t>
+            </a:r>
+          </a:p>
+        </p:txBody>
+      </p:sp>
+    </p:spTree>
+  </p:cSld>
+  <p:clrMapOvr>
+    <a:masterClrMapping/>
+  </p:clrMapOvr>
+</p:sld>
+</file>
+
+<file path=ppt/slides/slide15.xml><?xml version="1.0" encoding="utf-8"?>
+<p:sld xmlns:a="http://schemas.openxmlformats.org/drawingml/2006/main" xmlns:r="http://schemas.openxmlformats.org/officeDocument/2006/relationships" xmlns:p="http://schemas.openxmlformats.org/presentationml/2006/main">
+  <p:cSld>
+    <p:bg>
+      <p:bgRef idx="1001">
+        <a:schemeClr val="bg1"/>
+      </p:bgRef>
+    </p:bg>
+    <p:spTree>
+      <p:nvGrpSpPr>
+        <p:cNvPr id="1" name=""/>
+        <p:cNvGrpSpPr/>
+        <p:nvPr/>
+      </p:nvGrpSpPr>
+      <p:grpSpPr>
+        <a:xfrm>
+          <a:off x="0" y="0"/>
+          <a:ext cx="9144000" cy="6858000"/>
+          <a:chOff x="0" y="0"/>
+          <a:chExt cx="9144000" cy="6858000"/>
+        </a:xfrm>
+      </p:grpSpPr>
+      <p:sp>
+        <p:nvSpPr>
+          <p:cNvPr id="2" name="Title"/>
+          <p:cNvSpPr txBox="1"/>
+          <p:nvPr/>
+        </p:nvSpPr>
+        <p:spPr>
+          <a:xfrm>
+            <a:off x="457200" y="274638"/>
+            <a:ext cx="8230200" cy="1143000"/>
+          </a:xfrm>
+          <a:prstGeom prst="rect">
+            <a:avLst/>
+          </a:prstGeom>
+          <a:noFill/>
+        </p:spPr>
+        <p:txBody>
+          <a:bodyPr wrap="square" rtlCol="0" anchor="ctr"/>
+          <a:lstStyle/>
+          <a:p>
+            <a:pPr algn="l"/>
+            <a:r>
+              <a:rPr lang="en-US" sz="4400" b="1" i="0" dirty="0">
+                <a:solidFill>
+                  <a:srgbClr val="1F497D"/>
+                </a:solidFill>
+              </a:rPr>
+              <a:t>PDCA Continuous Improvement Cycle</a:t>
+            </a:r>
+          </a:p>
+        </p:txBody>
+      </p:sp>
+      <p:sp>
+        <p:nvSpPr>
+          <p:cNvPr id="10" name="Shape 10"/>
+          <p:cNvSpPr/>
+          <p:nvPr/>
+        </p:nvSpPr>
+        <p:spPr>
+          <a:xfrm>
+            <a:off x="1500000" y="1600000"/>
+            <a:ext cx="2500000" cy="1500000"/>
+          </a:xfrm>
+          <a:prstGeom prst="roundRect">
+            <a:avLst/>
+          </a:prstGeom>
+          <a:solidFill>
+            <a:srgbClr val="4472C4"/>
+          </a:solidFill>
+        </p:spPr>
+        <p:txBody>
+          <a:bodyPr wrap="square" rtlCol="0" anchor="ctr"/>
+          <a:lstStyle/>
+          <a:p>
+            <a:pPr algn="ctr"/>
+            <a:r>
+              <a:rPr lang="en-US" sz="1800" dirty="0"/>
+              <a:t>PLAN
+Define goals
+and strategy</a:t>
+            </a:r>
+          </a:p>
+        </p:txBody>
+      </p:sp>
+      <p:sp>
+        <p:nvSpPr>
+          <p:cNvPr id="11" name="Shape 11"/>
+          <p:cNvSpPr/>
+          <p:nvPr/>
+        </p:nvSpPr>
+        <p:spPr>
+          <a:xfrm>
+            <a:off x="4500000" y="1600000"/>
+            <a:ext cx="2500000" cy="1500000"/>
+          </a:xfrm>
+          <a:prstGeom prst="roundRect">
+            <a:avLst/>
+          </a:prstGeom>
+          <a:solidFill>
+            <a:srgbClr val="ED7D31"/>
+          </a:solidFill>
+        </p:spPr>
+        <p:txBody>
+          <a:bodyPr wrap="square" rtlCol="0" anchor="ctr"/>
+          <a:lstStyle/>
+          <a:p>
+            <a:pPr algn="ctr"/>
+            <a:r>
+              <a:rPr lang="en-US" sz="1800" dirty="0"/>
+              <a:t>DO
+Implement
+the plan</a:t>
+            </a:r>
+          </a:p>
+        </p:txBody>
+      </p:sp>
+      <p:sp>
+        <p:nvSpPr>
+          <p:cNvPr id="12" name="Shape 12"/>
+          <p:cNvSpPr/>
+          <p:nvPr/>
+        </p:nvSpPr>
+        <p:spPr>
+          <a:xfrm>
+            <a:off x="4500000" y="3300000"/>
+            <a:ext cx="2500000" cy="1500000"/>
+          </a:xfrm>
+          <a:prstGeom prst="roundRect">
+            <a:avLst/>
+          </a:prstGeom>
+          <a:solidFill>
+            <a:srgbClr val="70AD47"/>
+          </a:solidFill>
+        </p:spPr>
+        <p:txBody>
+          <a:bodyPr wrap="square" rtlCol="0" anchor="ctr"/>
+          <a:lstStyle/>
+          <a:p>
+            <a:pPr algn="ctr"/>
+            <a:r>
+              <a:rPr lang="en-US" sz="1800" dirty="0"/>
+              <a:t>CHECK
+Measure
+results</a:t>
+            </a:r>
+          </a:p>
+        </p:txBody>
+      </p:sp>
+      <p:sp>
+        <p:nvSpPr>
+          <p:cNvPr id="13" name="Shape 13"/>
+          <p:cNvSpPr/>
+          <p:nvPr/>
+        </p:nvSpPr>
+        <p:spPr>
+          <a:xfrm>
+            <a:off x="1500000" y="3300000"/>
+            <a:ext cx="2500000" cy="1500000"/>
+          </a:xfrm>
+          <a:prstGeom prst="roundRect">
+            <a:avLst/>
+          </a:prstGeom>
+          <a:solidFill>
+            <a:srgbClr val="FFC000"/>
+          </a:solidFill>
+        </p:spPr>
+        <p:txBody>
+          <a:bodyPr wrap="square" rtlCol="0" anchor="ctr"/>
+          <a:lstStyle/>
+          <a:p>
+            <a:pPr algn="ctr"/>
+            <a:r>
+              <a:rPr lang="en-US" sz="1800" dirty="0"/>
+              <a:t>ACT
+Adjust and
+improve</a:t>
+            </a:r>
+          </a:p>
+        </p:txBody>
+      </p:sp>
+      <p:sp>
+        <p:nvSpPr>
+          <p:cNvPr id="14" name="Shape 14"/>
+          <p:cNvSpPr/>
+          <p:nvPr/>
+        </p:nvSpPr>
+        <p:spPr>
+          <a:xfrm>
+            <a:off x="4100000" y="2100000"/>
+            <a:ext cx="300000" cy="300000"/>
+          </a:xfrm>
+          <a:prstGeom prst="rightArrow">
+            <a:avLst/>
+          </a:prstGeom>
+          <a:solidFill>
+            <a:srgbClr val="A5A5A5"/>
+          </a:solidFill>
+        </p:spPr>
+        <p:txBody>
+          <a:bodyPr/>
+          <a:lstStyle/>
+          <a:p/>
+        </p:txBody>
+      </p:sp>
+      <p:sp>
+        <p:nvSpPr>
+          <p:cNvPr id="15" name="Shape 15"/>
+          <p:cNvSpPr/>
+          <p:nvPr/>
+        </p:nvSpPr>
+        <p:spPr>
+          <a:xfrm>
+            <a:off x="5600000" y="3200000"/>
+            <a:ext cx="300000" cy="200000"/>
+          </a:xfrm>
+          <a:prstGeom prst="downArrow">
+            <a:avLst/>
+          </a:prstGeom>
+          <a:solidFill>
+            <a:srgbClr val="A5A5A5"/>
+          </a:solidFill>
+        </p:spPr>
+        <p:txBody>
+          <a:bodyPr/>
+          <a:lstStyle/>
+          <a:p/>
+        </p:txBody>
+      </p:sp>
+      <p:sp>
+        <p:nvSpPr>
+          <p:cNvPr id="16" name="Shape 16"/>
+          <p:cNvSpPr/>
+          <p:nvPr/>
+        </p:nvSpPr>
+        <p:spPr>
+          <a:xfrm>
+            <a:off x="4100000" y="3800000"/>
+            <a:ext cx="300000" cy="300000"/>
+          </a:xfrm>
+          <a:prstGeom prst="leftArrow">
+            <a:avLst/>
+          </a:prstGeom>
+          <a:solidFill>
+            <a:srgbClr val="A5A5A5"/>
+          </a:solidFill>
+        </p:spPr>
+        <p:txBody>
+          <a:bodyPr/>
+          <a:lstStyle/>
+          <a:p/>
+        </p:txBody>
+      </p:sp>
+      <p:sp>
+        <p:nvSpPr>
+          <p:cNvPr id="17" name="Shape 17"/>
+          <p:cNvSpPr/>
+          <p:nvPr/>
+        </p:nvSpPr>
+        <p:spPr>
+          <a:xfrm>
+            <a:off x="2600000" y="3200000"/>
+            <a:ext cx="300000" cy="200000"/>
+          </a:xfrm>
+          <a:prstGeom prst="upArrow">
+            <a:avLst/>
+          </a:prstGeom>
+          <a:solidFill>
+            <a:srgbClr val="A5A5A5"/>
+          </a:solidFill>
+        </p:spPr>
+        <p:txBody>
+          <a:bodyPr/>
+          <a:lstStyle/>
+          <a:p/>
+        </p:txBody>
+      </p:sp>
+    </p:spTree>
+  </p:cSld>
+  <p:clrMapOvr>
+    <a:masterClrMapping/>
+  </p:clrMapOvr>
+</p:sld>
+</file>
+
+<file path=ppt/slides/slide16.xml><?xml version="1.0" encoding="utf-8"?>
+<p:sld xmlns:a="http://schemas.openxmlformats.org/drawingml/2006/main" xmlns:r="http://schemas.openxmlformats.org/officeDocument/2006/relationships" xmlns:p="http://schemas.openxmlformats.org/presentationml/2006/main">
+  <p:cSld>
+    <p:bg>
+      <p:bgRef idx="1001">
+        <a:schemeClr val="bg1"/>
+      </p:bgRef>
+    </p:bg>
+    <p:spTree>
+      <p:nvGrpSpPr>
+        <p:cNvPr id="1" name=""/>
+        <p:cNvGrpSpPr/>
+        <p:nvPr/>
+      </p:nvGrpSpPr>
+      <p:grpSpPr>
+        <a:xfrm>
+          <a:off x="0" y="0"/>
+          <a:ext cx="9144000" cy="6858000"/>
+          <a:chOff x="0" y="0"/>
+          <a:chExt cx="9144000" cy="6858000"/>
+        </a:xfrm>
+      </p:grpSpPr>
+      <p:sp>
+        <p:nvSpPr>
+          <p:cNvPr id="2" name="Title"/>
+          <p:cNvSpPr txBox="1"/>
+          <p:nvPr/>
+        </p:nvSpPr>
+        <p:spPr>
+          <a:xfrm>
+            <a:off x="457200" y="274638"/>
+            <a:ext cx="8230200" cy="1143000"/>
+          </a:xfrm>
+          <a:prstGeom prst="rect">
+            <a:avLst/>
+          </a:prstGeom>
+          <a:noFill/>
+        </p:spPr>
+        <p:txBody>
+          <a:bodyPr wrap="square" rtlCol="0" anchor="ctr"/>
+          <a:lstStyle/>
+          <a:p>
+            <a:pPr algn="l"/>
+            <a:r>
+              <a:rPr lang="en-US" sz="4400" b="1" i="0" dirty="0">
+                <a:solidFill>
+                  <a:srgbClr val="1F497D"/>
+                </a:solidFill>
+              </a:rPr>
+              <a:t>Maslow's Hierarchy of Needs</a:t>
+            </a:r>
+          </a:p>
+        </p:txBody>
+      </p:sp>
+      <p:sp>
+        <p:nvSpPr>
+          <p:cNvPr id="10" name="Shape 10"/>
+          <p:cNvSpPr/>
+          <p:nvPr/>
+        </p:nvSpPr>
+        <p:spPr>
+          <a:xfrm>
+            <a:off x="500000" y="4000000"/>
+            <a:ext cx="8000000" cy="600000"/>
+          </a:xfrm>
+          <a:prstGeom prst="trapezoid">
+            <a:avLst/>
+          </a:prstGeom>
+          <a:solidFill>
+            <a:srgbClr val="C00000"/>
+          </a:solidFill>
+        </p:spPr>
+        <p:txBody>
+          <a:bodyPr wrap="square" rtlCol="0" anchor="ctr"/>
+          <a:lstStyle/>
+          <a:p>
+            <a:pPr algn="ctr"/>
+            <a:r>
+              <a:rPr lang="en-US" sz="1800" dirty="0"/>
+              <a:t>Physiological Needs - Food, Water, Shelter</a:t>
+            </a:r>
+          </a:p>
+        </p:txBody>
+      </p:sp>
+      <p:sp>
+        <p:nvSpPr>
+          <p:cNvPr id="11" name="Shape 11"/>
+          <p:cNvSpPr/>
+          <p:nvPr/>
+        </p:nvSpPr>
+        <p:spPr>
+          <a:xfrm>
+            <a:off x="1000000" y="3400000"/>
+            <a:ext cx="7000000" cy="600000"/>
+          </a:xfrm>
+          <a:prstGeom prst="trapezoid">
+            <a:avLst/>
+          </a:prstGeom>
+          <a:solidFill>
+            <a:srgbClr val="ED7D31"/>
+          </a:solidFill>
+        </p:spPr>
+        <p:txBody>
+          <a:bodyPr wrap="square" rtlCol="0" anchor="ctr"/>
+          <a:lstStyle/>
+          <a:p>
+            <a:pPr algn="ctr"/>
+            <a:r>
+              <a:rPr lang="en-US" sz="1800" dirty="0"/>
+              <a:t>Safety Needs - Security, Stability</a:t>
+            </a:r>
+          </a:p>
+        </p:txBody>
+      </p:sp>
+      <p:sp>
+        <p:nvSpPr>
+          <p:cNvPr id="12" name="Shape 12"/>
+          <p:cNvSpPr/>
+          <p:nvPr/>
+        </p:nvSpPr>
+        <p:spPr>
+          <a:xfrm>
+            <a:off x="1500000" y="2800000"/>
+            <a:ext cx="6000000" cy="600000"/>
+          </a:xfrm>
+          <a:prstGeom prst="trapezoid">
+            <a:avLst/>
+          </a:prstGeom>
+          <a:solidFill>
+            <a:srgbClr val="FFC000"/>
+          </a:solidFill>
+        </p:spPr>
+        <p:txBody>
+          <a:bodyPr wrap="square" rtlCol="0" anchor="ctr"/>
+          <a:lstStyle/>
+          <a:p>
+            <a:pPr algn="ctr"/>
+            <a:r>
+              <a:rPr lang="en-US" sz="1800" dirty="0"/>
+              <a:t>Love &amp; Belonging - Relationships</a:t>
+            </a:r>
+          </a:p>
+        </p:txBody>
+      </p:sp>
+      <p:sp>
+        <p:nvSpPr>
+          <p:cNvPr id="13" name="Shape 13"/>
+          <p:cNvSpPr/>
+          <p:nvPr/>
+        </p:nvSpPr>
+        <p:spPr>
+          <a:xfrm>
+            <a:off x="2000000" y="2200000"/>
+            <a:ext cx="5000000" cy="600000"/>
+          </a:xfrm>
+          <a:prstGeom prst="trapezoid">
+            <a:avLst/>
+          </a:prstGeom>
+          <a:solidFill>
+            <a:srgbClr val="70AD47"/>
+          </a:solidFill>
+        </p:spPr>
+        <p:txBody>
+          <a:bodyPr wrap="square" rtlCol="0" anchor="ctr"/>
+          <a:lstStyle/>
+          <a:p>
+            <a:pPr algn="ctr"/>
+            <a:r>
+              <a:rPr lang="en-US" sz="1800" dirty="0"/>
+              <a:t>Esteem - Achievement, Respect</a:t>
+            </a:r>
+          </a:p>
+        </p:txBody>
+      </p:sp>
+      <p:sp>
+        <p:nvSpPr>
+          <p:cNvPr id="14" name="Shape 14"/>
+          <p:cNvSpPr/>
+          <p:nvPr/>
+        </p:nvSpPr>
+        <p:spPr>
+          <a:xfrm>
+            <a:off x="2500000" y="1500000"/>
+            <a:ext cx="4000000" cy="700000"/>
+          </a:xfrm>
+          <a:prstGeom prst="triangle">
+            <a:avLst/>
+          </a:prstGeom>
+          <a:solidFill>
+            <a:srgbClr val="4472C4"/>
+          </a:solidFill>
+        </p:spPr>
+        <p:txBody>
+          <a:bodyPr wrap="square" rtlCol="0" anchor="ctr"/>
+          <a:lstStyle/>
+          <a:p>
+            <a:pPr algn="ctr"/>
+            <a:r>
+              <a:rPr lang="en-US" sz="1800" dirty="0"/>
+              <a:t>Self-Actualization</a:t>
+            </a:r>
+          </a:p>
+        </p:txBody>
+      </p:sp>
+    </p:spTree>
+  </p:cSld>
+  <p:clrMapOvr>
+    <a:masterClrMapping/>
+  </p:clrMapOvr>
+</p:sld>
+</file>
+
+<file path=ppt/slides/slide17.xml><?xml version="1.0" encoding="utf-8"?>
+<p:sld xmlns:a="http://schemas.openxmlformats.org/drawingml/2006/main" xmlns:r="http://schemas.openxmlformats.org/officeDocument/2006/relationships" xmlns:p="http://schemas.openxmlformats.org/presentationml/2006/main">
+  <p:cSld>
+    <p:bg>
+      <p:bgRef idx="1001">
+        <a:schemeClr val="bg1"/>
+      </p:bgRef>
+    </p:bg>
+    <p:spTree>
+      <p:nvGrpSpPr>
+        <p:cNvPr id="1" name=""/>
+        <p:cNvGrpSpPr/>
+        <p:nvPr/>
+      </p:nvGrpSpPr>
+      <p:grpSpPr>
+        <a:xfrm>
+          <a:off x="0" y="0"/>
+          <a:ext cx="9144000" cy="6858000"/>
+          <a:chOff x="0" y="0"/>
+          <a:chExt cx="9144000" cy="6858000"/>
+        </a:xfrm>
+      </p:grpSpPr>
+      <p:sp>
+        <p:nvSpPr>
+          <p:cNvPr id="2" name="Title"/>
+          <p:cNvSpPr txBox="1"/>
+          <p:nvPr/>
+        </p:nvSpPr>
+        <p:spPr>
+          <a:xfrm>
+            <a:off x="457200" y="274638"/>
+            <a:ext cx="8230200" cy="1143000"/>
+          </a:xfrm>
+          <a:prstGeom prst="rect">
+            <a:avLst/>
+          </a:prstGeom>
+          <a:noFill/>
+        </p:spPr>
+        <p:txBody>
+          <a:bodyPr wrap="square" rtlCol="0" anchor="ctr"/>
+          <a:lstStyle/>
+          <a:p>
+            <a:pPr algn="l"/>
+            <a:r>
+              <a:rPr lang="en-US" sz="4400" b="1" i="0" dirty="0">
+                <a:solidFill>
+                  <a:srgbClr val="1F497D"/>
+                </a:solidFill>
+              </a:rPr>
+              <a:t>Finding Your Ikigai - Venn Diagram</a:t>
+            </a:r>
+          </a:p>
+        </p:txBody>
+      </p:sp>
+      <p:sp>
+        <p:nvSpPr>
+          <p:cNvPr id="10" name="Shape 10"/>
+          <p:cNvSpPr/>
+          <p:nvPr/>
+        </p:nvSpPr>
+        <p:spPr>
+          <a:xfrm>
+            <a:off x="1500000" y="1800000"/>
+            <a:ext cx="3000000" cy="3000000"/>
+          </a:xfrm>
+          <a:prstGeom prst="ellipse">
+            <a:avLst/>
+          </a:prstGeom>
+          <a:solidFill>
+            <a:srgbClr val="4472C4"/>
+          </a:solidFill>
+        </p:spPr>
+        <p:txBody>
+          <a:bodyPr wrap="square" rtlCol="0" anchor="ctr"/>
+          <a:lstStyle/>
+          <a:p>
+            <a:pPr algn="ctr"/>
+            <a:r>
+              <a:rPr lang="en-US" sz="1800" dirty="0"/>
+              <a:t>Skills</a:t>
+            </a:r>
+          </a:p>
+        </p:txBody>
+      </p:sp>
+      <p:sp>
+        <p:nvSpPr>
+          <p:cNvPr id="11" name="Shape 11"/>
+          <p:cNvSpPr/>
+          <p:nvPr/>
+        </p:nvSpPr>
+        <p:spPr>
+          <a:xfrm>
+            <a:off x="3500000" y="1800000"/>
+            <a:ext cx="3000000" cy="3000000"/>
+          </a:xfrm>
+          <a:prstGeom prst="ellipse">
+            <a:avLst/>
+          </a:prstGeom>
+          <a:solidFill>
+            <a:srgbClr val="ED7D31"/>
+          </a:solidFill>
+        </p:spPr>
+        <p:txBody>
+          <a:bodyPr wrap="square" rtlCol="0" anchor="ctr"/>
+          <a:lstStyle/>
+          <a:p>
+            <a:pPr algn="ctr"/>
+            <a:r>
+              <a:rPr lang="en-US" sz="1800" dirty="0"/>
+              <a:t>Passion</a:t>
+            </a:r>
+          </a:p>
+        </p:txBody>
+      </p:sp>
+      <p:sp>
+        <p:nvSpPr>
+          <p:cNvPr id="12" name="Shape 12"/>
+          <p:cNvSpPr/>
+          <p:nvPr/>
+        </p:nvSpPr>
+        <p:spPr>
+          <a:xfrm>
+            <a:off x="2500000" y="3200000"/>
+            <a:ext cx="3000000" cy="3000000"/>
+          </a:xfrm>
+          <a:prstGeom prst="ellipse">
+            <a:avLst/>
+          </a:prstGeom>
+          <a:solidFill>
+            <a:srgbClr val="70AD47"/>
+          </a:solidFill>
+        </p:spPr>
+        <p:txBody>
+          <a:bodyPr wrap="square" rtlCol="0" anchor="ctr"/>
+          <a:lstStyle/>
+          <a:p>
+            <a:pPr algn="ctr"/>
+            <a:r>
+              <a:rPr lang="en-US" sz="1800" dirty="0"/>
+              <a:t>Market Need</a:t>
+            </a:r>
+          </a:p>
+        </p:txBody>
+      </p:sp>
+      <p:sp>
+        <p:nvSpPr>
+          <p:cNvPr id="13" name="Shape 13"/>
+          <p:cNvSpPr/>
+          <p:nvPr/>
+        </p:nvSpPr>
+        <p:spPr>
+          <a:xfrm>
+            <a:off x="3200000" y="2800000"/>
+            <a:ext cx="1600000" cy="800000"/>
+          </a:xfrm>
+          <a:prstGeom prst="ellipse">
+            <a:avLst/>
+          </a:prstGeom>
+          <a:solidFill>
+            <a:srgbClr val="FFFFFF"/>
+          </a:solidFill>
+        </p:spPr>
+        <p:txBody>
+          <a:bodyPr wrap="square" rtlCol="0" anchor="ctr"/>
+          <a:lstStyle/>
+          <a:p>
+            <a:pPr algn="ctr"/>
+            <a:r>
+              <a:rPr lang="en-US" sz="1800" dirty="0"/>
+              <a:t>IKIGAI</a:t>
+            </a:r>
+          </a:p>
+        </p:txBody>
+      </p:sp>
+    </p:spTree>
+  </p:cSld>
+  <p:clrMapOvr>
+    <a:masterClrMapping/>
+  </p:clrMapOvr>
+</p:sld>
+</file>
+
+<file path=ppt/slides/slide18.xml><?xml version="1.0" encoding="utf-8"?>
+<p:sld xmlns:a="http://schemas.openxmlformats.org/drawingml/2006/main" xmlns:r="http://schemas.openxmlformats.org/officeDocument/2006/relationships" xmlns:p="http://schemas.openxmlformats.org/presentationml/2006/main">
+  <p:cSld>
+    <p:bg>
+      <p:bgRef idx="1001">
+        <a:schemeClr val="bg1"/>
+      </p:bgRef>
+    </p:bg>
+    <p:spTree>
+      <p:nvGrpSpPr>
+        <p:cNvPr id="1" name=""/>
+        <p:cNvGrpSpPr/>
+        <p:nvPr/>
+      </p:nvGrpSpPr>
+      <p:grpSpPr>
+        <a:xfrm>
+          <a:off x="0" y="0"/>
+          <a:ext cx="9144000" cy="6858000"/>
+          <a:chOff x="0" y="0"/>
+          <a:chExt cx="9144000" cy="6858000"/>
+        </a:xfrm>
+      </p:grpSpPr>
+      <p:sp>
+        <p:nvSpPr>
+          <p:cNvPr id="2" name="Title"/>
+          <p:cNvSpPr txBox="1"/>
+          <p:nvPr/>
+        </p:nvSpPr>
+        <p:spPr>
+          <a:xfrm>
+            <a:off x="457200" y="274638"/>
+            <a:ext cx="8230200" cy="1143000"/>
+          </a:xfrm>
+          <a:prstGeom prst="rect">
+            <a:avLst/>
+          </a:prstGeom>
+          <a:noFill/>
+        </p:spPr>
+        <p:txBody>
+          <a:bodyPr wrap="square" rtlCol="0" anchor="ctr"/>
+          <a:lstStyle/>
+          <a:p>
+            <a:pPr algn="l"/>
+            <a:r>
+              <a:rPr lang="en-US" sz="4400" b="1" i="0" dirty="0">
+                <a:solidFill>
+                  <a:srgbClr val="1F497D"/>
+                </a:solidFill>
+              </a:rPr>
+              <a:t>Project Roadmap 2024-2025</a:t>
+            </a:r>
+          </a:p>
+        </p:txBody>
+      </p:sp>
+      <p:graphicFrame>
+        <p:nvGraphicFramePr>
+          <p:cNvPr id="3" name="Table 3"/>
+          <p:cNvGraphicFramePr/>
+          <p:nvPr/>
+        </p:nvGraphicFramePr>
+        <p:xfrm>
+          <a:off x="300000" y="2000000"/>
+          <a:ext cx="7500000" cy="1200000"/>
+        </p:xfrm>
+        <a:graphic>
+          <a:graphicData uri="http://schemas.openxmlformats.org/drawingml/2006/table">
+            <a:tbl>
+              <a:tblPr firstRow="1" bandHVals="1"/>
+              <a:tblGrid>
+                <a:gridCol w="1500000"/>
+                <a:gridCol w="1500000"/>
+                <a:gridCol w="1500000"/>
+                <a:gridCol w="1500000"/>
+                <a:gridCol w="1500000"/>
+              </a:tblGrid>
+              <a:tr h="400000">
+                <a:tc>
+                  <a:tcPr marL="91440" marR="91440" marT="45720" marB="45720" anchor="ctr" anchorCtr="0">
+                    <a:solidFill>
+                      <a:srgbClr val="4472C4"/>
+                    </a:solidFill>
+                  </a:tcPr>
+                  <a:txBody>
+                    <a:bodyPr rot="0" vert="horz" anchor="ctr" anchorCtr="0" wrap="square"/>
+                    <a:lstStyle/>
+                    <a:p>
+                      <a:pPr algn="ctr"/>
+                      <a:r>
+                        <a:rPr lang="en-US" sz="2000" b="1" i="0">
+                          <a:solidFill>
+                            <a:srgbClr val="FFFFFF"/>
+                          </a:solidFill>
+                          <a:latin typeface="Calibri"/>
+                          <a:ea typeface="Calibri"/>
+                          <a:cs typeface="Calibri"/>
+                        </a:rPr>
+                        <a:t>Q1 2024</a:t>
+                      </a:r>
+                    </a:p>
+                  </a:txBody>
+                </a:tc>
+                <a:tc>
+                  <a:tcPr marL="91440" marR="91440" marT="45720" marB="45720" anchor="ctr" anchorCtr="0">
+                    <a:solidFill>
+                      <a:srgbClr val="4472C4"/>
+                    </a:solidFill>
+                  </a:tcPr>
+                  <a:txBody>
+                    <a:bodyPr rot="0" vert="horz" anchor="ctr" anchorCtr="0" wrap="square"/>
+                    <a:lstStyle/>
+                    <a:p>
+                      <a:pPr algn="ctr"/>
+                      <a:r>
+                        <a:rPr lang="en-US" sz="2000" b="1" i="0">
+                          <a:solidFill>
+                            <a:srgbClr val="FFFFFF"/>
+                          </a:solidFill>
+                          <a:latin typeface="Calibri"/>
+                          <a:ea typeface="Calibri"/>
+                          <a:cs typeface="Calibri"/>
+                        </a:rPr>
+                        <a:t>Q2 2024</a:t>
+                      </a:r>
+                    </a:p>
+                  </a:txBody>
+                </a:tc>
+                <a:tc>
+                  <a:tcPr marL="91440" marR="91440" marT="45720" marB="45720" anchor="ctr" anchorCtr="0">
+                    <a:solidFill>
+                      <a:srgbClr val="4472C4"/>
+                    </a:solidFill>
+                  </a:tcPr>
+                  <a:txBody>
+                    <a:bodyPr rot="0" vert="horz" anchor="ctr" anchorCtr="0" wrap="square"/>
+                    <a:lstStyle/>
+                    <a:p>
+                      <a:pPr algn="ctr"/>
+                      <a:r>
+                        <a:rPr lang="en-US" sz="2000" b="1" i="0">
+                          <a:solidFill>
+                            <a:srgbClr val="FFFFFF"/>
+                          </a:solidFill>
+                          <a:latin typeface="Calibri"/>
+                          <a:ea typeface="Calibri"/>
+                          <a:cs typeface="Calibri"/>
+                        </a:rPr>
+                        <a:t>Q3 2024</a:t>
+                      </a:r>
+                    </a:p>
+                  </a:txBody>
+                </a:tc>
+                <a:tc>
+                  <a:tcPr marL="91440" marR="91440" marT="45720" marB="45720" anchor="ctr" anchorCtr="0">
+                    <a:solidFill>
+                      <a:srgbClr val="4472C4"/>
+                    </a:solidFill>
+                  </a:tcPr>
+                  <a:txBody>
+                    <a:bodyPr rot="0" vert="horz" anchor="ctr" anchorCtr="0" wrap="square"/>
+                    <a:lstStyle/>
+                    <a:p>
+                      <a:pPr algn="ctr"/>
+                      <a:r>
+                        <a:rPr lang="en-US" sz="2000" b="1" i="0">
+                          <a:solidFill>
+                            <a:srgbClr val="FFFFFF"/>
+                          </a:solidFill>
+                          <a:latin typeface="Calibri"/>
+                          <a:ea typeface="Calibri"/>
+                          <a:cs typeface="Calibri"/>
+                        </a:rPr>
+                        <a:t>Q4 2024</a:t>
+                      </a:r>
+                    </a:p>
+                  </a:txBody>
+                </a:tc>
+                <a:tc>
+                  <a:tcPr marL="91440" marR="91440" marT="45720" marB="45720" anchor="ctr" anchorCtr="0">
+                    <a:solidFill>
+                      <a:srgbClr val="4472C4"/>
+                    </a:solidFill>
+                  </a:tcPr>
+                  <a:txBody>
+                    <a:bodyPr rot="0" vert="horz" anchor="ctr" anchorCtr="0" wrap="square"/>
+                    <a:lstStyle/>
+                    <a:p>
+                      <a:pPr algn="ctr"/>
+                      <a:r>
+                        <a:rPr lang="en-US" sz="2000" b="1" i="0">
+                          <a:solidFill>
+                            <a:srgbClr val="FFFFFF"/>
+                          </a:solidFill>
+                          <a:latin typeface="Calibri"/>
+                          <a:ea typeface="Calibri"/>
+                          <a:cs typeface="Calibri"/>
+                        </a:rPr>
+                        <a:t>Q1 2025</a:t>
+                      </a:r>
+                    </a:p>
+                  </a:txBody>
+                </a:tc>
+              </a:tr>
+              <a:tr h="400000">
+                <a:tc>
+                  <a:tcPr marL="91440" marR="91440" marT="45720" marB="45720" anchor="ctr" anchorCtr="0">
+                    <a:solidFill>
+                      <a:srgbClr val="BDD7EE"/>
+                    </a:solidFill>
+                  </a:tcPr>
+                  <a:txBody>
+                    <a:bodyPr rot="0" vert="horz" anchor="ctr" anchorCtr="0" wrap="square"/>
+                    <a:lstStyle/>
+                    <a:p>
+                      <a:pPr algn="ctr"/>
+                      <a:r>
+                        <a:rPr lang="en-US" sz="2000" b="0" i="0">
+                          <a:solidFill>
+                            <a:srgbClr val="1F497D"/>
+                          </a:solidFill>
+                          <a:latin typeface="Calibri"/>
+                          <a:ea typeface="Calibri"/>
+                          <a:cs typeface="Calibri"/>
+                        </a:rPr>
+                        <a:t>Research</a:t>
+                      </a:r>
+                    </a:p>
+                    <a:p>
+                      <a:pPr algn="ctr"/>
+                      <a:r>
+                        <a:rPr lang="en-US" sz="2000" b="0" i="0">
+                          <a:solidFill>
+                            <a:srgbClr val="1F497D"/>
+                          </a:solidFill>
+                          <a:latin typeface="Calibri"/>
+                          <a:ea typeface="Calibri"/>
+                          <a:cs typeface="Calibri"/>
+                        </a:rPr>
+                        <a:t>&amp; Planning</a:t>
+                      </a:r>
+                    </a:p>
+                  </a:txBody>
+                </a:tc>
+                <a:tc>
+                  <a:tcPr marL="91440" marR="91440" marT="45720" marB="45720" anchor="ctr" anchorCtr="0">
+                    <a:solidFill>
+                      <a:srgbClr val="BDD7EE"/>
+                    </a:solidFill>
+                  </a:tcPr>
+                  <a:txBody>
+                    <a:bodyPr rot="0" vert="horz" anchor="ctr" anchorCtr="0" wrap="square"/>
+                    <a:lstStyle/>
+                    <a:p>
+                      <a:pPr algn="ctr"/>
+                      <a:r>
+                        <a:rPr lang="en-US" sz="2000" b="0" i="0">
+                          <a:solidFill>
+                            <a:srgbClr val="1F497D"/>
+                          </a:solidFill>
+                          <a:latin typeface="Calibri"/>
+                          <a:ea typeface="Calibri"/>
+                          <a:cs typeface="Calibri"/>
+                        </a:rPr>
+                        <a:t>Design</a:t>
+                      </a:r>
+                    </a:p>
+                    <a:p>
+                      <a:pPr algn="ctr"/>
+                      <a:r>
+                        <a:rPr lang="en-US" sz="2000" b="0" i="0">
+                          <a:solidFill>
+                            <a:srgbClr val="1F497D"/>
+                          </a:solidFill>
+                          <a:latin typeface="Calibri"/>
+                          <a:ea typeface="Calibri"/>
+                          <a:cs typeface="Calibri"/>
+                        </a:rPr>
+                        <a:t>Phase</a:t>
+                      </a:r>
+                    </a:p>
+                  </a:txBody>
+                </a:tc>
+                <a:tc>
+                  <a:tcPr marL="91440" marR="91440" marT="45720" marB="45720" anchor="ctr" anchorCtr="0">
+                    <a:solidFill>
+                      <a:srgbClr val="C6EFCE"/>
+                    </a:solidFill>
+                  </a:tcPr>
+                  <a:txBody>
+                    <a:bodyPr rot="0" vert="horz" anchor="ctr" anchorCtr="0" wrap="square"/>
+                    <a:lstStyle/>
+                    <a:p>
+                      <a:pPr algn="ctr"/>
+                      <a:r>
+                        <a:rPr lang="en-US" sz="2000" b="0" i="0">
+                          <a:solidFill>
+                            <a:srgbClr val="006100"/>
+                          </a:solidFill>
+                          <a:latin typeface="Calibri"/>
+                          <a:ea typeface="Calibri"/>
+                          <a:cs typeface="Calibri"/>
+                        </a:rPr>
+                        <a:t>Development</a:t>
+                      </a:r>
+                    </a:p>
+                    <a:p>
+                      <a:pPr algn="ctr"/>
+                      <a:r>
+                        <a:rPr lang="en-US" sz="2000" b="0" i="0">
+                          <a:solidFill>
+                            <a:srgbClr val="006100"/>
+                          </a:solidFill>
+                          <a:latin typeface="Calibri"/>
+                          <a:ea typeface="Calibri"/>
+                          <a:cs typeface="Calibri"/>
+                        </a:rPr>
+                        <a:t>Sprint 1-3</a:t>
+                      </a:r>
+                    </a:p>
+                  </a:txBody>
+                </a:tc>
+                <a:tc>
+                  <a:tcPr marL="91440" marR="91440" marT="45720" marB="45720" anchor="ctr" anchorCtr="0">
+                    <a:solidFill>
+                      <a:srgbClr val="FCE4D6"/>
+                    </a:solidFill>
+                  </a:tcPr>
+                  <a:txBody>
+                    <a:bodyPr rot="0" vert="horz" anchor="ctr" anchorCtr="0" wrap="square"/>
+                    <a:lstStyle/>
+                    <a:p>
+                      <a:pPr algn="ctr"/>
+                      <a:r>
+                        <a:rPr lang="en-US" sz="2000" b="0" i="0">
+                          <a:solidFill>
+                            <a:srgbClr val="C65911"/>
+                          </a:solidFill>
+                          <a:latin typeface="Calibri"/>
+                          <a:ea typeface="Calibri"/>
+                          <a:cs typeface="Calibri"/>
+                        </a:rPr>
+                        <a:t>Testing</a:t>
+                      </a:r>
+                    </a:p>
+                    <a:p>
+                      <a:pPr algn="ctr"/>
+                      <a:r>
+                        <a:rPr lang="en-US" sz="2000" b="0" i="0">
+                          <a:solidFill>
+                            <a:srgbClr val="C65911"/>
+                          </a:solidFill>
+                          <a:latin typeface="Calibri"/>
+                          <a:ea typeface="Calibri"/>
+                          <a:cs typeface="Calibri"/>
+                        </a:rPr>
+                        <a:t>&amp; QA</a:t>
+                      </a:r>
+                    </a:p>
+                  </a:txBody>
+                </a:tc>
+                <a:tc>
+                  <a:tcPr marL="91440" marR="91440" marT="45720" marB="45720" anchor="ctr" anchorCtr="0">
+                    <a:solidFill>
+                      <a:srgbClr val="E2EFDA"/>
+                    </a:solidFill>
+                  </a:tcPr>
+                  <a:txBody>
+                    <a:bodyPr rot="0" vert="horz" anchor="ctr" anchorCtr="0" wrap="square"/>
+                    <a:lstStyle/>
+                    <a:p>
+                      <a:pPr algn="ctr"/>
+                      <a:r>
+                        <a:rPr lang="en-US" sz="2000" b="0" i="0">
+                          <a:solidFill>
+                            <a:srgbClr val="375623"/>
+                          </a:solidFill>
+                          <a:latin typeface="Calibri"/>
+                          <a:ea typeface="Calibri"/>
+                          <a:cs typeface="Calibri"/>
+                        </a:rPr>
+                        <a:t>Launch</a:t>
+                      </a:r>
+                    </a:p>
+                    <a:p>
+                      <a:pPr algn="ctr"/>
+                      <a:r>
+                        <a:rPr lang="en-US" sz="2000" b="0" i="0">
+                          <a:solidFill>
+                            <a:srgbClr val="375623"/>
+                          </a:solidFill>
+                          <a:latin typeface="Calibri"/>
+                          <a:ea typeface="Calibri"/>
+                          <a:cs typeface="Calibri"/>
+                        </a:rPr>
+                        <a:t>&amp; Support</a:t>
+                      </a:r>
+                    </a:p>
+                  </a:txBody>
+                </a:tc>
+              </a:tr>
+              <a:tr h="400000">
+                <a:tc>
+                  <a:tcPr marL="91440" marR="91440" marT="45720" marB="45720" anchor="ctr" anchorCtr="0">
+                    <a:solidFill>
+                      <a:srgbClr val="F2F2F2"/>
+                    </a:solidFill>
+                  </a:tcPr>
+                  <a:txBody>
+                    <a:bodyPr rot="0" vert="horz" anchor="ctr" anchorCtr="0" wrap="square"/>
+                    <a:lstStyle/>
+                    <a:p>
+                      <a:pPr algn="ctr"/>
+                      <a:r>
+                        <a:rPr lang="en-US" sz="2000" b="1" i="0">
+                          <a:solidFill>
+                            <a:srgbClr val="2E7D32"/>
+                          </a:solidFill>
+                          <a:latin typeface="Calibri"/>
+                          <a:ea typeface="Calibri"/>
+                          <a:cs typeface="Calibri"/>
+                        </a:rPr>
+                        <a:t>✓ Complete</a:t>
+                      </a:r>
+                    </a:p>
+                  </a:txBody>
+                </a:tc>
+                <a:tc>
+                  <a:tcPr marL="91440" marR="91440" marT="45720" marB="45720" anchor="ctr" anchorCtr="0">
+                    <a:solidFill>
+                      <a:srgbClr val="F2F2F2"/>
+                    </a:solidFill>
+                  </a:tcPr>
+                  <a:txBody>
+                    <a:bodyPr rot="0" vert="horz" anchor="ctr" anchorCtr="0" wrap="square"/>
+                    <a:lstStyle/>
+                    <a:p>
+                      <a:pPr algn="ctr"/>
+                      <a:r>
+                        <a:rPr lang="en-US" sz="2000" b="1" i="0">
+                          <a:solidFill>
+                            <a:srgbClr val="2E7D32"/>
+                          </a:solidFill>
+                          <a:latin typeface="Calibri"/>
+                          <a:ea typeface="Calibri"/>
+                          <a:cs typeface="Calibri"/>
+                        </a:rPr>
+                        <a:t>✓ Complete</a:t>
+                      </a:r>
+                    </a:p>
+                  </a:txBody>
+                </a:tc>
+                <a:tc>
+                  <a:tcPr marL="91440" marR="91440" marT="45720" marB="45720" anchor="ctr" anchorCtr="0">
+                    <a:solidFill>
+                      <a:srgbClr val="F2F2F2"/>
+                    </a:solidFill>
+                  </a:tcPr>
+                  <a:txBody>
+                    <a:bodyPr rot="0" vert="horz" anchor="ctr" anchorCtr="0" wrap="square"/>
+                    <a:lstStyle/>
+                    <a:p>
+                      <a:pPr algn="ctr"/>
+                      <a:r>
+                        <a:rPr lang="en-US" sz="2000" b="0" i="0">
+                          <a:solidFill>
+                            <a:srgbClr val="ED7D31"/>
+                          </a:solidFill>
+                          <a:latin typeface="Calibri"/>
+                          <a:ea typeface="Calibri"/>
+                          <a:cs typeface="Calibri"/>
+                        </a:rPr>
+                        <a:t>In Progress</a:t>
+                      </a:r>
+                    </a:p>
+                  </a:txBody>
+                </a:tc>
+                <a:tc>
+                  <a:tcPr marL="91440" marR="91440" marT="45720" marB="45720" anchor="ctr" anchorCtr="0">
+                    <a:solidFill>
+                      <a:srgbClr val="F2F2F2"/>
+                    </a:solidFill>
+                  </a:tcPr>
+                  <a:txBody>
+                    <a:bodyPr rot="0" vert="horz" anchor="ctr" anchorCtr="0" wrap="square"/>
+                    <a:lstStyle/>
+                    <a:p>
+                      <a:pPr algn="ctr"/>
+                      <a:r>
+                        <a:rPr lang="en-US" sz="2000" b="0" i="0">
+                          <a:solidFill>
+                            <a:srgbClr val="7F7F7F"/>
+                          </a:solidFill>
+                          <a:latin typeface="Calibri"/>
+                          <a:ea typeface="Calibri"/>
+                          <a:cs typeface="Calibri"/>
+                        </a:rPr>
+                        <a:t>Planned</a:t>
+                      </a:r>
+                    </a:p>
+                  </a:txBody>
+                </a:tc>
+                <a:tc>
+                  <a:tcPr marL="91440" marR="91440" marT="45720" marB="45720" anchor="ctr" anchorCtr="0">
+                    <a:solidFill>
+                      <a:srgbClr val="F2F2F2"/>
+                    </a:solidFill>
+                  </a:tcPr>
+                  <a:txBody>
+                    <a:bodyPr rot="0" vert="horz" anchor="ctr" anchorCtr="0" wrap="square"/>
+                    <a:lstStyle/>
+                    <a:p>
+                      <a:pPr algn="ctr"/>
+                      <a:r>
+                        <a:rPr lang="en-US" sz="2000" b="0" i="0">
+                          <a:solidFill>
+                            <a:srgbClr val="7F7F7F"/>
+                          </a:solidFill>
+                          <a:latin typeface="Calibri"/>
+                          <a:ea typeface="Calibri"/>
+                          <a:cs typeface="Calibri"/>
+                        </a:rPr>
+                        <a:t>Planned</a:t>
+                      </a:r>
+                    </a:p>
+                  </a:txBody>
+                </a:tc>
+              </a:tr>
+            </a:tbl>
+          </a:graphicData>
+        </a:graphic>
+      </p:graphicFrame>
+    </p:spTree>
+  </p:cSld>
+  <p:clrMapOvr>
+    <a:masterClrMapping/>
+  </p:clrMapOvr>
+</p:sld>
+</file>
+
+<file path=ppt/slides/slide19.xml><?xml version="1.0" encoding="utf-8"?>
+<p:sld xmlns:a="http://schemas.openxmlformats.org/drawingml/2006/main" xmlns:r="http://schemas.openxmlformats.org/officeDocument/2006/relationships" xmlns:p="http://schemas.openxmlformats.org/presentationml/2006/main">
+  <p:cSld>
+    <p:bg>
+      <p:bgRef idx="1001">
+        <a:schemeClr val="bg1"/>
+      </p:bgRef>
+    </p:bg>
+    <p:spTree>
+      <p:nvGrpSpPr>
+        <p:cNvPr id="1" name=""/>
+        <p:cNvGrpSpPr/>
+        <p:nvPr/>
+      </p:nvGrpSpPr>
+      <p:grpSpPr>
+        <a:xfrm>
+          <a:off x="0" y="0"/>
+          <a:ext cx="9144000" cy="6858000"/>
+          <a:chOff x="0" y="0"/>
+          <a:chExt cx="9144000" cy="6858000"/>
+        </a:xfrm>
+      </p:grpSpPr>
+      <p:sp>
+        <p:nvSpPr>
+          <p:cNvPr id="2" name="Title"/>
+          <p:cNvSpPr txBox="1"/>
+          <p:nvPr/>
+        </p:nvSpPr>
+        <p:spPr>
+          <a:xfrm>
+            <a:off x="457200" y="274638"/>
+            <a:ext cx="8230200" cy="1143000"/>
+          </a:xfrm>
+          <a:prstGeom prst="rect">
+            <a:avLst/>
+          </a:prstGeom>
+          <a:noFill/>
+        </p:spPr>
+        <p:txBody>
+          <a:bodyPr wrap="square" rtlCol="0" anchor="ctr"/>
+          <a:lstStyle/>
+          <a:p>
+            <a:pPr algn="l"/>
+            <a:r>
+              <a:rPr lang="en-US" sz="4400" b="1" i="0" dirty="0">
+                <a:solidFill>
+                  <a:srgbClr val="1F497D"/>
+                </a:solidFill>
+              </a:rPr>
+              <a:t>Executive Dashboard - Q1 2024</a:t>
+            </a:r>
+          </a:p>
+        </p:txBody>
+      </p:sp>
+      <p:sp>
+        <p:nvSpPr>
+          <p:cNvPr id="10" name="Shape 10"/>
+          <p:cNvSpPr/>
+          <p:nvPr/>
+        </p:nvSpPr>
+        <p:spPr>
+          <a:xfrm>
+            <a:off x="300000" y="1600000"/>
+            <a:ext cx="2000000" cy="1200000"/>
+          </a:xfrm>
+          <a:prstGeom prst="roundRect">
+            <a:avLst/>
+          </a:prstGeom>
+          <a:solidFill>
+            <a:srgbClr val="4472C4"/>
+          </a:solidFill>
+        </p:spPr>
+        <p:txBody>
+          <a:bodyPr wrap="square" rtlCol="0" anchor="ctr"/>
+          <a:lstStyle/>
+          <a:p>
+            <a:pPr algn="ctr"/>
+            <a:r>
+              <a:rPr lang="en-US" sz="1800" dirty="0"/>
+              <a:t>Revenue
+$2.14M
++15% YoY</a:t>
+            </a:r>
+          </a:p>
+        </p:txBody>
+      </p:sp>
+      <p:sp>
+        <p:nvSpPr>
+          <p:cNvPr id="11" name="Shape 11"/>
+          <p:cNvSpPr/>
+          <p:nvPr/>
+        </p:nvSpPr>
+        <p:spPr>
+          <a:xfrm>
+            <a:off x="2500000" y="1600000"/>
+            <a:ext cx="2000000" cy="1200000"/>
+          </a:xfrm>
+          <a:prstGeom prst="roundRect">
+            <a:avLst/>
+          </a:prstGeom>
+          <a:solidFill>
+            <a:srgbClr val="70AD47"/>
+          </a:solidFill>
+        </p:spPr>
+        <p:txBody>
+          <a:bodyPr wrap="square" rtlCol="0" anchor="ctr"/>
+          <a:lstStyle/>
+          <a:p>
+            <a:pPr algn="ctr"/>
+            <a:r>
+              <a:rPr lang="en-US" sz="1800" dirty="0"/>
+              <a:t>Customers
+12,450
++22% YoY</a:t>
+            </a:r>
+          </a:p>
+        </p:txBody>
+      </p:sp>
+      <p:sp>
+        <p:nvSpPr>
+          <p:cNvPr id="12" name="Shape 12"/>
+          <p:cNvSpPr/>
+          <p:nvPr/>
+        </p:nvSpPr>
+        <p:spPr>
+          <a:xfrm>
+            <a:off x="4700000" y="1600000"/>
+            <a:ext cx="2000000" cy="1200000"/>
+          </a:xfrm>
+          <a:prstGeom prst="roundRect">
+            <a:avLst/>
+          </a:prstGeom>
+          <a:solidFill>
+            <a:srgbClr val="ED7D31"/>
+          </a:solidFill>
+        </p:spPr>
+        <p:txBody>
+          <a:bodyPr wrap="square" rtlCol="0" anchor="ctr"/>
+          <a:lstStyle/>
+          <a:p>
+            <a:pPr algn="ctr"/>
+            <a:r>
+              <a:rPr lang="en-US" sz="1800" dirty="0"/>
+              <a:t>NPS Score
+72
++8 pts</a:t>
+            </a:r>
+          </a:p>
+        </p:txBody>
+      </p:sp>
+      <p:sp>
+        <p:nvSpPr>
+          <p:cNvPr id="13" name="Shape 13"/>
+          <p:cNvSpPr/>
+          <p:nvPr/>
+        </p:nvSpPr>
+        <p:spPr>
+          <a:xfrm>
+            <a:off x="6900000" y="1600000"/>
+            <a:ext cx="2000000" cy="1200000"/>
+          </a:xfrm>
+          <a:prstGeom prst="roundRect">
+            <a:avLst/>
+          </a:prstGeom>
+          <a:solidFill>
+            <a:srgbClr val="5B9BD5"/>
+          </a:solidFill>
+        </p:spPr>
+        <p:txBody>
+          <a:bodyPr wrap="square" rtlCol="0" anchor="ctr"/>
+          <a:lstStyle/>
+          <a:p>
+            <a:pPr algn="ctr"/>
+            <a:r>
+              <a:rPr lang="en-US" sz="1800" dirty="0"/>
+              <a:t>Retention
+94%
++3% YoY</a:t>
+            </a:r>
+          </a:p>
+        </p:txBody>
+      </p:sp>
+      <p:sp>
+        <p:nvSpPr>
+          <p:cNvPr id="14" name="Shape 14"/>
+          <p:cNvSpPr/>
+          <p:nvPr/>
+        </p:nvSpPr>
+        <p:spPr>
+          <a:xfrm>
+            <a:off x="1800000" y="2600000"/>
+            <a:ext cx="300000" cy="300000"/>
+          </a:xfrm>
+          <a:prstGeom prst="ellipse">
+            <a:avLst/>
+          </a:prstGeom>
+          <a:solidFill>
+            <a:srgbClr val="70AD47"/>
+          </a:solidFill>
+        </p:spPr>
+        <p:txBody>
+          <a:bodyPr/>
+          <a:lstStyle/>
+          <a:p/>
+        </p:txBody>
+      </p:sp>
+      <p:sp>
+        <p:nvSpPr>
+          <p:cNvPr id="15" name="Shape 15"/>
+          <p:cNvSpPr/>
+          <p:nvPr/>
+        </p:nvSpPr>
+        <p:spPr>
+          <a:xfrm>
+            <a:off x="4000000" y="2600000"/>
+            <a:ext cx="300000" cy="300000"/>
+          </a:xfrm>
+          <a:prstGeom prst="ellipse">
+            <a:avLst/>
+          </a:prstGeom>
+          <a:solidFill>
+            <a:srgbClr val="70AD47"/>
+          </a:solidFill>
+        </p:spPr>
+        <p:txBody>
+          <a:bodyPr/>
+          <a:lstStyle/>
+          <a:p/>
+        </p:txBody>
+      </p:sp>
+      <p:sp>
+        <p:nvSpPr>
+          <p:cNvPr id="16" name="Shape 16"/>
+          <p:cNvSpPr/>
+          <p:nvPr/>
+        </p:nvSpPr>
+        <p:spPr>
+          <a:xfrm>
+            <a:off x="6200000" y="2600000"/>
+            <a:ext cx="300000" cy="300000"/>
+          </a:xfrm>
+          <a:prstGeom prst="ellipse">
+            <a:avLst/>
+          </a:prstGeom>
+          <a:solidFill>
+            <a:srgbClr val="FFC000"/>
+          </a:solidFill>
+        </p:spPr>
+        <p:txBody>
+          <a:bodyPr/>
+          <a:lstStyle/>
+          <a:p/>
+        </p:txBody>
+      </p:sp>
+      <p:sp>
+        <p:nvSpPr>
+          <p:cNvPr id="17" name="Shape 17"/>
+          <p:cNvSpPr/>
+          <p:nvPr/>
+        </p:nvSpPr>
+        <p:spPr>
+          <a:xfrm>
+            <a:off x="8400000" y="2600000"/>
+            <a:ext cx="300000" cy="300000"/>
+          </a:xfrm>
+          <a:prstGeom prst="ellipse">
+            <a:avLst/>
+          </a:prstGeom>
+          <a:solidFill>
+            <a:srgbClr val="70AD47"/>
+          </a:solidFill>
+        </p:spPr>
+        <p:txBody>
+          <a:bodyPr/>
+          <a:lstStyle/>
+          <a:p/>
+        </p:txBody>
+      </p:sp>
+    </p:spTree>
+  </p:cSld>
+  <p:clrMapOvr>
+    <a:masterClrMapping/>
+  </p:clrMapOvr>
+</p:sld>
+</file>
+
 <file path=ppt/slides/slide2.xml><?xml version="1.0" encoding="utf-8"?>
 <p:sld xmlns:a="http://schemas.openxmlformats.org/drawingml/2006/main" xmlns:r="http://schemas.openxmlformats.org/officeDocument/2006/relationships" xmlns:p="http://schemas.openxmlformats.org/presentationml/2006/main">
   <p:cSld>
@@ -356,6 +3996,124 @@
                 </a:solidFill>
               </a:rPr>
               <a:t>Section: Slide Layouts</a:t>
+            </a:r>
+          </a:p>
+        </p:txBody>
+      </p:sp>
+    </p:spTree>
+  </p:cSld>
+  <p:clrMapOvr>
+    <a:masterClrMapping/>
+  </p:clrMapOvr>
+</p:sld>
+</file>
+
+<file path=ppt/slides/slide20.xml><?xml version="1.0" encoding="utf-8"?>
+<p:sld xmlns:a="http://schemas.openxmlformats.org/drawingml/2006/main" xmlns:r="http://schemas.openxmlformats.org/officeDocument/2006/relationships" xmlns:p="http://schemas.openxmlformats.org/presentationml/2006/main">
+  <p:cSld>
+    <p:bg>
+      <p:bgRef idx="1001">
+        <a:schemeClr val="bg1"/>
+      </p:bgRef>
+    </p:bg>
+    <p:spTree>
+      <p:nvGrpSpPr>
+        <p:cNvPr id="1" name=""/>
+        <p:cNvGrpSpPr/>
+        <p:nvPr/>
+      </p:nvGrpSpPr>
+      <p:grpSpPr>
+        <a:xfrm>
+          <a:off x="0" y="0"/>
+          <a:ext cx="9144000" cy="6858000"/>
+          <a:chOff x="0" y="0"/>
+          <a:chExt cx="9144000" cy="6858000"/>
+        </a:xfrm>
+      </p:grpSpPr>
+      <p:sp>
+        <p:nvSpPr>
+          <p:cNvPr id="2" name="Title"/>
+          <p:cNvSpPr txBox="1"/>
+          <p:nvPr/>
+        </p:nvSpPr>
+        <p:spPr>
+          <a:xfrm>
+            <a:off x="457200" y="274638"/>
+            <a:ext cx="8230200" cy="1143000"/>
+          </a:xfrm>
+          <a:prstGeom prst="rect">
+            <a:avLst/>
+          </a:prstGeom>
+          <a:noFill/>
+        </p:spPr>
+        <p:txBody>
+          <a:bodyPr wrap="square" rtlCol="0" anchor="ctr"/>
+          <a:lstStyle/>
+          <a:p>
+            <a:pPr algn="l"/>
+            <a:r>
+              <a:rPr lang="en-US" sz="4400" b="1" i="0" dirty="0">
+                <a:solidFill>
+                  <a:srgbClr val="1F497D"/>
+                </a:solidFill>
+              </a:rPr>
+              <a:t>Summary &amp; Next Steps</a:t>
+            </a:r>
+          </a:p>
+        </p:txBody>
+      </p:sp>
+      <p:sp>
+        <p:nvSpPr>
+          <p:cNvPr id="3" name="Content"/>
+          <p:cNvSpPr txBox="1"/>
+          <p:nvPr/>
+        </p:nvSpPr>
+        <p:spPr>
+          <a:xfrm>
+            <a:off x="457200" y="1600200"/>
+            <a:ext cx="8230200" cy="4572000"/>
+          </a:xfrm>
+          <a:prstGeom prst="rect">
+            <a:avLst/>
+          </a:prstGeom>
+          <a:noFill/>
+        </p:spPr>
+        <p:txBody>
+          <a:bodyPr wrap="square" rtlCol="0"/>
+          <a:lstStyle/>
+          <a:p>
+            <a:pPr lvl="0"/>
+            <a:r>
+              <a:rPr lang="en-US" sz="2400" b="0" i="0" dirty="0"/>
+              <a:t>Completed: Research, Design, Initial Development</a:t>
+            </a:r>
+          </a:p>
+          <a:p>
+            <a:pPr lvl="0"/>
+            <a:r>
+              <a:rPr lang="en-US" sz="2400" b="0" i="0" dirty="0"/>
+              <a:t>In Progress: Sprint 3 Development</a:t>
+            </a:r>
+          </a:p>
+          <a:p>
+            <a:pPr lvl="0"/>
+            <a:r>
+              <a:rPr lang="en-US" sz="2400" b="0" i="0" dirty="0"/>
+              <a:t>Next: QA Testing Phase (Q4 2024)</a:t>
+            </a:r>
+          </a:p>
+          <a:p>
+            <a:pPr lvl="0"/>
+            <a:r>
+              <a:rPr lang="en-US" sz="2400" b="0" i="0" dirty="0"/>
+              <a:t>Launch Target: Q1 2025</a:t>
+            </a:r>
+          </a:p>
+          <a:p>
+            <a:pPr lvl="0"/>
+            <a:r>
+              <a:rPr lang="en-US" sz="2400" b="0" i="0" dirty="0"/>
+              <a:t>Key Risks: Resource constraints, Timeline pressure</a:t>
             </a:r>
           </a:p>
         </p:txBody>
@@ -883,7 +4641,14 @@
                     <a:p>
                       <a:pPr algn="ctr"/>
                       <a:r>
-                        <a:rPr lang="en-US" sz="2000" b="1" i="0"/>
+                        <a:rPr lang="en-US" sz="2000" b="1" i="0">
+                          <a:solidFill>
+                            <a:srgbClr val="000000"/>
+                          </a:solidFill>
+                          <a:latin typeface="Calibri"/>
+                          <a:ea typeface="Calibri"/>
+                          <a:cs typeface="Calibri"/>
+                        </a:rPr>
                         <a:t>Header 1</a:t>
                       </a:r>
                     </a:p>
@@ -901,7 +4666,14 @@
                     <a:p>
                       <a:pPr algn="ctr"/>
                       <a:r>
-                        <a:rPr lang="en-US" sz="2000" b="1" i="0"/>
+                        <a:rPr lang="en-US" sz="2000" b="1" i="0">
+                          <a:solidFill>
+                            <a:srgbClr val="000000"/>
+                          </a:solidFill>
+                          <a:latin typeface="Calibri"/>
+                          <a:ea typeface="Calibri"/>
+                          <a:cs typeface="Calibri"/>
+                        </a:rPr>
                         <a:t>Header 2</a:t>
                       </a:r>
                     </a:p>
@@ -919,7 +4691,14 @@
                     <a:p>
                       <a:pPr algn="ctr"/>
                       <a:r>
-                        <a:rPr lang="en-US" sz="2000" b="1" i="0"/>
+                        <a:rPr lang="en-US" sz="2000" b="1" i="0">
+                          <a:solidFill>
+                            <a:srgbClr val="000000"/>
+                          </a:solidFill>
+                          <a:latin typeface="Calibri"/>
+                          <a:ea typeface="Calibri"/>
+                          <a:cs typeface="Calibri"/>
+                        </a:rPr>
                         <a:t>Header 3</a:t>
                       </a:r>
                     </a:p>
@@ -939,7 +4718,14 @@
                     <a:p>
                       <a:pPr algn="ctr"/>
                       <a:r>
-                        <a:rPr lang="en-US" sz="2000" b="1" i="0"/>
+                        <a:rPr lang="en-US" sz="2000" b="1" i="0">
+                          <a:solidFill>
+                            <a:srgbClr val="000000"/>
+                          </a:solidFill>
+                          <a:latin typeface="Calibri"/>
+                          <a:ea typeface="Calibri"/>
+                          <a:cs typeface="Calibri"/>
+                        </a:rPr>
                         <a:t>Bold Cell</a:t>
                       </a:r>
                     </a:p>
@@ -957,7 +4743,14 @@
                     <a:p>
                       <a:pPr algn="ctr"/>
                       <a:r>
-                        <a:rPr lang="en-US" sz="2000" b="0" i="0"/>
+                        <a:rPr lang="en-US" sz="2000" b="0" i="0">
+                          <a:solidFill>
+                            <a:srgbClr val="000000"/>
+                          </a:solidFill>
+                          <a:latin typeface="Calibri"/>
+                          <a:ea typeface="Calibri"/>
+                          <a:cs typeface="Calibri"/>
+                        </a:rPr>
                         <a:t>Normal Cell</a:t>
                       </a:r>
                     </a:p>
@@ -975,7 +4768,14 @@
                     <a:p>
                       <a:pPr algn="ctr"/>
                       <a:r>
-                        <a:rPr lang="en-US" sz="2000" b="0" i="0"/>
+                        <a:rPr lang="en-US" sz="2000" b="0" i="0">
+                          <a:solidFill>
+                            <a:srgbClr val="000000"/>
+                          </a:solidFill>
+                          <a:latin typeface="Calibri"/>
+                          <a:ea typeface="Calibri"/>
+                          <a:cs typeface="Calibri"/>
+                        </a:rPr>
                         <a:t>Colored</a:t>
                       </a:r>
                     </a:p>
@@ -995,7 +4795,14 @@
                     <a:p>
                       <a:pPr algn="ctr"/>
                       <a:r>
-                        <a:rPr lang="en-US" sz="2000" b="0" i="0"/>
+                        <a:rPr lang="en-US" sz="2000" b="0" i="0">
+                          <a:solidFill>
+                            <a:srgbClr val="000000"/>
+                          </a:solidFill>
+                          <a:latin typeface="Calibri"/>
+                          <a:ea typeface="Calibri"/>
+                          <a:cs typeface="Calibri"/>
+                        </a:rPr>
                         <a:t>Red BG</a:t>
                       </a:r>
                     </a:p>
@@ -1013,7 +4820,14 @@
                     <a:p>
                       <a:pPr algn="ctr"/>
                       <a:r>
-                        <a:rPr lang="en-US" sz="2000" b="0" i="0"/>
+                        <a:rPr lang="en-US" sz="2000" b="0" i="0">
+                          <a:solidFill>
+                            <a:srgbClr val="000000"/>
+                          </a:solidFill>
+                          <a:latin typeface="Calibri"/>
+                          <a:ea typeface="Calibri"/>
+                          <a:cs typeface="Calibri"/>
+                        </a:rPr>
                         <a:t>Green BG</a:t>
                       </a:r>
                     </a:p>
@@ -1031,7 +4845,14 @@
                     <a:p>
                       <a:pPr algn="ctr"/>
                       <a:r>
-                        <a:rPr lang="en-US" sz="2000" b="0" i="0"/>
+                        <a:rPr lang="en-US" sz="2000" b="0" i="0">
+                          <a:solidFill>
+                            <a:srgbClr val="000000"/>
+                          </a:solidFill>
+                          <a:latin typeface="Calibri"/>
+                          <a:ea typeface="Calibri"/>
+                          <a:cs typeface="Calibri"/>
+                        </a:rPr>
                         <a:t>Blue BG</a:t>
                       </a:r>
                     </a:p>
@@ -1051,7 +4872,14 @@
                     <a:p>
                       <a:pPr algn="ctr"/>
                       <a:r>
-                        <a:rPr lang="en-US" sz="2000" b="0" i="0"/>
+                        <a:rPr lang="en-US" sz="2000" b="0" i="0">
+                          <a:solidFill>
+                            <a:srgbClr val="000000"/>
+                          </a:solidFill>
+                          <a:latin typeface="Calibri"/>
+                          <a:ea typeface="Calibri"/>
+                          <a:cs typeface="Calibri"/>
+                        </a:rPr>
                         <a:t>Row 3 Col 1</a:t>
                       </a:r>
                     </a:p>
@@ -1069,7 +4897,14 @@
                     <a:p>
                       <a:pPr algn="ctr"/>
                       <a:r>
-                        <a:rPr lang="en-US" sz="2000" b="0" i="0"/>
+                        <a:rPr lang="en-US" sz="2000" b="0" i="0">
+                          <a:solidFill>
+                            <a:srgbClr val="000000"/>
+                          </a:solidFill>
+                          <a:latin typeface="Calibri"/>
+                          <a:ea typeface="Calibri"/>
+                          <a:cs typeface="Calibri"/>
+                        </a:rPr>
                         <a:t>Row 3 Col 2</a:t>
                       </a:r>
                     </a:p>
@@ -1087,7 +4922,14 @@
                     <a:p>
                       <a:pPr algn="ctr"/>
                       <a:r>
-                        <a:rPr lang="en-US" sz="2000" b="1" i="0"/>
+                        <a:rPr lang="en-US" sz="2000" b="1" i="0">
+                          <a:solidFill>
+                            <a:srgbClr val="000000"/>
+                          </a:solidFill>
+                          <a:latin typeface="Calibri"/>
+                          <a:ea typeface="Calibri"/>
+                          <a:cs typeface="Calibri"/>
+                        </a:rPr>
                         <a:t>Row 3 Col 3</a:t>
                       </a:r>
                     </a:p>

</xml_diff>

<commit_message>
Simplify table cell XML generation to match PowerPoint reference structure with txBody before tcPr
- Reorder XML elements: txBody must come before tcPr (critical for PowerPoint compatibility)
- Simplify run properties: only include formatting attributes when needed (bold, italic, underline, font size)
- Remove redundant attributes: drop margins, anchors, wrap settings, and alignment from simplified format
- Remove default values: no longer force black text color or Calibri font when not specified
- Remove
</commit_message>
<xml_diff>
--- a/comprehensive_demo.pptx
+++ b/comprehensive_demo.pptx
@@ -608,512 +608,388 @@
               </a:tblGrid>
               <a:tr h="400000">
                 <a:tc>
-                  <a:tcPr marL="91440" marR="91440" marT="45720" marB="45720" anchor="ctr" anchorCtr="0">
+                  <a:txBody>
+                    <a:bodyPr/>
+                    <a:lstStyle/>
+                    <a:p>
+                      <a:r>
+                        <a:rPr lang="en-US" dirty="0" b="1" sz="1400">
+                          <a:solidFill>
+                            <a:srgbClr val="FFFFFF"/>
+                          </a:solidFill>
+                        </a:rPr>
+                        <a:t>Q1 2024 Financial Report</a:t>
+                      </a:r>
+                    </a:p>
+                  </a:txBody>
+                  <a:tcPr>
                     <a:solidFill>
                       <a:srgbClr val="1F4E79"/>
                     </a:solidFill>
                   </a:tcPr>
-                  <a:txBody>
-                    <a:bodyPr rot="0" vert="horz" anchor="ctr" anchorCtr="0" wrap="square"/>
-                    <a:lstStyle/>
-                    <a:p>
-                      <a:pPr algn="ctr"/>
-                      <a:r>
-                        <a:rPr lang="en-US" sz="1400" b="1" i="0" dirty="0">
-                          <a:solidFill>
-                            <a:srgbClr val="FFFFFF"/>
-                          </a:solidFill>
-                          <a:latin typeface="Calibri"/>
-                          <a:ea typeface="Calibri"/>
-                          <a:cs typeface="Calibri"/>
-                        </a:rPr>
-                        <a:t>Q1 2024 Financial Report</a:t>
-                      </a:r>
-                    </a:p>
-                  </a:txBody>
-                </a:tc>
-                <a:tc>
-                  <a:tcPr marL="91440" marR="91440" marT="45720" marB="45720" anchor="ctr" anchorCtr="0">
+                </a:tc>
+                <a:tc>
+                  <a:txBody>
+                    <a:bodyPr/>
+                    <a:lstStyle/>
+                    <a:p>
+                      <a:r>
+                        <a:rPr lang="en-US" dirty="0"/>
+                        <a:t/>
+                      </a:r>
+                    </a:p>
+                  </a:txBody>
+                  <a:tcPr>
                     <a:solidFill>
                       <a:srgbClr val="1F4E79"/>
                     </a:solidFill>
                   </a:tcPr>
-                  <a:txBody>
-                    <a:bodyPr rot="0" vert="horz" anchor="ctr" anchorCtr="0" wrap="square"/>
-                    <a:lstStyle/>
-                    <a:p>
-                      <a:pPr algn="ctr"/>
-                      <a:r>
-                        <a:rPr lang="en-US" sz="1800" b="0" i="0" dirty="0">
-                          <a:solidFill>
-                            <a:srgbClr val="000000"/>
-                          </a:solidFill>
-                          <a:latin typeface="Calibri"/>
-                          <a:ea typeface="Calibri"/>
-                          <a:cs typeface="Calibri"/>
-                        </a:rPr>
+                </a:tc>
+                <a:tc>
+                  <a:txBody>
+                    <a:bodyPr/>
+                    <a:lstStyle/>
+                    <a:p>
+                      <a:r>
+                        <a:rPr lang="en-US" dirty="0"/>
                         <a:t/>
                       </a:r>
                     </a:p>
                   </a:txBody>
-                </a:tc>
-                <a:tc>
-                  <a:tcPr marL="91440" marR="91440" marT="45720" marB="45720" anchor="ctr" anchorCtr="0">
+                  <a:tcPr>
                     <a:solidFill>
                       <a:srgbClr val="1F4E79"/>
                     </a:solidFill>
                   </a:tcPr>
-                  <a:txBody>
-                    <a:bodyPr rot="0" vert="horz" anchor="ctr" anchorCtr="0" wrap="square"/>
-                    <a:lstStyle/>
-                    <a:p>
-                      <a:pPr algn="ctr"/>
-                      <a:r>
-                        <a:rPr lang="en-US" sz="1800" b="0" i="0" dirty="0">
-                          <a:solidFill>
-                            <a:srgbClr val="000000"/>
-                          </a:solidFill>
-                          <a:latin typeface="Calibri"/>
-                          <a:ea typeface="Calibri"/>
-                          <a:cs typeface="Calibri"/>
-                        </a:rPr>
+                </a:tc>
+                <a:tc>
+                  <a:txBody>
+                    <a:bodyPr/>
+                    <a:lstStyle/>
+                    <a:p>
+                      <a:r>
+                        <a:rPr lang="en-US" dirty="0"/>
                         <a:t/>
                       </a:r>
                     </a:p>
                   </a:txBody>
-                </a:tc>
-                <a:tc>
-                  <a:tcPr marL="91440" marR="91440" marT="45720" marB="45720" anchor="ctr" anchorCtr="0">
+                  <a:tcPr>
                     <a:solidFill>
                       <a:srgbClr val="1F4E79"/>
                     </a:solidFill>
                   </a:tcPr>
-                  <a:txBody>
-                    <a:bodyPr rot="0" vert="horz" anchor="ctr" anchorCtr="0" wrap="square"/>
-                    <a:lstStyle/>
-                    <a:p>
-                      <a:pPr algn="ctr"/>
-                      <a:r>
-                        <a:rPr lang="en-US" sz="1800" b="0" i="0" dirty="0">
-                          <a:solidFill>
-                            <a:srgbClr val="000000"/>
-                          </a:solidFill>
-                          <a:latin typeface="Calibri"/>
-                          <a:ea typeface="Calibri"/>
-                          <a:cs typeface="Calibri"/>
-                        </a:rPr>
-                        <a:t/>
-                      </a:r>
-                    </a:p>
-                  </a:txBody>
                 </a:tc>
               </a:tr>
               <a:tr h="400000">
                 <a:tc>
-                  <a:tcPr marL="91440" marR="91440" marT="45720" marB="45720" anchor="ctr" anchorCtr="0">
+                  <a:txBody>
+                    <a:bodyPr/>
+                    <a:lstStyle/>
+                    <a:p>
+                      <a:r>
+                        <a:rPr lang="en-US" dirty="0" b="1">
+                          <a:solidFill>
+                            <a:srgbClr val="FFFFFF"/>
+                          </a:solidFill>
+                        </a:rPr>
+                        <a:t>Category</a:t>
+                      </a:r>
+                    </a:p>
+                  </a:txBody>
+                  <a:tcPr>
                     <a:solidFill>
                       <a:srgbClr val="2E75B6"/>
                     </a:solidFill>
                   </a:tcPr>
-                  <a:txBody>
-                    <a:bodyPr rot="0" vert="horz" anchor="ctr" anchorCtr="0" wrap="square"/>
-                    <a:lstStyle/>
-                    <a:p>
-                      <a:pPr algn="ctr"/>
-                      <a:r>
-                        <a:rPr lang="en-US" sz="1800" b="1" i="0" dirty="0">
+                </a:tc>
+                <a:tc>
+                  <a:txBody>
+                    <a:bodyPr/>
+                    <a:lstStyle/>
+                    <a:p>
+                      <a:r>
+                        <a:rPr lang="en-US" dirty="0" b="1">
                           <a:solidFill>
                             <a:srgbClr val="FFFFFF"/>
                           </a:solidFill>
-                          <a:latin typeface="Calibri"/>
-                          <a:ea typeface="Calibri"/>
-                          <a:cs typeface="Calibri"/>
-                        </a:rPr>
-                        <a:t>Category</a:t>
-                      </a:r>
-                    </a:p>
-                  </a:txBody>
-                </a:tc>
-                <a:tc>
-                  <a:tcPr marL="91440" marR="91440" marT="45720" marB="45720" anchor="ctr" anchorCtr="0">
+                        </a:rPr>
+                        <a:t>Revenue</a:t>
+                      </a:r>
+                    </a:p>
+                  </a:txBody>
+                  <a:tcPr>
                     <a:solidFill>
                       <a:srgbClr val="2E75B6"/>
                     </a:solidFill>
                   </a:tcPr>
-                  <a:txBody>
-                    <a:bodyPr rot="0" vert="horz" anchor="ctr" anchorCtr="0" wrap="square"/>
-                    <a:lstStyle/>
-                    <a:p>
-                      <a:pPr algn="ctr"/>
-                      <a:r>
-                        <a:rPr lang="en-US" sz="1800" b="1" i="0" dirty="0">
+                </a:tc>
+                <a:tc>
+                  <a:txBody>
+                    <a:bodyPr/>
+                    <a:lstStyle/>
+                    <a:p>
+                      <a:r>
+                        <a:rPr lang="en-US" dirty="0" b="1">
                           <a:solidFill>
                             <a:srgbClr val="FFFFFF"/>
                           </a:solidFill>
-                          <a:latin typeface="Calibri"/>
-                          <a:ea typeface="Calibri"/>
-                          <a:cs typeface="Calibri"/>
-                        </a:rPr>
-                        <a:t>Revenue</a:t>
-                      </a:r>
-                    </a:p>
-                  </a:txBody>
-                </a:tc>
-                <a:tc>
-                  <a:tcPr marL="91440" marR="91440" marT="45720" marB="45720" anchor="ctr" anchorCtr="0">
+                        </a:rPr>
+                        <a:t>Expenses</a:t>
+                      </a:r>
+                    </a:p>
+                  </a:txBody>
+                  <a:tcPr>
                     <a:solidFill>
                       <a:srgbClr val="2E75B6"/>
                     </a:solidFill>
                   </a:tcPr>
-                  <a:txBody>
-                    <a:bodyPr rot="0" vert="horz" anchor="ctr" anchorCtr="0" wrap="square"/>
-                    <a:lstStyle/>
-                    <a:p>
-                      <a:pPr algn="ctr"/>
-                      <a:r>
-                        <a:rPr lang="en-US" sz="1800" b="1" i="0" dirty="0">
+                </a:tc>
+                <a:tc>
+                  <a:txBody>
+                    <a:bodyPr/>
+                    <a:lstStyle/>
+                    <a:p>
+                      <a:r>
+                        <a:rPr lang="en-US" dirty="0" b="1">
                           <a:solidFill>
                             <a:srgbClr val="FFFFFF"/>
                           </a:solidFill>
-                          <a:latin typeface="Calibri"/>
-                          <a:ea typeface="Calibri"/>
-                          <a:cs typeface="Calibri"/>
-                        </a:rPr>
-                        <a:t>Expenses</a:t>
-                      </a:r>
-                    </a:p>
-                  </a:txBody>
-                </a:tc>
-                <a:tc>
-                  <a:tcPr marL="91440" marR="91440" marT="45720" marB="45720" anchor="ctr" anchorCtr="0">
+                        </a:rPr>
+                        <a:t>Profit</a:t>
+                      </a:r>
+                    </a:p>
+                  </a:txBody>
+                  <a:tcPr>
                     <a:solidFill>
                       <a:srgbClr val="2E75B6"/>
                     </a:solidFill>
                   </a:tcPr>
-                  <a:txBody>
-                    <a:bodyPr rot="0" vert="horz" anchor="ctr" anchorCtr="0" wrap="square"/>
-                    <a:lstStyle/>
-                    <a:p>
-                      <a:pPr algn="ctr"/>
-                      <a:r>
-                        <a:rPr lang="en-US" sz="1800" b="1" i="0" dirty="0">
-                          <a:solidFill>
-                            <a:srgbClr val="FFFFFF"/>
-                          </a:solidFill>
-                          <a:latin typeface="Calibri"/>
-                          <a:ea typeface="Calibri"/>
-                          <a:cs typeface="Calibri"/>
-                        </a:rPr>
-                        <a:t>Profit</a:t>
-                      </a:r>
-                    </a:p>
-                  </a:txBody>
                 </a:tc>
               </a:tr>
               <a:tr h="400000">
                 <a:tc>
-                  <a:tcPr marL="91440" marR="91440" marT="45720" marB="45720" anchor="ctr" anchorCtr="0">
-                    <a:solidFill>
-                      <a:srgbClr val="F2F2F2"/>
-                    </a:solidFill>
-                  </a:tcPr>
-                  <a:txBody>
-                    <a:bodyPr rot="0" vert="horz" anchor="ctr" anchorCtr="0" wrap="square"/>
-                    <a:lstStyle/>
-                    <a:p>
-                      <a:pPr algn="l"/>
-                      <a:r>
-                        <a:rPr lang="en-US" sz="1800" b="0" i="0" dirty="0">
+                  <a:txBody>
+                    <a:bodyPr/>
+                    <a:lstStyle/>
+                    <a:p>
+                      <a:r>
+                        <a:rPr lang="en-US" dirty="0">
                           <a:solidFill>
                             <a:srgbClr val="000000"/>
                           </a:solidFill>
-                          <a:latin typeface="Calibri"/>
-                          <a:ea typeface="Calibri"/>
-                          <a:cs typeface="Calibri"/>
                         </a:rPr>
                         <a:t>Product Sales</a:t>
                       </a:r>
                     </a:p>
                   </a:txBody>
-                </a:tc>
-                <a:tc>
-                  <a:tcPr marL="91440" marR="91440" marT="45720" marB="45720" anchor="ctr" anchorCtr="0">
-                    <a:solidFill>
-                      <a:srgbClr val="F2F2F2"/>
-                    </a:solidFill>
-                  </a:tcPr>
-                  <a:txBody>
-                    <a:bodyPr rot="0" vert="horz" anchor="ctr" anchorCtr="0" wrap="square"/>
-                    <a:lstStyle/>
-                    <a:p>
-                      <a:pPr algn="r"/>
-                      <a:r>
-                        <a:rPr lang="en-US" sz="1800" b="0" i="0" dirty="0">
+                  <a:tcPr/>
+                </a:tc>
+                <a:tc>
+                  <a:txBody>
+                    <a:bodyPr/>
+                    <a:lstStyle/>
+                    <a:p>
+                      <a:r>
+                        <a:rPr lang="en-US" dirty="0">
                           <a:solidFill>
                             <a:srgbClr val="2E7D32"/>
                           </a:solidFill>
-                          <a:latin typeface="Calibri"/>
-                          <a:ea typeface="Calibri"/>
-                          <a:cs typeface="Calibri"/>
                         </a:rPr>
                         <a:t>$1,250,000</a:t>
                       </a:r>
                     </a:p>
                   </a:txBody>
-                </a:tc>
-                <a:tc>
-                  <a:tcPr marL="91440" marR="91440" marT="45720" marB="45720" anchor="ctr" anchorCtr="0">
-                    <a:solidFill>
-                      <a:srgbClr val="F2F2F2"/>
-                    </a:solidFill>
-                  </a:tcPr>
-                  <a:txBody>
-                    <a:bodyPr rot="0" vert="horz" anchor="ctr" anchorCtr="0" wrap="square"/>
-                    <a:lstStyle/>
-                    <a:p>
-                      <a:pPr algn="r"/>
-                      <a:r>
-                        <a:rPr lang="en-US" sz="1800" b="0" i="0" dirty="0">
+                  <a:tcPr/>
+                </a:tc>
+                <a:tc>
+                  <a:txBody>
+                    <a:bodyPr/>
+                    <a:lstStyle/>
+                    <a:p>
+                      <a:r>
+                        <a:rPr lang="en-US" dirty="0">
                           <a:solidFill>
                             <a:srgbClr val="C62828"/>
                           </a:solidFill>
-                          <a:latin typeface="Calibri"/>
-                          <a:ea typeface="Calibri"/>
-                          <a:cs typeface="Calibri"/>
                         </a:rPr>
                         <a:t>$450,000</a:t>
                       </a:r>
                     </a:p>
                   </a:txBody>
-                </a:tc>
-                <a:tc>
-                  <a:tcPr marL="91440" marR="91440" marT="45720" marB="45720" anchor="ctr" anchorCtr="0">
-                    <a:solidFill>
-                      <a:srgbClr val="F2F2F2"/>
-                    </a:solidFill>
-                  </a:tcPr>
-                  <a:txBody>
-                    <a:bodyPr rot="0" vert="horz" anchor="ctr" anchorCtr="0" wrap="square"/>
-                    <a:lstStyle/>
-                    <a:p>
-                      <a:pPr algn="r"/>
-                      <a:r>
-                        <a:rPr lang="en-US" sz="1800" b="1" i="0" dirty="0">
+                  <a:tcPr/>
+                </a:tc>
+                <a:tc>
+                  <a:txBody>
+                    <a:bodyPr/>
+                    <a:lstStyle/>
+                    <a:p>
+                      <a:r>
+                        <a:rPr lang="en-US" dirty="0" b="1">
                           <a:solidFill>
                             <a:srgbClr val="2E7D32"/>
                           </a:solidFill>
-                          <a:latin typeface="Calibri"/>
-                          <a:ea typeface="Calibri"/>
-                          <a:cs typeface="Calibri"/>
                         </a:rPr>
                         <a:t>$800,000</a:t>
                       </a:r>
                     </a:p>
                   </a:txBody>
+                  <a:tcPr/>
                 </a:tc>
               </a:tr>
               <a:tr h="400000">
                 <a:tc>
-                  <a:tcPr marL="91440" marR="91440" marT="45720" marB="45720" anchor="ctr" anchorCtr="0">
-                    <a:solidFill>
-                      <a:srgbClr val="F2F2F2"/>
-                    </a:solidFill>
-                  </a:tcPr>
-                  <a:txBody>
-                    <a:bodyPr rot="0" vert="horz" anchor="ctr" anchorCtr="0" wrap="square"/>
-                    <a:lstStyle/>
-                    <a:p>
-                      <a:pPr algn="l"/>
-                      <a:r>
-                        <a:rPr lang="en-US" sz="1800" b="0" i="0" dirty="0">
+                  <a:txBody>
+                    <a:bodyPr/>
+                    <a:lstStyle/>
+                    <a:p>
+                      <a:r>
+                        <a:rPr lang="en-US" dirty="0">
                           <a:solidFill>
                             <a:srgbClr val="000000"/>
                           </a:solidFill>
-                          <a:latin typeface="Calibri"/>
-                          <a:ea typeface="Calibri"/>
-                          <a:cs typeface="Calibri"/>
                         </a:rPr>
                         <a:t>Services</a:t>
                       </a:r>
                     </a:p>
                   </a:txBody>
-                </a:tc>
-                <a:tc>
-                  <a:tcPr marL="91440" marR="91440" marT="45720" marB="45720" anchor="ctr" anchorCtr="0">
-                    <a:solidFill>
-                      <a:srgbClr val="F2F2F2"/>
-                    </a:solidFill>
-                  </a:tcPr>
-                  <a:txBody>
-                    <a:bodyPr rot="0" vert="horz" anchor="ctr" anchorCtr="0" wrap="square"/>
-                    <a:lstStyle/>
-                    <a:p>
-                      <a:pPr algn="r"/>
-                      <a:r>
-                        <a:rPr lang="en-US" sz="1800" b="0" i="0" dirty="0">
+                  <a:tcPr/>
+                </a:tc>
+                <a:tc>
+                  <a:txBody>
+                    <a:bodyPr/>
+                    <a:lstStyle/>
+                    <a:p>
+                      <a:r>
+                        <a:rPr lang="en-US" dirty="0">
                           <a:solidFill>
                             <a:srgbClr val="2E7D32"/>
                           </a:solidFill>
-                          <a:latin typeface="Calibri"/>
-                          <a:ea typeface="Calibri"/>
-                          <a:cs typeface="Calibri"/>
                         </a:rPr>
                         <a:t>$890,000</a:t>
                       </a:r>
                     </a:p>
                   </a:txBody>
-                </a:tc>
-                <a:tc>
-                  <a:tcPr marL="91440" marR="91440" marT="45720" marB="45720" anchor="ctr" anchorCtr="0">
-                    <a:solidFill>
-                      <a:srgbClr val="F2F2F2"/>
-                    </a:solidFill>
-                  </a:tcPr>
-                  <a:txBody>
-                    <a:bodyPr rot="0" vert="horz" anchor="ctr" anchorCtr="0" wrap="square"/>
-                    <a:lstStyle/>
-                    <a:p>
-                      <a:pPr algn="r"/>
-                      <a:r>
-                        <a:rPr lang="en-US" sz="1800" b="0" i="0" dirty="0">
+                  <a:tcPr/>
+                </a:tc>
+                <a:tc>
+                  <a:txBody>
+                    <a:bodyPr/>
+                    <a:lstStyle/>
+                    <a:p>
+                      <a:r>
+                        <a:rPr lang="en-US" dirty="0">
                           <a:solidFill>
                             <a:srgbClr val="C62828"/>
                           </a:solidFill>
-                          <a:latin typeface="Calibri"/>
-                          <a:ea typeface="Calibri"/>
-                          <a:cs typeface="Calibri"/>
                         </a:rPr>
                         <a:t>$320,000</a:t>
                       </a:r>
                     </a:p>
                   </a:txBody>
-                </a:tc>
-                <a:tc>
-                  <a:tcPr marL="91440" marR="91440" marT="45720" marB="45720" anchor="ctr" anchorCtr="0">
-                    <a:solidFill>
-                      <a:srgbClr val="F2F2F2"/>
-                    </a:solidFill>
-                  </a:tcPr>
-                  <a:txBody>
-                    <a:bodyPr rot="0" vert="horz" anchor="ctr" anchorCtr="0" wrap="square"/>
-                    <a:lstStyle/>
-                    <a:p>
-                      <a:pPr algn="r"/>
-                      <a:r>
-                        <a:rPr lang="en-US" sz="1800" b="1" i="0" dirty="0">
+                  <a:tcPr/>
+                </a:tc>
+                <a:tc>
+                  <a:txBody>
+                    <a:bodyPr/>
+                    <a:lstStyle/>
+                    <a:p>
+                      <a:r>
+                        <a:rPr lang="en-US" dirty="0" b="1">
                           <a:solidFill>
                             <a:srgbClr val="2E7D32"/>
                           </a:solidFill>
-                          <a:latin typeface="Calibri"/>
-                          <a:ea typeface="Calibri"/>
-                          <a:cs typeface="Calibri"/>
                         </a:rPr>
                         <a:t>$570,000</a:t>
                       </a:r>
                     </a:p>
                   </a:txBody>
+                  <a:tcPr/>
                 </a:tc>
               </a:tr>
               <a:tr h="400000">
                 <a:tc>
-                  <a:tcPr marL="91440" marR="91440" marT="45720" marB="45720" anchor="ctr" anchorCtr="0">
+                  <a:txBody>
+                    <a:bodyPr/>
+                    <a:lstStyle/>
+                    <a:p>
+                      <a:r>
+                        <a:rPr lang="en-US" dirty="0" b="1">
+                          <a:solidFill>
+                            <a:srgbClr val="000000"/>
+                          </a:solidFill>
+                        </a:rPr>
+                        <a:t>Total</a:t>
+                      </a:r>
+                    </a:p>
+                  </a:txBody>
+                  <a:tcPr>
                     <a:solidFill>
                       <a:srgbClr val="E7E6E6"/>
                     </a:solidFill>
                   </a:tcPr>
-                  <a:txBody>
-                    <a:bodyPr rot="0" vert="horz" anchor="ctr" anchorCtr="0" wrap="square"/>
-                    <a:lstStyle/>
-                    <a:p>
-                      <a:pPr algn="l"/>
-                      <a:r>
-                        <a:rPr lang="en-US" sz="1800" b="1" i="0" dirty="0">
+                </a:tc>
+                <a:tc>
+                  <a:txBody>
+                    <a:bodyPr/>
+                    <a:lstStyle/>
+                    <a:p>
+                      <a:r>
+                        <a:rPr lang="en-US" dirty="0" b="1">
                           <a:solidFill>
                             <a:srgbClr val="000000"/>
                           </a:solidFill>
-                          <a:latin typeface="Calibri"/>
-                          <a:ea typeface="Calibri"/>
-                          <a:cs typeface="Calibri"/>
-                        </a:rPr>
-                        <a:t>Total</a:t>
-                      </a:r>
-                    </a:p>
-                  </a:txBody>
-                </a:tc>
-                <a:tc>
-                  <a:tcPr marL="91440" marR="91440" marT="45720" marB="45720" anchor="ctr" anchorCtr="0">
+                        </a:rPr>
+                        <a:t>$2,140,000</a:t>
+                      </a:r>
+                    </a:p>
+                  </a:txBody>
+                  <a:tcPr>
                     <a:solidFill>
                       <a:srgbClr val="E7E6E6"/>
                     </a:solidFill>
                   </a:tcPr>
-                  <a:txBody>
-                    <a:bodyPr rot="0" vert="horz" anchor="ctr" anchorCtr="0" wrap="square"/>
-                    <a:lstStyle/>
-                    <a:p>
-                      <a:pPr algn="r"/>
-                      <a:r>
-                        <a:rPr lang="en-US" sz="1800" b="1" i="0" dirty="0">
+                </a:tc>
+                <a:tc>
+                  <a:txBody>
+                    <a:bodyPr/>
+                    <a:lstStyle/>
+                    <a:p>
+                      <a:r>
+                        <a:rPr lang="en-US" dirty="0" b="1">
                           <a:solidFill>
                             <a:srgbClr val="000000"/>
                           </a:solidFill>
-                          <a:latin typeface="Calibri"/>
-                          <a:ea typeface="Calibri"/>
-                          <a:cs typeface="Calibri"/>
-                        </a:rPr>
-                        <a:t>$2,140,000</a:t>
-                      </a:r>
-                    </a:p>
-                  </a:txBody>
-                </a:tc>
-                <a:tc>
-                  <a:tcPr marL="91440" marR="91440" marT="45720" marB="45720" anchor="ctr" anchorCtr="0">
+                        </a:rPr>
+                        <a:t>$770,000</a:t>
+                      </a:r>
+                    </a:p>
+                  </a:txBody>
+                  <a:tcPr>
                     <a:solidFill>
                       <a:srgbClr val="E7E6E6"/>
                     </a:solidFill>
                   </a:tcPr>
-                  <a:txBody>
-                    <a:bodyPr rot="0" vert="horz" anchor="ctr" anchorCtr="0" wrap="square"/>
-                    <a:lstStyle/>
-                    <a:p>
-                      <a:pPr algn="r"/>
-                      <a:r>
-                        <a:rPr lang="en-US" sz="1800" b="1" i="0" dirty="0">
-                          <a:solidFill>
-                            <a:srgbClr val="000000"/>
-                          </a:solidFill>
-                          <a:latin typeface="Calibri"/>
-                          <a:ea typeface="Calibri"/>
-                          <a:cs typeface="Calibri"/>
-                        </a:rPr>
-                        <a:t>$770,000</a:t>
-                      </a:r>
-                    </a:p>
-                  </a:txBody>
-                </a:tc>
-                <a:tc>
-                  <a:tcPr marL="91440" marR="91440" marT="45720" marB="45720" anchor="ctr" anchorCtr="0">
+                </a:tc>
+                <a:tc>
+                  <a:txBody>
+                    <a:bodyPr/>
+                    <a:lstStyle/>
+                    <a:p>
+                      <a:r>
+                        <a:rPr lang="en-US" dirty="0" b="1">
+                          <a:solidFill>
+                            <a:srgbClr val="006100"/>
+                          </a:solidFill>
+                        </a:rPr>
+                        <a:t>$1,370,000</a:t>
+                      </a:r>
+                    </a:p>
+                  </a:txBody>
+                  <a:tcPr>
                     <a:solidFill>
                       <a:srgbClr val="C6EFCE"/>
                     </a:solidFill>
                   </a:tcPr>
-                  <a:txBody>
-                    <a:bodyPr rot="0" vert="horz" anchor="ctr" anchorCtr="0" wrap="square"/>
-                    <a:lstStyle/>
-                    <a:p>
-                      <a:pPr algn="r"/>
-                      <a:r>
-                        <a:rPr lang="en-US" sz="1800" b="1" i="0" dirty="0">
-                          <a:solidFill>
-                            <a:srgbClr val="006100"/>
-                          </a:solidFill>
-                          <a:latin typeface="Calibri"/>
-                          <a:ea typeface="Calibri"/>
-                          <a:cs typeface="Calibri"/>
-                        </a:rPr>
-                        <a:t>$1,370,000</a:t>
-                      </a:r>
-                    </a:p>
-                  </a:txBody>
                 </a:tc>
               </a:tr>
             </a:tbl>
@@ -1204,614 +1080,454 @@
               </a:tblGrid>
               <a:tr h="400000">
                 <a:tc>
-                  <a:tcPr marL="91440" marR="91440" marT="45720" marB="45720" anchor="ctr" anchorCtr="0">
+                  <a:txBody>
+                    <a:bodyPr/>
+                    <a:lstStyle/>
+                    <a:p>
+                      <a:r>
+                        <a:rPr lang="en-US" dirty="0" b="1">
+                          <a:solidFill>
+                            <a:srgbClr val="FFFFFF"/>
+                          </a:solidFill>
+                        </a:rPr>
+                        <a:t>Feature</a:t>
+                      </a:r>
+                    </a:p>
+                  </a:txBody>
+                  <a:tcPr>
                     <a:solidFill>
                       <a:srgbClr val="4472C4"/>
                     </a:solidFill>
                   </a:tcPr>
-                  <a:txBody>
-                    <a:bodyPr rot="0" vert="horz" anchor="ctr" anchorCtr="0" wrap="square"/>
-                    <a:lstStyle/>
-                    <a:p>
-                      <a:pPr algn="ctr"/>
-                      <a:r>
-                        <a:rPr lang="en-US" sz="1800" b="1" i="0" dirty="0">
+                </a:tc>
+                <a:tc>
+                  <a:txBody>
+                    <a:bodyPr/>
+                    <a:lstStyle/>
+                    <a:p>
+                      <a:r>
+                        <a:rPr lang="en-US" dirty="0" b="1">
                           <a:solidFill>
                             <a:srgbClr val="FFFFFF"/>
                           </a:solidFill>
-                          <a:latin typeface="Calibri"/>
-                          <a:ea typeface="Calibri"/>
-                          <a:cs typeface="Calibri"/>
-                        </a:rPr>
-                        <a:t>Feature</a:t>
-                      </a:r>
-                    </a:p>
-                  </a:txBody>
-                </a:tc>
-                <a:tc>
-                  <a:tcPr marL="91440" marR="91440" marT="45720" marB="45720" anchor="ctr" anchorCtr="0">
+                        </a:rPr>
+                        <a:t>Basic</a:t>
+                      </a:r>
+                    </a:p>
+                  </a:txBody>
+                  <a:tcPr>
                     <a:solidFill>
                       <a:srgbClr val="4472C4"/>
                     </a:solidFill>
                   </a:tcPr>
-                  <a:txBody>
-                    <a:bodyPr rot="0" vert="horz" anchor="ctr" anchorCtr="0" wrap="square"/>
-                    <a:lstStyle/>
-                    <a:p>
-                      <a:pPr algn="ctr"/>
-                      <a:r>
-                        <a:rPr lang="en-US" sz="1800" b="1" i="0" dirty="0">
+                </a:tc>
+                <a:tc>
+                  <a:txBody>
+                    <a:bodyPr/>
+                    <a:lstStyle/>
+                    <a:p>
+                      <a:r>
+                        <a:rPr lang="en-US" dirty="0" b="1">
                           <a:solidFill>
                             <a:srgbClr val="FFFFFF"/>
                           </a:solidFill>
-                          <a:latin typeface="Calibri"/>
-                          <a:ea typeface="Calibri"/>
-                          <a:cs typeface="Calibri"/>
-                        </a:rPr>
-                        <a:t>Basic</a:t>
-                      </a:r>
-                    </a:p>
-                  </a:txBody>
-                </a:tc>
-                <a:tc>
-                  <a:tcPr marL="91440" marR="91440" marT="45720" marB="45720" anchor="ctr" anchorCtr="0">
+                        </a:rPr>
+                        <a:t>Pro</a:t>
+                      </a:r>
+                    </a:p>
+                  </a:txBody>
+                  <a:tcPr>
                     <a:solidFill>
                       <a:srgbClr val="4472C4"/>
                     </a:solidFill>
                   </a:tcPr>
-                  <a:txBody>
-                    <a:bodyPr rot="0" vert="horz" anchor="ctr" anchorCtr="0" wrap="square"/>
-                    <a:lstStyle/>
-                    <a:p>
-                      <a:pPr algn="ctr"/>
-                      <a:r>
-                        <a:rPr lang="en-US" sz="1800" b="1" i="0" dirty="0">
+                </a:tc>
+                <a:tc>
+                  <a:txBody>
+                    <a:bodyPr/>
+                    <a:lstStyle/>
+                    <a:p>
+                      <a:r>
+                        <a:rPr lang="en-US" dirty="0" b="1">
                           <a:solidFill>
                             <a:srgbClr val="FFFFFF"/>
                           </a:solidFill>
-                          <a:latin typeface="Calibri"/>
-                          <a:ea typeface="Calibri"/>
-                          <a:cs typeface="Calibri"/>
-                        </a:rPr>
-                        <a:t>Pro</a:t>
-                      </a:r>
-                    </a:p>
-                  </a:txBody>
-                </a:tc>
-                <a:tc>
-                  <a:tcPr marL="91440" marR="91440" marT="45720" marB="45720" anchor="ctr" anchorCtr="0">
+                        </a:rPr>
+                        <a:t>Enterprise</a:t>
+                      </a:r>
+                    </a:p>
+                  </a:txBody>
+                  <a:tcPr>
                     <a:solidFill>
                       <a:srgbClr val="4472C4"/>
                     </a:solidFill>
                   </a:tcPr>
-                  <a:txBody>
-                    <a:bodyPr rot="0" vert="horz" anchor="ctr" anchorCtr="0" wrap="square"/>
-                    <a:lstStyle/>
-                    <a:p>
-                      <a:pPr algn="ctr"/>
-                      <a:r>
-                        <a:rPr lang="en-US" sz="1800" b="1" i="0" dirty="0">
-                          <a:solidFill>
-                            <a:srgbClr val="FFFFFF"/>
-                          </a:solidFill>
-                          <a:latin typeface="Calibri"/>
-                          <a:ea typeface="Calibri"/>
-                          <a:cs typeface="Calibri"/>
-                        </a:rPr>
-                        <a:t>Enterprise</a:t>
-                      </a:r>
-                    </a:p>
-                  </a:txBody>
                 </a:tc>
               </a:tr>
               <a:tr h="400000">
                 <a:tc>
-                  <a:tcPr marL="91440" marR="91440" marT="45720" marB="45720" anchor="ctr" anchorCtr="0">
+                  <a:txBody>
+                    <a:bodyPr/>
+                    <a:lstStyle/>
+                    <a:p>
+                      <a:r>
+                        <a:rPr lang="en-US" dirty="0">
+                          <a:solidFill>
+                            <a:srgbClr val="000000"/>
+                          </a:solidFill>
+                        </a:rPr>
+                        <a:t>Storage</a:t>
+                      </a:r>
+                    </a:p>
+                  </a:txBody>
+                  <a:tcPr/>
+                </a:tc>
+                <a:tc>
+                  <a:txBody>
+                    <a:bodyPr/>
+                    <a:lstStyle/>
+                    <a:p>
+                      <a:r>
+                        <a:rPr lang="en-US" dirty="0">
+                          <a:solidFill>
+                            <a:srgbClr val="000000"/>
+                          </a:solidFill>
+                        </a:rPr>
+                        <a:t>5 GB</a:t>
+                      </a:r>
+                    </a:p>
+                  </a:txBody>
+                  <a:tcPr/>
+                </a:tc>
+                <a:tc>
+                  <a:txBody>
+                    <a:bodyPr/>
+                    <a:lstStyle/>
+                    <a:p>
+                      <a:r>
+                        <a:rPr lang="en-US" dirty="0">
+                          <a:solidFill>
+                            <a:srgbClr val="000000"/>
+                          </a:solidFill>
+                        </a:rPr>
+                        <a:t>50 GB</a:t>
+                      </a:r>
+                    </a:p>
+                  </a:txBody>
+                  <a:tcPr/>
+                </a:tc>
+                <a:tc>
+                  <a:txBody>
+                    <a:bodyPr/>
+                    <a:lstStyle/>
+                    <a:p>
+                      <a:r>
+                        <a:rPr lang="en-US" dirty="0" b="1">
+                          <a:solidFill>
+                            <a:srgbClr val="2E7D32"/>
+                          </a:solidFill>
+                        </a:rPr>
+                        <a:t>Unlimited</a:t>
+                      </a:r>
+                    </a:p>
+                  </a:txBody>
+                  <a:tcPr/>
+                </a:tc>
+              </a:tr>
+              <a:tr h="400000">
+                <a:tc>
+                  <a:txBody>
+                    <a:bodyPr/>
+                    <a:lstStyle/>
+                    <a:p>
+                      <a:r>
+                        <a:rPr lang="en-US" dirty="0">
+                          <a:solidFill>
+                            <a:srgbClr val="000000"/>
+                          </a:solidFill>
+                        </a:rPr>
+                        <a:t>Users</a:t>
+                      </a:r>
+                    </a:p>
+                  </a:txBody>
+                  <a:tcPr/>
+                </a:tc>
+                <a:tc>
+                  <a:txBody>
+                    <a:bodyPr/>
+                    <a:lstStyle/>
+                    <a:p>
+                      <a:r>
+                        <a:rPr lang="en-US" dirty="0">
+                          <a:solidFill>
+                            <a:srgbClr val="000000"/>
+                          </a:solidFill>
+                        </a:rPr>
+                        <a:t>1</a:t>
+                      </a:r>
+                    </a:p>
+                  </a:txBody>
+                  <a:tcPr/>
+                </a:tc>
+                <a:tc>
+                  <a:txBody>
+                    <a:bodyPr/>
+                    <a:lstStyle/>
+                    <a:p>
+                      <a:r>
+                        <a:rPr lang="en-US" dirty="0">
+                          <a:solidFill>
+                            <a:srgbClr val="000000"/>
+                          </a:solidFill>
+                        </a:rPr>
+                        <a:t>10</a:t>
+                      </a:r>
+                    </a:p>
+                  </a:txBody>
+                  <a:tcPr/>
+                </a:tc>
+                <a:tc>
+                  <a:txBody>
+                    <a:bodyPr/>
+                    <a:lstStyle/>
+                    <a:p>
+                      <a:r>
+                        <a:rPr lang="en-US" dirty="0" b="1">
+                          <a:solidFill>
+                            <a:srgbClr val="2E7D32"/>
+                          </a:solidFill>
+                        </a:rPr>
+                        <a:t>Unlimited</a:t>
+                      </a:r>
+                    </a:p>
+                  </a:txBody>
+                  <a:tcPr/>
+                </a:tc>
+              </a:tr>
+              <a:tr h="400000">
+                <a:tc>
+                  <a:txBody>
+                    <a:bodyPr/>
+                    <a:lstStyle/>
+                    <a:p>
+                      <a:r>
+                        <a:rPr lang="en-US" dirty="0">
+                          <a:solidFill>
+                            <a:srgbClr val="000000"/>
+                          </a:solidFill>
+                        </a:rPr>
+                        <a:t>Support</a:t>
+                      </a:r>
+                    </a:p>
+                  </a:txBody>
+                  <a:tcPr/>
+                </a:tc>
+                <a:tc>
+                  <a:txBody>
+                    <a:bodyPr/>
+                    <a:lstStyle/>
+                    <a:p>
+                      <a:r>
+                        <a:rPr lang="en-US" dirty="0">
+                          <a:solidFill>
+                            <a:srgbClr val="000000"/>
+                          </a:solidFill>
+                        </a:rPr>
+                        <a:t>Email</a:t>
+                      </a:r>
+                    </a:p>
+                  </a:txBody>
+                  <a:tcPr/>
+                </a:tc>
+                <a:tc>
+                  <a:txBody>
+                    <a:bodyPr/>
+                    <a:lstStyle/>
+                    <a:p>
+                      <a:r>
+                        <a:rPr lang="en-US" dirty="0">
+                          <a:solidFill>
+                            <a:srgbClr val="000000"/>
+                          </a:solidFill>
+                        </a:rPr>
+                        <a:t>24/7 Chat</a:t>
+                      </a:r>
+                    </a:p>
+                  </a:txBody>
+                  <a:tcPr/>
+                </a:tc>
+                <a:tc>
+                  <a:txBody>
+                    <a:bodyPr/>
+                    <a:lstStyle/>
+                    <a:p>
+                      <a:r>
+                        <a:rPr lang="en-US" dirty="0" b="1">
+                          <a:solidFill>
+                            <a:srgbClr val="2E7D32"/>
+                          </a:solidFill>
+                        </a:rPr>
+                        <a:t>Dedicated</a:t>
+                      </a:r>
+                    </a:p>
+                  </a:txBody>
+                  <a:tcPr/>
+                </a:tc>
+              </a:tr>
+              <a:tr h="400000">
+                <a:tc>
+                  <a:txBody>
+                    <a:bodyPr/>
+                    <a:lstStyle/>
+                    <a:p>
+                      <a:r>
+                        <a:rPr lang="en-US" dirty="0">
+                          <a:solidFill>
+                            <a:srgbClr val="000000"/>
+                          </a:solidFill>
+                        </a:rPr>
+                        <a:t>API Access</a:t>
+                      </a:r>
+                    </a:p>
+                  </a:txBody>
+                  <a:tcPr/>
+                </a:tc>
+                <a:tc>
+                  <a:txBody>
+                    <a:bodyPr/>
+                    <a:lstStyle/>
+                    <a:p>
+                      <a:r>
+                        <a:rPr lang="en-US" dirty="0">
+                          <a:solidFill>
+                            <a:srgbClr val="C62828"/>
+                          </a:solidFill>
+                        </a:rPr>
+                        <a:t>No</a:t>
+                      </a:r>
+                    </a:p>
+                  </a:txBody>
+                  <a:tcPr/>
+                </a:tc>
+                <a:tc>
+                  <a:txBody>
+                    <a:bodyPr/>
+                    <a:lstStyle/>
+                    <a:p>
+                      <a:r>
+                        <a:rPr lang="en-US" dirty="0">
+                          <a:solidFill>
+                            <a:srgbClr val="2E7D32"/>
+                          </a:solidFill>
+                        </a:rPr>
+                        <a:t>Yes</a:t>
+                      </a:r>
+                    </a:p>
+                  </a:txBody>
+                  <a:tcPr/>
+                </a:tc>
+                <a:tc>
+                  <a:txBody>
+                    <a:bodyPr/>
+                    <a:lstStyle/>
+                    <a:p>
+                      <a:r>
+                        <a:rPr lang="en-US" dirty="0" b="1">
+                          <a:solidFill>
+                            <a:srgbClr val="2E7D32"/>
+                          </a:solidFill>
+                        </a:rPr>
+                        <a:t>Yes + Priority</a:t>
+                      </a:r>
+                    </a:p>
+                  </a:txBody>
+                  <a:tcPr/>
+                </a:tc>
+              </a:tr>
+              <a:tr h="400000">
+                <a:tc>
+                  <a:txBody>
+                    <a:bodyPr/>
+                    <a:lstStyle/>
+                    <a:p>
+                      <a:r>
+                        <a:rPr lang="en-US" dirty="0" b="1">
+                          <a:solidFill>
+                            <a:srgbClr val="000000"/>
+                          </a:solidFill>
+                        </a:rPr>
+                        <a:t>Price/month</a:t>
+                      </a:r>
+                    </a:p>
+                  </a:txBody>
+                  <a:tcPr>
                     <a:solidFill>
                       <a:srgbClr val="F2F2F2"/>
                     </a:solidFill>
                   </a:tcPr>
-                  <a:txBody>
-                    <a:bodyPr rot="0" vert="horz" anchor="ctr" anchorCtr="0" wrap="square"/>
-                    <a:lstStyle/>
-                    <a:p>
-                      <a:pPr algn="ctr"/>
-                      <a:r>
-                        <a:rPr lang="en-US" sz="1800" b="0" i="0" dirty="0">
+                </a:tc>
+                <a:tc>
+                  <a:txBody>
+                    <a:bodyPr/>
+                    <a:lstStyle/>
+                    <a:p>
+                      <a:r>
+                        <a:rPr lang="en-US" dirty="0" b="1">
                           <a:solidFill>
                             <a:srgbClr val="000000"/>
                           </a:solidFill>
-                          <a:latin typeface="Calibri"/>
-                          <a:ea typeface="Calibri"/>
-                          <a:cs typeface="Calibri"/>
-                        </a:rPr>
-                        <a:t>Storage</a:t>
-                      </a:r>
-                    </a:p>
-                  </a:txBody>
-                </a:tc>
-                <a:tc>
-                  <a:tcPr marL="91440" marR="91440" marT="45720" marB="45720" anchor="ctr" anchorCtr="0">
+                        </a:rPr>
+                        <a:t>$9</a:t>
+                      </a:r>
+                    </a:p>
+                  </a:txBody>
+                  <a:tcPr>
                     <a:solidFill>
                       <a:srgbClr val="F2F2F2"/>
                     </a:solidFill>
                   </a:tcPr>
-                  <a:txBody>
-                    <a:bodyPr rot="0" vert="horz" anchor="ctr" anchorCtr="0" wrap="square"/>
-                    <a:lstStyle/>
-                    <a:p>
-                      <a:pPr algn="ctr"/>
-                      <a:r>
-                        <a:rPr lang="en-US" sz="1800" b="0" i="0" dirty="0">
+                </a:tc>
+                <a:tc>
+                  <a:txBody>
+                    <a:bodyPr/>
+                    <a:lstStyle/>
+                    <a:p>
+                      <a:r>
+                        <a:rPr lang="en-US" dirty="0" b="1">
                           <a:solidFill>
                             <a:srgbClr val="000000"/>
                           </a:solidFill>
-                          <a:latin typeface="Calibri"/>
-                          <a:ea typeface="Calibri"/>
-                          <a:cs typeface="Calibri"/>
-                        </a:rPr>
-                        <a:t>5 GB</a:t>
-                      </a:r>
-                    </a:p>
-                  </a:txBody>
-                </a:tc>
-                <a:tc>
-                  <a:tcPr marL="91440" marR="91440" marT="45720" marB="45720" anchor="ctr" anchorCtr="0">
+                        </a:rPr>
+                        <a:t>$29</a:t>
+                      </a:r>
+                    </a:p>
+                  </a:txBody>
+                  <a:tcPr>
                     <a:solidFill>
                       <a:srgbClr val="F2F2F2"/>
                     </a:solidFill>
                   </a:tcPr>
-                  <a:txBody>
-                    <a:bodyPr rot="0" vert="horz" anchor="ctr" anchorCtr="0" wrap="square"/>
-                    <a:lstStyle/>
-                    <a:p>
-                      <a:pPr algn="ctr"/>
-                      <a:r>
-                        <a:rPr lang="en-US" sz="1800" b="0" i="0" dirty="0">
+                </a:tc>
+                <a:tc>
+                  <a:txBody>
+                    <a:bodyPr/>
+                    <a:lstStyle/>
+                    <a:p>
+                      <a:r>
+                        <a:rPr lang="en-US" dirty="0" b="1">
                           <a:solidFill>
                             <a:srgbClr val="000000"/>
                           </a:solidFill>
-                          <a:latin typeface="Calibri"/>
-                          <a:ea typeface="Calibri"/>
-                          <a:cs typeface="Calibri"/>
-                        </a:rPr>
-                        <a:t>50 GB</a:t>
-                      </a:r>
-                    </a:p>
-                  </a:txBody>
-                </a:tc>
-                <a:tc>
-                  <a:tcPr marL="91440" marR="91440" marT="45720" marB="45720" anchor="ctr" anchorCtr="0">
+                        </a:rPr>
+                        <a:t>$99</a:t>
+                      </a:r>
+                    </a:p>
+                  </a:txBody>
+                  <a:tcPr>
                     <a:solidFill>
                       <a:srgbClr val="F2F2F2"/>
                     </a:solidFill>
                   </a:tcPr>
-                  <a:txBody>
-                    <a:bodyPr rot="0" vert="horz" anchor="ctr" anchorCtr="0" wrap="square"/>
-                    <a:lstStyle/>
-                    <a:p>
-                      <a:pPr algn="ctr"/>
-                      <a:r>
-                        <a:rPr lang="en-US" sz="1800" b="1" i="0" dirty="0">
-                          <a:solidFill>
-                            <a:srgbClr val="2E7D32"/>
-                          </a:solidFill>
-                          <a:latin typeface="Calibri"/>
-                          <a:ea typeface="Calibri"/>
-                          <a:cs typeface="Calibri"/>
-                        </a:rPr>
-                        <a:t>Unlimited</a:t>
-                      </a:r>
-                    </a:p>
-                  </a:txBody>
-                </a:tc>
-              </a:tr>
-              <a:tr h="400000">
-                <a:tc>
-                  <a:tcPr marL="91440" marR="91440" marT="45720" marB="45720" anchor="ctr" anchorCtr="0">
-                    <a:solidFill>
-                      <a:srgbClr val="F2F2F2"/>
-                    </a:solidFill>
-                  </a:tcPr>
-                  <a:txBody>
-                    <a:bodyPr rot="0" vert="horz" anchor="ctr" anchorCtr="0" wrap="square"/>
-                    <a:lstStyle/>
-                    <a:p>
-                      <a:pPr algn="ctr"/>
-                      <a:r>
-                        <a:rPr lang="en-US" sz="1800" b="0" i="0" dirty="0">
-                          <a:solidFill>
-                            <a:srgbClr val="000000"/>
-                          </a:solidFill>
-                          <a:latin typeface="Calibri"/>
-                          <a:ea typeface="Calibri"/>
-                          <a:cs typeface="Calibri"/>
-                        </a:rPr>
-                        <a:t>Users</a:t>
-                      </a:r>
-                    </a:p>
-                  </a:txBody>
-                </a:tc>
-                <a:tc>
-                  <a:tcPr marL="91440" marR="91440" marT="45720" marB="45720" anchor="ctr" anchorCtr="0">
-                    <a:solidFill>
-                      <a:srgbClr val="F2F2F2"/>
-                    </a:solidFill>
-                  </a:tcPr>
-                  <a:txBody>
-                    <a:bodyPr rot="0" vert="horz" anchor="ctr" anchorCtr="0" wrap="square"/>
-                    <a:lstStyle/>
-                    <a:p>
-                      <a:pPr algn="ctr"/>
-                      <a:r>
-                        <a:rPr lang="en-US" sz="1800" b="0" i="0" dirty="0">
-                          <a:solidFill>
-                            <a:srgbClr val="000000"/>
-                          </a:solidFill>
-                          <a:latin typeface="Calibri"/>
-                          <a:ea typeface="Calibri"/>
-                          <a:cs typeface="Calibri"/>
-                        </a:rPr>
-                        <a:t>1</a:t>
-                      </a:r>
-                    </a:p>
-                  </a:txBody>
-                </a:tc>
-                <a:tc>
-                  <a:tcPr marL="91440" marR="91440" marT="45720" marB="45720" anchor="ctr" anchorCtr="0">
-                    <a:solidFill>
-                      <a:srgbClr val="F2F2F2"/>
-                    </a:solidFill>
-                  </a:tcPr>
-                  <a:txBody>
-                    <a:bodyPr rot="0" vert="horz" anchor="ctr" anchorCtr="0" wrap="square"/>
-                    <a:lstStyle/>
-                    <a:p>
-                      <a:pPr algn="ctr"/>
-                      <a:r>
-                        <a:rPr lang="en-US" sz="1800" b="0" i="0" dirty="0">
-                          <a:solidFill>
-                            <a:srgbClr val="000000"/>
-                          </a:solidFill>
-                          <a:latin typeface="Calibri"/>
-                          <a:ea typeface="Calibri"/>
-                          <a:cs typeface="Calibri"/>
-                        </a:rPr>
-                        <a:t>10</a:t>
-                      </a:r>
-                    </a:p>
-                  </a:txBody>
-                </a:tc>
-                <a:tc>
-                  <a:tcPr marL="91440" marR="91440" marT="45720" marB="45720" anchor="ctr" anchorCtr="0">
-                    <a:solidFill>
-                      <a:srgbClr val="F2F2F2"/>
-                    </a:solidFill>
-                  </a:tcPr>
-                  <a:txBody>
-                    <a:bodyPr rot="0" vert="horz" anchor="ctr" anchorCtr="0" wrap="square"/>
-                    <a:lstStyle/>
-                    <a:p>
-                      <a:pPr algn="ctr"/>
-                      <a:r>
-                        <a:rPr lang="en-US" sz="1800" b="1" i="0" dirty="0">
-                          <a:solidFill>
-                            <a:srgbClr val="2E7D32"/>
-                          </a:solidFill>
-                          <a:latin typeface="Calibri"/>
-                          <a:ea typeface="Calibri"/>
-                          <a:cs typeface="Calibri"/>
-                        </a:rPr>
-                        <a:t>Unlimited</a:t>
-                      </a:r>
-                    </a:p>
-                  </a:txBody>
-                </a:tc>
-              </a:tr>
-              <a:tr h="400000">
-                <a:tc>
-                  <a:tcPr marL="91440" marR="91440" marT="45720" marB="45720" anchor="ctr" anchorCtr="0">
-                    <a:solidFill>
-                      <a:srgbClr val="F2F2F2"/>
-                    </a:solidFill>
-                  </a:tcPr>
-                  <a:txBody>
-                    <a:bodyPr rot="0" vert="horz" anchor="ctr" anchorCtr="0" wrap="square"/>
-                    <a:lstStyle/>
-                    <a:p>
-                      <a:pPr algn="ctr"/>
-                      <a:r>
-                        <a:rPr lang="en-US" sz="1800" b="0" i="0" dirty="0">
-                          <a:solidFill>
-                            <a:srgbClr val="000000"/>
-                          </a:solidFill>
-                          <a:latin typeface="Calibri"/>
-                          <a:ea typeface="Calibri"/>
-                          <a:cs typeface="Calibri"/>
-                        </a:rPr>
-                        <a:t>Support</a:t>
-                      </a:r>
-                    </a:p>
-                  </a:txBody>
-                </a:tc>
-                <a:tc>
-                  <a:tcPr marL="91440" marR="91440" marT="45720" marB="45720" anchor="ctr" anchorCtr="0">
-                    <a:solidFill>
-                      <a:srgbClr val="F2F2F2"/>
-                    </a:solidFill>
-                  </a:tcPr>
-                  <a:txBody>
-                    <a:bodyPr rot="0" vert="horz" anchor="ctr" anchorCtr="0" wrap="square"/>
-                    <a:lstStyle/>
-                    <a:p>
-                      <a:pPr algn="ctr"/>
-                      <a:r>
-                        <a:rPr lang="en-US" sz="1800" b="0" i="0" dirty="0">
-                          <a:solidFill>
-                            <a:srgbClr val="000000"/>
-                          </a:solidFill>
-                          <a:latin typeface="Calibri"/>
-                          <a:ea typeface="Calibri"/>
-                          <a:cs typeface="Calibri"/>
-                        </a:rPr>
-                        <a:t>Email</a:t>
-                      </a:r>
-                    </a:p>
-                  </a:txBody>
-                </a:tc>
-                <a:tc>
-                  <a:tcPr marL="91440" marR="91440" marT="45720" marB="45720" anchor="ctr" anchorCtr="0">
-                    <a:solidFill>
-                      <a:srgbClr val="F2F2F2"/>
-                    </a:solidFill>
-                  </a:tcPr>
-                  <a:txBody>
-                    <a:bodyPr rot="0" vert="horz" anchor="ctr" anchorCtr="0" wrap="square"/>
-                    <a:lstStyle/>
-                    <a:p>
-                      <a:pPr algn="ctr"/>
-                      <a:r>
-                        <a:rPr lang="en-US" sz="1800" b="0" i="0" dirty="0">
-                          <a:solidFill>
-                            <a:srgbClr val="000000"/>
-                          </a:solidFill>
-                          <a:latin typeface="Calibri"/>
-                          <a:ea typeface="Calibri"/>
-                          <a:cs typeface="Calibri"/>
-                        </a:rPr>
-                        <a:t>24/7 Chat</a:t>
-                      </a:r>
-                    </a:p>
-                  </a:txBody>
-                </a:tc>
-                <a:tc>
-                  <a:tcPr marL="91440" marR="91440" marT="45720" marB="45720" anchor="ctr" anchorCtr="0">
-                    <a:solidFill>
-                      <a:srgbClr val="F2F2F2"/>
-                    </a:solidFill>
-                  </a:tcPr>
-                  <a:txBody>
-                    <a:bodyPr rot="0" vert="horz" anchor="ctr" anchorCtr="0" wrap="square"/>
-                    <a:lstStyle/>
-                    <a:p>
-                      <a:pPr algn="ctr"/>
-                      <a:r>
-                        <a:rPr lang="en-US" sz="1800" b="1" i="0" dirty="0">
-                          <a:solidFill>
-                            <a:srgbClr val="2E7D32"/>
-                          </a:solidFill>
-                          <a:latin typeface="Calibri"/>
-                          <a:ea typeface="Calibri"/>
-                          <a:cs typeface="Calibri"/>
-                        </a:rPr>
-                        <a:t>Dedicated</a:t>
-                      </a:r>
-                    </a:p>
-                  </a:txBody>
-                </a:tc>
-              </a:tr>
-              <a:tr h="400000">
-                <a:tc>
-                  <a:tcPr marL="91440" marR="91440" marT="45720" marB="45720" anchor="ctr" anchorCtr="0">
-                    <a:solidFill>
-                      <a:srgbClr val="F2F2F2"/>
-                    </a:solidFill>
-                  </a:tcPr>
-                  <a:txBody>
-                    <a:bodyPr rot="0" vert="horz" anchor="ctr" anchorCtr="0" wrap="square"/>
-                    <a:lstStyle/>
-                    <a:p>
-                      <a:pPr algn="ctr"/>
-                      <a:r>
-                        <a:rPr lang="en-US" sz="1800" b="0" i="0" dirty="0">
-                          <a:solidFill>
-                            <a:srgbClr val="000000"/>
-                          </a:solidFill>
-                          <a:latin typeface="Calibri"/>
-                          <a:ea typeface="Calibri"/>
-                          <a:cs typeface="Calibri"/>
-                        </a:rPr>
-                        <a:t>API Access</a:t>
-                      </a:r>
-                    </a:p>
-                  </a:txBody>
-                </a:tc>
-                <a:tc>
-                  <a:tcPr marL="91440" marR="91440" marT="45720" marB="45720" anchor="ctr" anchorCtr="0">
-                    <a:solidFill>
-                      <a:srgbClr val="F2F2F2"/>
-                    </a:solidFill>
-                  </a:tcPr>
-                  <a:txBody>
-                    <a:bodyPr rot="0" vert="horz" anchor="ctr" anchorCtr="0" wrap="square"/>
-                    <a:lstStyle/>
-                    <a:p>
-                      <a:pPr algn="ctr"/>
-                      <a:r>
-                        <a:rPr lang="en-US" sz="1800" b="0" i="0" dirty="0">
-                          <a:solidFill>
-                            <a:srgbClr val="C62828"/>
-                          </a:solidFill>
-                          <a:latin typeface="Calibri"/>
-                          <a:ea typeface="Calibri"/>
-                          <a:cs typeface="Calibri"/>
-                        </a:rPr>
-                        <a:t>No</a:t>
-                      </a:r>
-                    </a:p>
-                  </a:txBody>
-                </a:tc>
-                <a:tc>
-                  <a:tcPr marL="91440" marR="91440" marT="45720" marB="45720" anchor="ctr" anchorCtr="0">
-                    <a:solidFill>
-                      <a:srgbClr val="F2F2F2"/>
-                    </a:solidFill>
-                  </a:tcPr>
-                  <a:txBody>
-                    <a:bodyPr rot="0" vert="horz" anchor="ctr" anchorCtr="0" wrap="square"/>
-                    <a:lstStyle/>
-                    <a:p>
-                      <a:pPr algn="ctr"/>
-                      <a:r>
-                        <a:rPr lang="en-US" sz="1800" b="0" i="0" dirty="0">
-                          <a:solidFill>
-                            <a:srgbClr val="2E7D32"/>
-                          </a:solidFill>
-                          <a:latin typeface="Calibri"/>
-                          <a:ea typeface="Calibri"/>
-                          <a:cs typeface="Calibri"/>
-                        </a:rPr>
-                        <a:t>Yes</a:t>
-                      </a:r>
-                    </a:p>
-                  </a:txBody>
-                </a:tc>
-                <a:tc>
-                  <a:tcPr marL="91440" marR="91440" marT="45720" marB="45720" anchor="ctr" anchorCtr="0">
-                    <a:solidFill>
-                      <a:srgbClr val="F2F2F2"/>
-                    </a:solidFill>
-                  </a:tcPr>
-                  <a:txBody>
-                    <a:bodyPr rot="0" vert="horz" anchor="ctr" anchorCtr="0" wrap="square"/>
-                    <a:lstStyle/>
-                    <a:p>
-                      <a:pPr algn="ctr"/>
-                      <a:r>
-                        <a:rPr lang="en-US" sz="1800" b="1" i="0" dirty="0">
-                          <a:solidFill>
-                            <a:srgbClr val="2E7D32"/>
-                          </a:solidFill>
-                          <a:latin typeface="Calibri"/>
-                          <a:ea typeface="Calibri"/>
-                          <a:cs typeface="Calibri"/>
-                        </a:rPr>
-                        <a:t>Yes + Priority</a:t>
-                      </a:r>
-                    </a:p>
-                  </a:txBody>
-                </a:tc>
-              </a:tr>
-              <a:tr h="400000">
-                <a:tc>
-                  <a:tcPr marL="91440" marR="91440" marT="45720" marB="45720" anchor="ctr" anchorCtr="0">
-                    <a:solidFill>
-                      <a:srgbClr val="F2F2F2"/>
-                    </a:solidFill>
-                  </a:tcPr>
-                  <a:txBody>
-                    <a:bodyPr rot="0" vert="horz" anchor="ctr" anchorCtr="0" wrap="square"/>
-                    <a:lstStyle/>
-                    <a:p>
-                      <a:pPr algn="ctr"/>
-                      <a:r>
-                        <a:rPr lang="en-US" sz="1800" b="1" i="0" dirty="0">
-                          <a:solidFill>
-                            <a:srgbClr val="000000"/>
-                          </a:solidFill>
-                          <a:latin typeface="Calibri"/>
-                          <a:ea typeface="Calibri"/>
-                          <a:cs typeface="Calibri"/>
-                        </a:rPr>
-                        <a:t>Price/month</a:t>
-                      </a:r>
-                    </a:p>
-                  </a:txBody>
-                </a:tc>
-                <a:tc>
-                  <a:tcPr marL="91440" marR="91440" marT="45720" marB="45720" anchor="ctr" anchorCtr="0">
-                    <a:solidFill>
-                      <a:srgbClr val="F2F2F2"/>
-                    </a:solidFill>
-                  </a:tcPr>
-                  <a:txBody>
-                    <a:bodyPr rot="0" vert="horz" anchor="ctr" anchorCtr="0" wrap="square"/>
-                    <a:lstStyle/>
-                    <a:p>
-                      <a:pPr algn="ctr"/>
-                      <a:r>
-                        <a:rPr lang="en-US" sz="1800" b="1" i="0" dirty="0">
-                          <a:solidFill>
-                            <a:srgbClr val="000000"/>
-                          </a:solidFill>
-                          <a:latin typeface="Calibri"/>
-                          <a:ea typeface="Calibri"/>
-                          <a:cs typeface="Calibri"/>
-                        </a:rPr>
-                        <a:t>$9</a:t>
-                      </a:r>
-                    </a:p>
-                  </a:txBody>
-                </a:tc>
-                <a:tc>
-                  <a:tcPr marL="91440" marR="91440" marT="45720" marB="45720" anchor="ctr" anchorCtr="0">
-                    <a:solidFill>
-                      <a:srgbClr val="F2F2F2"/>
-                    </a:solidFill>
-                  </a:tcPr>
-                  <a:txBody>
-                    <a:bodyPr rot="0" vert="horz" anchor="ctr" anchorCtr="0" wrap="square"/>
-                    <a:lstStyle/>
-                    <a:p>
-                      <a:pPr algn="ctr"/>
-                      <a:r>
-                        <a:rPr lang="en-US" sz="1800" b="1" i="0" dirty="0">
-                          <a:solidFill>
-                            <a:srgbClr val="000000"/>
-                          </a:solidFill>
-                          <a:latin typeface="Calibri"/>
-                          <a:ea typeface="Calibri"/>
-                          <a:cs typeface="Calibri"/>
-                        </a:rPr>
-                        <a:t>$29</a:t>
-                      </a:r>
-                    </a:p>
-                  </a:txBody>
-                </a:tc>
-                <a:tc>
-                  <a:tcPr marL="91440" marR="91440" marT="45720" marB="45720" anchor="ctr" anchorCtr="0">
-                    <a:solidFill>
-                      <a:srgbClr val="F2F2F2"/>
-                    </a:solidFill>
-                  </a:tcPr>
-                  <a:txBody>
-                    <a:bodyPr rot="0" vert="horz" anchor="ctr" anchorCtr="0" wrap="square"/>
-                    <a:lstStyle/>
-                    <a:p>
-                      <a:pPr algn="ctr"/>
-                      <a:r>
-                        <a:rPr lang="en-US" sz="1800" b="1" i="0" dirty="0">
-                          <a:solidFill>
-                            <a:srgbClr val="000000"/>
-                          </a:solidFill>
-                          <a:latin typeface="Calibri"/>
-                          <a:ea typeface="Calibri"/>
-                          <a:cs typeface="Calibri"/>
-                        </a:rPr>
-                        <a:t>$99</a:t>
-                      </a:r>
-                    </a:p>
-                  </a:txBody>
                 </a:tc>
               </a:tr>
             </a:tbl>
@@ -3199,453 +2915,308 @@
               </a:tblGrid>
               <a:tr h="400000">
                 <a:tc>
-                  <a:tcPr marL="91440" marR="91440" marT="45720" marB="45720" anchor="ctr" anchorCtr="0">
+                  <a:txBody>
+                    <a:bodyPr/>
+                    <a:lstStyle/>
+                    <a:p>
+                      <a:r>
+                        <a:rPr lang="en-US" dirty="0" b="1">
+                          <a:solidFill>
+                            <a:srgbClr val="FFFFFF"/>
+                          </a:solidFill>
+                        </a:rPr>
+                        <a:t>Q1 2024</a:t>
+                      </a:r>
+                    </a:p>
+                  </a:txBody>
+                  <a:tcPr>
                     <a:solidFill>
                       <a:srgbClr val="4472C4"/>
                     </a:solidFill>
                   </a:tcPr>
-                  <a:txBody>
-                    <a:bodyPr rot="0" vert="horz" anchor="ctr" anchorCtr="0" wrap="square"/>
-                    <a:lstStyle/>
-                    <a:p>
-                      <a:pPr algn="ctr"/>
-                      <a:r>
-                        <a:rPr lang="en-US" sz="1800" b="1" i="0" dirty="0">
+                </a:tc>
+                <a:tc>
+                  <a:txBody>
+                    <a:bodyPr/>
+                    <a:lstStyle/>
+                    <a:p>
+                      <a:r>
+                        <a:rPr lang="en-US" dirty="0" b="1">
                           <a:solidFill>
                             <a:srgbClr val="FFFFFF"/>
                           </a:solidFill>
-                          <a:latin typeface="Calibri"/>
-                          <a:ea typeface="Calibri"/>
-                          <a:cs typeface="Calibri"/>
-                        </a:rPr>
-                        <a:t>Q1 2024</a:t>
-                      </a:r>
-                    </a:p>
-                  </a:txBody>
-                </a:tc>
-                <a:tc>
-                  <a:tcPr marL="91440" marR="91440" marT="45720" marB="45720" anchor="ctr" anchorCtr="0">
+                        </a:rPr>
+                        <a:t>Q2 2024</a:t>
+                      </a:r>
+                    </a:p>
+                  </a:txBody>
+                  <a:tcPr>
                     <a:solidFill>
                       <a:srgbClr val="4472C4"/>
                     </a:solidFill>
                   </a:tcPr>
-                  <a:txBody>
-                    <a:bodyPr rot="0" vert="horz" anchor="ctr" anchorCtr="0" wrap="square"/>
-                    <a:lstStyle/>
-                    <a:p>
-                      <a:pPr algn="ctr"/>
-                      <a:r>
-                        <a:rPr lang="en-US" sz="1800" b="1" i="0" dirty="0">
+                </a:tc>
+                <a:tc>
+                  <a:txBody>
+                    <a:bodyPr/>
+                    <a:lstStyle/>
+                    <a:p>
+                      <a:r>
+                        <a:rPr lang="en-US" dirty="0" b="1">
                           <a:solidFill>
                             <a:srgbClr val="FFFFFF"/>
                           </a:solidFill>
-                          <a:latin typeface="Calibri"/>
-                          <a:ea typeface="Calibri"/>
-                          <a:cs typeface="Calibri"/>
-                        </a:rPr>
-                        <a:t>Q2 2024</a:t>
-                      </a:r>
-                    </a:p>
-                  </a:txBody>
-                </a:tc>
-                <a:tc>
-                  <a:tcPr marL="91440" marR="91440" marT="45720" marB="45720" anchor="ctr" anchorCtr="0">
+                        </a:rPr>
+                        <a:t>Q3 2024</a:t>
+                      </a:r>
+                    </a:p>
+                  </a:txBody>
+                  <a:tcPr>
                     <a:solidFill>
                       <a:srgbClr val="4472C4"/>
                     </a:solidFill>
                   </a:tcPr>
-                  <a:txBody>
-                    <a:bodyPr rot="0" vert="horz" anchor="ctr" anchorCtr="0" wrap="square"/>
-                    <a:lstStyle/>
-                    <a:p>
-                      <a:pPr algn="ctr"/>
-                      <a:r>
-                        <a:rPr lang="en-US" sz="1800" b="1" i="0" dirty="0">
+                </a:tc>
+                <a:tc>
+                  <a:txBody>
+                    <a:bodyPr/>
+                    <a:lstStyle/>
+                    <a:p>
+                      <a:r>
+                        <a:rPr lang="en-US" dirty="0" b="1">
                           <a:solidFill>
                             <a:srgbClr val="FFFFFF"/>
                           </a:solidFill>
-                          <a:latin typeface="Calibri"/>
-                          <a:ea typeface="Calibri"/>
-                          <a:cs typeface="Calibri"/>
-                        </a:rPr>
-                        <a:t>Q3 2024</a:t>
-                      </a:r>
-                    </a:p>
-                  </a:txBody>
-                </a:tc>
-                <a:tc>
-                  <a:tcPr marL="91440" marR="91440" marT="45720" marB="45720" anchor="ctr" anchorCtr="0">
+                        </a:rPr>
+                        <a:t>Q4 2024</a:t>
+                      </a:r>
+                    </a:p>
+                  </a:txBody>
+                  <a:tcPr>
                     <a:solidFill>
                       <a:srgbClr val="4472C4"/>
                     </a:solidFill>
                   </a:tcPr>
-                  <a:txBody>
-                    <a:bodyPr rot="0" vert="horz" anchor="ctr" anchorCtr="0" wrap="square"/>
-                    <a:lstStyle/>
-                    <a:p>
-                      <a:pPr algn="ctr"/>
-                      <a:r>
-                        <a:rPr lang="en-US" sz="1800" b="1" i="0" dirty="0">
+                </a:tc>
+                <a:tc>
+                  <a:txBody>
+                    <a:bodyPr/>
+                    <a:lstStyle/>
+                    <a:p>
+                      <a:r>
+                        <a:rPr lang="en-US" dirty="0" b="1">
                           <a:solidFill>
                             <a:srgbClr val="FFFFFF"/>
                           </a:solidFill>
-                          <a:latin typeface="Calibri"/>
-                          <a:ea typeface="Calibri"/>
-                          <a:cs typeface="Calibri"/>
-                        </a:rPr>
-                        <a:t>Q4 2024</a:t>
-                      </a:r>
-                    </a:p>
-                  </a:txBody>
-                </a:tc>
-                <a:tc>
-                  <a:tcPr marL="91440" marR="91440" marT="45720" marB="45720" anchor="ctr" anchorCtr="0">
+                        </a:rPr>
+                        <a:t>Q1 2025</a:t>
+                      </a:r>
+                    </a:p>
+                  </a:txBody>
+                  <a:tcPr>
                     <a:solidFill>
                       <a:srgbClr val="4472C4"/>
                     </a:solidFill>
                   </a:tcPr>
-                  <a:txBody>
-                    <a:bodyPr rot="0" vert="horz" anchor="ctr" anchorCtr="0" wrap="square"/>
-                    <a:lstStyle/>
-                    <a:p>
-                      <a:pPr algn="ctr"/>
-                      <a:r>
-                        <a:rPr lang="en-US" sz="1800" b="1" i="0" dirty="0">
-                          <a:solidFill>
-                            <a:srgbClr val="FFFFFF"/>
-                          </a:solidFill>
-                          <a:latin typeface="Calibri"/>
-                          <a:ea typeface="Calibri"/>
-                          <a:cs typeface="Calibri"/>
-                        </a:rPr>
-                        <a:t>Q1 2025</a:t>
-                      </a:r>
-                    </a:p>
-                  </a:txBody>
                 </a:tc>
               </a:tr>
               <a:tr h="400000">
                 <a:tc>
-                  <a:tcPr marL="91440" marR="91440" marT="45720" marB="45720" anchor="ctr" anchorCtr="0">
+                  <a:txBody>
+                    <a:bodyPr/>
+                    <a:lstStyle/>
+                    <a:p>
+                      <a:r>
+                        <a:rPr lang="en-US" dirty="0">
+                          <a:solidFill>
+                            <a:srgbClr val="1F497D"/>
+                          </a:solidFill>
+                        </a:rPr>
+                        <a:t>Research
+&amp; Planning</a:t>
+                      </a:r>
+                    </a:p>
+                  </a:txBody>
+                  <a:tcPr>
                     <a:solidFill>
                       <a:srgbClr val="BDD7EE"/>
                     </a:solidFill>
                   </a:tcPr>
-                  <a:txBody>
-                    <a:bodyPr rot="0" vert="horz" anchor="ctr" anchorCtr="0" wrap="square"/>
-                    <a:lstStyle/>
-                    <a:p>
-                      <a:pPr algn="ctr"/>
-                      <a:r>
-                        <a:rPr lang="en-US" sz="1800" b="0" i="0" dirty="0">
+                </a:tc>
+                <a:tc>
+                  <a:txBody>
+                    <a:bodyPr/>
+                    <a:lstStyle/>
+                    <a:p>
+                      <a:r>
+                        <a:rPr lang="en-US" dirty="0">
                           <a:solidFill>
                             <a:srgbClr val="1F497D"/>
                           </a:solidFill>
-                          <a:latin typeface="Calibri"/>
-                          <a:ea typeface="Calibri"/>
-                          <a:cs typeface="Calibri"/>
-                        </a:rPr>
-                        <a:t>Research</a:t>
-                      </a:r>
-                    </a:p>
-                    <a:p>
-                      <a:pPr algn="ctr"/>
-                      <a:r>
-                        <a:rPr lang="en-US" sz="2000" b="0" i="0">
-                          <a:solidFill>
-                            <a:srgbClr val="1F497D"/>
-                          </a:solidFill>
-                          <a:latin typeface="Calibri"/>
-                          <a:ea typeface="Calibri"/>
-                          <a:cs typeface="Calibri"/>
-                        </a:rPr>
-                        <a:t>&amp; Planning</a:t>
-                      </a:r>
-                    </a:p>
-                  </a:txBody>
-                </a:tc>
-                <a:tc>
-                  <a:tcPr marL="91440" marR="91440" marT="45720" marB="45720" anchor="ctr" anchorCtr="0">
+                        </a:rPr>
+                        <a:t>Design
+Phase</a:t>
+                      </a:r>
+                    </a:p>
+                  </a:txBody>
+                  <a:tcPr>
                     <a:solidFill>
                       <a:srgbClr val="BDD7EE"/>
                     </a:solidFill>
                   </a:tcPr>
-                  <a:txBody>
-                    <a:bodyPr rot="0" vert="horz" anchor="ctr" anchorCtr="0" wrap="square"/>
-                    <a:lstStyle/>
-                    <a:p>
-                      <a:pPr algn="ctr"/>
-                      <a:r>
-                        <a:rPr lang="en-US" sz="1800" b="0" i="0" dirty="0">
-                          <a:solidFill>
-                            <a:srgbClr val="1F497D"/>
-                          </a:solidFill>
-                          <a:latin typeface="Calibri"/>
-                          <a:ea typeface="Calibri"/>
-                          <a:cs typeface="Calibri"/>
-                        </a:rPr>
-                        <a:t>Design</a:t>
-                      </a:r>
-                    </a:p>
-                    <a:p>
-                      <a:pPr algn="ctr"/>
-                      <a:r>
-                        <a:rPr lang="en-US" sz="2000" b="0" i="0">
-                          <a:solidFill>
-                            <a:srgbClr val="1F497D"/>
-                          </a:solidFill>
-                          <a:latin typeface="Calibri"/>
-                          <a:ea typeface="Calibri"/>
-                          <a:cs typeface="Calibri"/>
-                        </a:rPr>
-                        <a:t>Phase</a:t>
-                      </a:r>
-                    </a:p>
-                  </a:txBody>
-                </a:tc>
-                <a:tc>
-                  <a:tcPr marL="91440" marR="91440" marT="45720" marB="45720" anchor="ctr" anchorCtr="0">
+                </a:tc>
+                <a:tc>
+                  <a:txBody>
+                    <a:bodyPr/>
+                    <a:lstStyle/>
+                    <a:p>
+                      <a:r>
+                        <a:rPr lang="en-US" dirty="0">
+                          <a:solidFill>
+                            <a:srgbClr val="006100"/>
+                          </a:solidFill>
+                        </a:rPr>
+                        <a:t>Development
+Sprint 1-3</a:t>
+                      </a:r>
+                    </a:p>
+                  </a:txBody>
+                  <a:tcPr>
                     <a:solidFill>
                       <a:srgbClr val="C6EFCE"/>
                     </a:solidFill>
                   </a:tcPr>
-                  <a:txBody>
-                    <a:bodyPr rot="0" vert="horz" anchor="ctr" anchorCtr="0" wrap="square"/>
-                    <a:lstStyle/>
-                    <a:p>
-                      <a:pPr algn="ctr"/>
-                      <a:r>
-                        <a:rPr lang="en-US" sz="1800" b="0" i="0" dirty="0">
-                          <a:solidFill>
-                            <a:srgbClr val="006100"/>
-                          </a:solidFill>
-                          <a:latin typeface="Calibri"/>
-                          <a:ea typeface="Calibri"/>
-                          <a:cs typeface="Calibri"/>
-                        </a:rPr>
-                        <a:t>Development</a:t>
-                      </a:r>
-                    </a:p>
-                    <a:p>
-                      <a:pPr algn="ctr"/>
-                      <a:r>
-                        <a:rPr lang="en-US" sz="2000" b="0" i="0">
-                          <a:solidFill>
-                            <a:srgbClr val="006100"/>
-                          </a:solidFill>
-                          <a:latin typeface="Calibri"/>
-                          <a:ea typeface="Calibri"/>
-                          <a:cs typeface="Calibri"/>
-                        </a:rPr>
-                        <a:t>Sprint 1-3</a:t>
-                      </a:r>
-                    </a:p>
-                  </a:txBody>
-                </a:tc>
-                <a:tc>
-                  <a:tcPr marL="91440" marR="91440" marT="45720" marB="45720" anchor="ctr" anchorCtr="0">
+                </a:tc>
+                <a:tc>
+                  <a:txBody>
+                    <a:bodyPr/>
+                    <a:lstStyle/>
+                    <a:p>
+                      <a:r>
+                        <a:rPr lang="en-US" dirty="0">
+                          <a:solidFill>
+                            <a:srgbClr val="C65911"/>
+                          </a:solidFill>
+                        </a:rPr>
+                        <a:t>Testing
+&amp; QA</a:t>
+                      </a:r>
+                    </a:p>
+                  </a:txBody>
+                  <a:tcPr>
                     <a:solidFill>
                       <a:srgbClr val="FCE4D6"/>
                     </a:solidFill>
                   </a:tcPr>
-                  <a:txBody>
-                    <a:bodyPr rot="0" vert="horz" anchor="ctr" anchorCtr="0" wrap="square"/>
-                    <a:lstStyle/>
-                    <a:p>
-                      <a:pPr algn="ctr"/>
-                      <a:r>
-                        <a:rPr lang="en-US" sz="1800" b="0" i="0" dirty="0">
-                          <a:solidFill>
-                            <a:srgbClr val="C65911"/>
-                          </a:solidFill>
-                          <a:latin typeface="Calibri"/>
-                          <a:ea typeface="Calibri"/>
-                          <a:cs typeface="Calibri"/>
-                        </a:rPr>
-                        <a:t>Testing</a:t>
-                      </a:r>
-                    </a:p>
-                    <a:p>
-                      <a:pPr algn="ctr"/>
-                      <a:r>
-                        <a:rPr lang="en-US" sz="2000" b="0" i="0">
-                          <a:solidFill>
-                            <a:srgbClr val="C65911"/>
-                          </a:solidFill>
-                          <a:latin typeface="Calibri"/>
-                          <a:ea typeface="Calibri"/>
-                          <a:cs typeface="Calibri"/>
-                        </a:rPr>
-                        <a:t>&amp; QA</a:t>
-                      </a:r>
-                    </a:p>
-                  </a:txBody>
-                </a:tc>
-                <a:tc>
-                  <a:tcPr marL="91440" marR="91440" marT="45720" marB="45720" anchor="ctr" anchorCtr="0">
+                </a:tc>
+                <a:tc>
+                  <a:txBody>
+                    <a:bodyPr/>
+                    <a:lstStyle/>
+                    <a:p>
+                      <a:r>
+                        <a:rPr lang="en-US" dirty="0">
+                          <a:solidFill>
+                            <a:srgbClr val="375623"/>
+                          </a:solidFill>
+                        </a:rPr>
+                        <a:t>Launch
+&amp; Support</a:t>
+                      </a:r>
+                    </a:p>
+                  </a:txBody>
+                  <a:tcPr>
                     <a:solidFill>
                       <a:srgbClr val="E2EFDA"/>
                     </a:solidFill>
                   </a:tcPr>
-                  <a:txBody>
-                    <a:bodyPr rot="0" vert="horz" anchor="ctr" anchorCtr="0" wrap="square"/>
-                    <a:lstStyle/>
-                    <a:p>
-                      <a:pPr algn="ctr"/>
-                      <a:r>
-                        <a:rPr lang="en-US" sz="1800" b="0" i="0" dirty="0">
-                          <a:solidFill>
-                            <a:srgbClr val="375623"/>
-                          </a:solidFill>
-                          <a:latin typeface="Calibri"/>
-                          <a:ea typeface="Calibri"/>
-                          <a:cs typeface="Calibri"/>
-                        </a:rPr>
-                        <a:t>Launch</a:t>
-                      </a:r>
-                    </a:p>
-                    <a:p>
-                      <a:pPr algn="ctr"/>
-                      <a:r>
-                        <a:rPr lang="en-US" sz="2000" b="0" i="0">
-                          <a:solidFill>
-                            <a:srgbClr val="375623"/>
-                          </a:solidFill>
-                          <a:latin typeface="Calibri"/>
-                          <a:ea typeface="Calibri"/>
-                          <a:cs typeface="Calibri"/>
-                        </a:rPr>
-                        <a:t>&amp; Support</a:t>
-                      </a:r>
-                    </a:p>
-                  </a:txBody>
                 </a:tc>
               </a:tr>
               <a:tr h="400000">
                 <a:tc>
-                  <a:tcPr marL="91440" marR="91440" marT="45720" marB="45720" anchor="ctr" anchorCtr="0">
-                    <a:solidFill>
-                      <a:srgbClr val="F2F2F2"/>
-                    </a:solidFill>
-                  </a:tcPr>
-                  <a:txBody>
-                    <a:bodyPr rot="0" vert="horz" anchor="ctr" anchorCtr="0" wrap="square"/>
-                    <a:lstStyle/>
-                    <a:p>
-                      <a:pPr algn="ctr"/>
-                      <a:r>
-                        <a:rPr lang="en-US" sz="1800" b="1" i="0" dirty="0">
+                  <a:txBody>
+                    <a:bodyPr/>
+                    <a:lstStyle/>
+                    <a:p>
+                      <a:r>
+                        <a:rPr lang="en-US" dirty="0" b="1">
                           <a:solidFill>
                             <a:srgbClr val="2E7D32"/>
                           </a:solidFill>
-                          <a:latin typeface="Calibri"/>
-                          <a:ea typeface="Calibri"/>
-                          <a:cs typeface="Calibri"/>
                         </a:rPr>
                         <a:t>✓ Complete</a:t>
                       </a:r>
                     </a:p>
                   </a:txBody>
-                </a:tc>
-                <a:tc>
-                  <a:tcPr marL="91440" marR="91440" marT="45720" marB="45720" anchor="ctr" anchorCtr="0">
-                    <a:solidFill>
-                      <a:srgbClr val="F2F2F2"/>
-                    </a:solidFill>
-                  </a:tcPr>
-                  <a:txBody>
-                    <a:bodyPr rot="0" vert="horz" anchor="ctr" anchorCtr="0" wrap="square"/>
-                    <a:lstStyle/>
-                    <a:p>
-                      <a:pPr algn="ctr"/>
-                      <a:r>
-                        <a:rPr lang="en-US" sz="1800" b="1" i="0" dirty="0">
+                  <a:tcPr/>
+                </a:tc>
+                <a:tc>
+                  <a:txBody>
+                    <a:bodyPr/>
+                    <a:lstStyle/>
+                    <a:p>
+                      <a:r>
+                        <a:rPr lang="en-US" dirty="0" b="1">
                           <a:solidFill>
                             <a:srgbClr val="2E7D32"/>
                           </a:solidFill>
-                          <a:latin typeface="Calibri"/>
-                          <a:ea typeface="Calibri"/>
-                          <a:cs typeface="Calibri"/>
                         </a:rPr>
                         <a:t>✓ Complete</a:t>
                       </a:r>
                     </a:p>
                   </a:txBody>
-                </a:tc>
-                <a:tc>
-                  <a:tcPr marL="91440" marR="91440" marT="45720" marB="45720" anchor="ctr" anchorCtr="0">
-                    <a:solidFill>
-                      <a:srgbClr val="F2F2F2"/>
-                    </a:solidFill>
-                  </a:tcPr>
-                  <a:txBody>
-                    <a:bodyPr rot="0" vert="horz" anchor="ctr" anchorCtr="0" wrap="square"/>
-                    <a:lstStyle/>
-                    <a:p>
-                      <a:pPr algn="ctr"/>
-                      <a:r>
-                        <a:rPr lang="en-US" sz="1800" b="0" i="0" dirty="0">
+                  <a:tcPr/>
+                </a:tc>
+                <a:tc>
+                  <a:txBody>
+                    <a:bodyPr/>
+                    <a:lstStyle/>
+                    <a:p>
+                      <a:r>
+                        <a:rPr lang="en-US" dirty="0">
                           <a:solidFill>
                             <a:srgbClr val="ED7D31"/>
                           </a:solidFill>
-                          <a:latin typeface="Calibri"/>
-                          <a:ea typeface="Calibri"/>
-                          <a:cs typeface="Calibri"/>
                         </a:rPr>
                         <a:t>In Progress</a:t>
                       </a:r>
                     </a:p>
                   </a:txBody>
-                </a:tc>
-                <a:tc>
-                  <a:tcPr marL="91440" marR="91440" marT="45720" marB="45720" anchor="ctr" anchorCtr="0">
-                    <a:solidFill>
-                      <a:srgbClr val="F2F2F2"/>
-                    </a:solidFill>
-                  </a:tcPr>
-                  <a:txBody>
-                    <a:bodyPr rot="0" vert="horz" anchor="ctr" anchorCtr="0" wrap="square"/>
-                    <a:lstStyle/>
-                    <a:p>
-                      <a:pPr algn="ctr"/>
-                      <a:r>
-                        <a:rPr lang="en-US" sz="1800" b="0" i="0" dirty="0">
+                  <a:tcPr/>
+                </a:tc>
+                <a:tc>
+                  <a:txBody>
+                    <a:bodyPr/>
+                    <a:lstStyle/>
+                    <a:p>
+                      <a:r>
+                        <a:rPr lang="en-US" dirty="0">
                           <a:solidFill>
                             <a:srgbClr val="7F7F7F"/>
                           </a:solidFill>
-                          <a:latin typeface="Calibri"/>
-                          <a:ea typeface="Calibri"/>
-                          <a:cs typeface="Calibri"/>
                         </a:rPr>
                         <a:t>Planned</a:t>
                       </a:r>
                     </a:p>
                   </a:txBody>
-                </a:tc>
-                <a:tc>
-                  <a:tcPr marL="91440" marR="91440" marT="45720" marB="45720" anchor="ctr" anchorCtr="0">
-                    <a:solidFill>
-                      <a:srgbClr val="F2F2F2"/>
-                    </a:solidFill>
-                  </a:tcPr>
-                  <a:txBody>
-                    <a:bodyPr rot="0" vert="horz" anchor="ctr" anchorCtr="0" wrap="square"/>
-                    <a:lstStyle/>
-                    <a:p>
-                      <a:pPr algn="ctr"/>
-                      <a:r>
-                        <a:rPr lang="en-US" sz="1800" b="0" i="0" dirty="0">
+                  <a:tcPr/>
+                </a:tc>
+                <a:tc>
+                  <a:txBody>
+                    <a:bodyPr/>
+                    <a:lstStyle/>
+                    <a:p>
+                      <a:r>
+                        <a:rPr lang="en-US" dirty="0">
                           <a:solidFill>
                             <a:srgbClr val="7F7F7F"/>
                           </a:solidFill>
-                          <a:latin typeface="Calibri"/>
-                          <a:ea typeface="Calibri"/>
-                          <a:cs typeface="Calibri"/>
                         </a:rPr>
                         <a:t>Planned</a:t>
                       </a:r>
                     </a:p>
                   </a:txBody>
+                  <a:tcPr/>
                 </a:tc>
               </a:tr>
             </a:tbl>
@@ -4630,310 +4201,198 @@
               </a:tblGrid>
               <a:tr h="400000">
                 <a:tc>
-                  <a:tcPr marL="91440" marR="91440" marT="45720" marB="45720" anchor="ctr" anchorCtr="0">
+                  <a:txBody>
+                    <a:bodyPr/>
+                    <a:lstStyle/>
+                    <a:p>
+                      <a:r>
+                        <a:rPr lang="en-US" dirty="0" b="1"/>
+                        <a:t>Header 1</a:t>
+                      </a:r>
+                    </a:p>
+                  </a:txBody>
+                  <a:tcPr>
                     <a:solidFill>
                       <a:srgbClr val="1F497D"/>
                     </a:solidFill>
                   </a:tcPr>
-                  <a:txBody>
-                    <a:bodyPr rot="0" vert="horz" anchor="ctr" anchorCtr="0" wrap="square"/>
-                    <a:lstStyle/>
-                    <a:p>
-                      <a:pPr algn="ctr"/>
-                      <a:r>
-                        <a:rPr lang="en-US" sz="1800" b="1" i="0" dirty="0">
-                          <a:solidFill>
-                            <a:srgbClr val="000000"/>
-                          </a:solidFill>
-                          <a:latin typeface="Calibri"/>
-                          <a:ea typeface="Calibri"/>
-                          <a:cs typeface="Calibri"/>
-                        </a:rPr>
-                        <a:t>Header 1</a:t>
-                      </a:r>
-                    </a:p>
-                  </a:txBody>
-                </a:tc>
-                <a:tc>
-                  <a:tcPr marL="91440" marR="91440" marT="45720" marB="45720" anchor="ctr" anchorCtr="0">
+                </a:tc>
+                <a:tc>
+                  <a:txBody>
+                    <a:bodyPr/>
+                    <a:lstStyle/>
+                    <a:p>
+                      <a:r>
+                        <a:rPr lang="en-US" dirty="0" b="1"/>
+                        <a:t>Header 2</a:t>
+                      </a:r>
+                    </a:p>
+                  </a:txBody>
+                  <a:tcPr>
                     <a:solidFill>
                       <a:srgbClr val="4F81BD"/>
                     </a:solidFill>
                   </a:tcPr>
-                  <a:txBody>
-                    <a:bodyPr rot="0" vert="horz" anchor="ctr" anchorCtr="0" wrap="square"/>
-                    <a:lstStyle/>
-                    <a:p>
-                      <a:pPr algn="ctr"/>
-                      <a:r>
-                        <a:rPr lang="en-US" sz="1800" b="1" i="0" dirty="0">
-                          <a:solidFill>
-                            <a:srgbClr val="000000"/>
-                          </a:solidFill>
-                          <a:latin typeface="Calibri"/>
-                          <a:ea typeface="Calibri"/>
-                          <a:cs typeface="Calibri"/>
-                        </a:rPr>
-                        <a:t>Header 2</a:t>
-                      </a:r>
-                    </a:p>
-                  </a:txBody>
-                </a:tc>
-                <a:tc>
-                  <a:tcPr marL="91440" marR="91440" marT="45720" marB="45720" anchor="ctr" anchorCtr="0">
+                </a:tc>
+                <a:tc>
+                  <a:txBody>
+                    <a:bodyPr/>
+                    <a:lstStyle/>
+                    <a:p>
+                      <a:r>
+                        <a:rPr lang="en-US" dirty="0" b="1"/>
+                        <a:t>Header 3</a:t>
+                      </a:r>
+                    </a:p>
+                  </a:txBody>
+                  <a:tcPr>
                     <a:solidFill>
                       <a:srgbClr val="8064A2"/>
                     </a:solidFill>
                   </a:tcPr>
-                  <a:txBody>
-                    <a:bodyPr rot="0" vert="horz" anchor="ctr" anchorCtr="0" wrap="square"/>
-                    <a:lstStyle/>
-                    <a:p>
-                      <a:pPr algn="ctr"/>
-                      <a:r>
-                        <a:rPr lang="en-US" sz="1800" b="1" i="0" dirty="0">
-                          <a:solidFill>
-                            <a:srgbClr val="000000"/>
-                          </a:solidFill>
-                          <a:latin typeface="Calibri"/>
-                          <a:ea typeface="Calibri"/>
-                          <a:cs typeface="Calibri"/>
-                        </a:rPr>
-                        <a:t>Header 3</a:t>
-                      </a:r>
-                    </a:p>
-                  </a:txBody>
                 </a:tc>
               </a:tr>
               <a:tr h="400000">
                 <a:tc>
-                  <a:tcPr marL="91440" marR="91440" marT="45720" marB="45720" anchor="ctr" anchorCtr="0">
-                    <a:solidFill>
-                      <a:srgbClr val="F2F2F2"/>
-                    </a:solidFill>
-                  </a:tcPr>
-                  <a:txBody>
-                    <a:bodyPr rot="0" vert="horz" anchor="ctr" anchorCtr="0" wrap="square"/>
-                    <a:lstStyle/>
-                    <a:p>
-                      <a:pPr algn="ctr"/>
-                      <a:r>
-                        <a:rPr lang="en-US" sz="1800" b="1" i="0" dirty="0">
-                          <a:solidFill>
-                            <a:srgbClr val="000000"/>
-                          </a:solidFill>
-                          <a:latin typeface="Calibri"/>
-                          <a:ea typeface="Calibri"/>
-                          <a:cs typeface="Calibri"/>
-                        </a:rPr>
+                  <a:txBody>
+                    <a:bodyPr/>
+                    <a:lstStyle/>
+                    <a:p>
+                      <a:r>
+                        <a:rPr lang="en-US" dirty="0" b="1"/>
                         <a:t>Bold Cell</a:t>
                       </a:r>
                     </a:p>
                   </a:txBody>
-                </a:tc>
-                <a:tc>
-                  <a:tcPr marL="91440" marR="91440" marT="45720" marB="45720" anchor="ctr" anchorCtr="0">
-                    <a:solidFill>
-                      <a:srgbClr val="F2F2F2"/>
-                    </a:solidFill>
-                  </a:tcPr>
-                  <a:txBody>
-                    <a:bodyPr rot="0" vert="horz" anchor="ctr" anchorCtr="0" wrap="square"/>
-                    <a:lstStyle/>
-                    <a:p>
-                      <a:pPr algn="ctr"/>
-                      <a:r>
-                        <a:rPr lang="en-US" sz="1800" b="0" i="0" dirty="0">
-                          <a:solidFill>
-                            <a:srgbClr val="000000"/>
-                          </a:solidFill>
-                          <a:latin typeface="Calibri"/>
-                          <a:ea typeface="Calibri"/>
-                          <a:cs typeface="Calibri"/>
-                        </a:rPr>
+                  <a:tcPr/>
+                </a:tc>
+                <a:tc>
+                  <a:txBody>
+                    <a:bodyPr/>
+                    <a:lstStyle/>
+                    <a:p>
+                      <a:r>
+                        <a:rPr lang="en-US" dirty="0"/>
                         <a:t>Normal Cell</a:t>
                       </a:r>
                     </a:p>
                   </a:txBody>
-                </a:tc>
-                <a:tc>
-                  <a:tcPr marL="91440" marR="91440" marT="45720" marB="45720" anchor="ctr" anchorCtr="0">
+                  <a:tcPr/>
+                </a:tc>
+                <a:tc>
+                  <a:txBody>
+                    <a:bodyPr/>
+                    <a:lstStyle/>
+                    <a:p>
+                      <a:r>
+                        <a:rPr lang="en-US" dirty="0"/>
+                        <a:t>Colored</a:t>
+                      </a:r>
+                    </a:p>
+                  </a:txBody>
+                  <a:tcPr>
                     <a:solidFill>
                       <a:srgbClr val="9BBB59"/>
                     </a:solidFill>
                   </a:tcPr>
-                  <a:txBody>
-                    <a:bodyPr rot="0" vert="horz" anchor="ctr" anchorCtr="0" wrap="square"/>
-                    <a:lstStyle/>
-                    <a:p>
-                      <a:pPr algn="ctr"/>
-                      <a:r>
-                        <a:rPr lang="en-US" sz="1800" b="0" i="0" dirty="0">
-                          <a:solidFill>
-                            <a:srgbClr val="000000"/>
-                          </a:solidFill>
-                          <a:latin typeface="Calibri"/>
-                          <a:ea typeface="Calibri"/>
-                          <a:cs typeface="Calibri"/>
-                        </a:rPr>
-                        <a:t>Colored</a:t>
-                      </a:r>
-                    </a:p>
-                  </a:txBody>
                 </a:tc>
               </a:tr>
               <a:tr h="400000">
                 <a:tc>
-                  <a:tcPr marL="91440" marR="91440" marT="45720" marB="45720" anchor="ctr" anchorCtr="0">
+                  <a:txBody>
+                    <a:bodyPr/>
+                    <a:lstStyle/>
+                    <a:p>
+                      <a:r>
+                        <a:rPr lang="en-US" dirty="0"/>
+                        <a:t>Red BG</a:t>
+                      </a:r>
+                    </a:p>
+                  </a:txBody>
+                  <a:tcPr>
                     <a:solidFill>
                       <a:srgbClr val="C0504D"/>
                     </a:solidFill>
                   </a:tcPr>
-                  <a:txBody>
-                    <a:bodyPr rot="0" vert="horz" anchor="ctr" anchorCtr="0" wrap="square"/>
-                    <a:lstStyle/>
-                    <a:p>
-                      <a:pPr algn="ctr"/>
-                      <a:r>
-                        <a:rPr lang="en-US" sz="1800" b="0" i="0" dirty="0">
-                          <a:solidFill>
-                            <a:srgbClr val="000000"/>
-                          </a:solidFill>
-                          <a:latin typeface="Calibri"/>
-                          <a:ea typeface="Calibri"/>
-                          <a:cs typeface="Calibri"/>
-                        </a:rPr>
-                        <a:t>Red BG</a:t>
-                      </a:r>
-                    </a:p>
-                  </a:txBody>
-                </a:tc>
-                <a:tc>
-                  <a:tcPr marL="91440" marR="91440" marT="45720" marB="45720" anchor="ctr" anchorCtr="0">
+                </a:tc>
+                <a:tc>
+                  <a:txBody>
+                    <a:bodyPr/>
+                    <a:lstStyle/>
+                    <a:p>
+                      <a:r>
+                        <a:rPr lang="en-US" dirty="0"/>
+                        <a:t>Green BG</a:t>
+                      </a:r>
+                    </a:p>
+                  </a:txBody>
+                  <a:tcPr>
                     <a:solidFill>
                       <a:srgbClr val="9BBB59"/>
                     </a:solidFill>
                   </a:tcPr>
-                  <a:txBody>
-                    <a:bodyPr rot="0" vert="horz" anchor="ctr" anchorCtr="0" wrap="square"/>
-                    <a:lstStyle/>
-                    <a:p>
-                      <a:pPr algn="ctr"/>
-                      <a:r>
-                        <a:rPr lang="en-US" sz="1800" b="0" i="0" dirty="0">
-                          <a:solidFill>
-                            <a:srgbClr val="000000"/>
-                          </a:solidFill>
-                          <a:latin typeface="Calibri"/>
-                          <a:ea typeface="Calibri"/>
-                          <a:cs typeface="Calibri"/>
-                        </a:rPr>
-                        <a:t>Green BG</a:t>
-                      </a:r>
-                    </a:p>
-                  </a:txBody>
-                </a:tc>
-                <a:tc>
-                  <a:tcPr marL="91440" marR="91440" marT="45720" marB="45720" anchor="ctr" anchorCtr="0">
+                </a:tc>
+                <a:tc>
+                  <a:txBody>
+                    <a:bodyPr/>
+                    <a:lstStyle/>
+                    <a:p>
+                      <a:r>
+                        <a:rPr lang="en-US" dirty="0"/>
+                        <a:t>Blue BG</a:t>
+                      </a:r>
+                    </a:p>
+                  </a:txBody>
+                  <a:tcPr>
                     <a:solidFill>
                       <a:srgbClr val="4F81BD"/>
                     </a:solidFill>
                   </a:tcPr>
-                  <a:txBody>
-                    <a:bodyPr rot="0" vert="horz" anchor="ctr" anchorCtr="0" wrap="square"/>
-                    <a:lstStyle/>
-                    <a:p>
-                      <a:pPr algn="ctr"/>
-                      <a:r>
-                        <a:rPr lang="en-US" sz="1800" b="0" i="0" dirty="0">
-                          <a:solidFill>
-                            <a:srgbClr val="000000"/>
-                          </a:solidFill>
-                          <a:latin typeface="Calibri"/>
-                          <a:ea typeface="Calibri"/>
-                          <a:cs typeface="Calibri"/>
-                        </a:rPr>
-                        <a:t>Blue BG</a:t>
-                      </a:r>
-                    </a:p>
-                  </a:txBody>
                 </a:tc>
               </a:tr>
               <a:tr h="400000">
                 <a:tc>
-                  <a:tcPr marL="91440" marR="91440" marT="45720" marB="45720" anchor="ctr" anchorCtr="0">
-                    <a:solidFill>
-                      <a:srgbClr val="F2F2F2"/>
-                    </a:solidFill>
-                  </a:tcPr>
-                  <a:txBody>
-                    <a:bodyPr rot="0" vert="horz" anchor="ctr" anchorCtr="0" wrap="square"/>
-                    <a:lstStyle/>
-                    <a:p>
-                      <a:pPr algn="ctr"/>
-                      <a:r>
-                        <a:rPr lang="en-US" sz="1800" b="0" i="0" dirty="0">
-                          <a:solidFill>
-                            <a:srgbClr val="000000"/>
-                          </a:solidFill>
-                          <a:latin typeface="Calibri"/>
-                          <a:ea typeface="Calibri"/>
-                          <a:cs typeface="Calibri"/>
-                        </a:rPr>
+                  <a:txBody>
+                    <a:bodyPr/>
+                    <a:lstStyle/>
+                    <a:p>
+                      <a:r>
+                        <a:rPr lang="en-US" dirty="0"/>
                         <a:t>Row 3 Col 1</a:t>
                       </a:r>
                     </a:p>
                   </a:txBody>
-                </a:tc>
-                <a:tc>
-                  <a:tcPr marL="91440" marR="91440" marT="45720" marB="45720" anchor="ctr" anchorCtr="0">
-                    <a:solidFill>
-                      <a:srgbClr val="F2F2F2"/>
-                    </a:solidFill>
-                  </a:tcPr>
-                  <a:txBody>
-                    <a:bodyPr rot="0" vert="horz" anchor="ctr" anchorCtr="0" wrap="square"/>
-                    <a:lstStyle/>
-                    <a:p>
-                      <a:pPr algn="ctr"/>
-                      <a:r>
-                        <a:rPr lang="en-US" sz="1800" b="0" i="0" dirty="0">
-                          <a:solidFill>
-                            <a:srgbClr val="000000"/>
-                          </a:solidFill>
-                          <a:latin typeface="Calibri"/>
-                          <a:ea typeface="Calibri"/>
-                          <a:cs typeface="Calibri"/>
-                        </a:rPr>
+                  <a:tcPr/>
+                </a:tc>
+                <a:tc>
+                  <a:txBody>
+                    <a:bodyPr/>
+                    <a:lstStyle/>
+                    <a:p>
+                      <a:r>
+                        <a:rPr lang="en-US" dirty="0"/>
                         <a:t>Row 3 Col 2</a:t>
                       </a:r>
                     </a:p>
                   </a:txBody>
-                </a:tc>
-                <a:tc>
-                  <a:tcPr marL="91440" marR="91440" marT="45720" marB="45720" anchor="ctr" anchorCtr="0">
+                  <a:tcPr/>
+                </a:tc>
+                <a:tc>
+                  <a:txBody>
+                    <a:bodyPr/>
+                    <a:lstStyle/>
+                    <a:p>
+                      <a:r>
+                        <a:rPr lang="en-US" dirty="0" b="1"/>
+                        <a:t>Row 3 Col 3</a:t>
+                      </a:r>
+                    </a:p>
+                  </a:txBody>
+                  <a:tcPr>
                     <a:solidFill>
                       <a:srgbClr val="F79646"/>
                     </a:solidFill>
                   </a:tcPr>
-                  <a:txBody>
-                    <a:bodyPr rot="0" vert="horz" anchor="ctr" anchorCtr="0" wrap="square"/>
-                    <a:lstStyle/>
-                    <a:p>
-                      <a:pPr algn="ctr"/>
-                      <a:r>
-                        <a:rPr lang="en-US" sz="1800" b="1" i="0" dirty="0">
-                          <a:solidFill>
-                            <a:srgbClr val="000000"/>
-                          </a:solidFill>
-                          <a:latin typeface="Calibri"/>
-                          <a:ea typeface="Calibri"/>
-                          <a:cs typeface="Calibri"/>
-                        </a:rPr>
-                        <a:t>Row 3 Col 3</a:t>
-                      </a:r>
-                    </a:p>
-                  </a:txBody>
                 </a:tc>
               </a:tr>
             </a:tbl>

</xml_diff>

<commit_message>
Update TODO.md to reflect v0.1.9 completion with diagram improvements, connector enhancements, and code cleanup
- Mark completed: connector anchoring with smart connection site selection (horizontal/vertical flow based on relative positions), diagram centering on slides with bounding box calculation, connector labels as separate shapes at midpoint, fixed subgraph layout with separate title shape, fixed ER diagram relationship label parsing (colon syntax, quoted labels), improved text alignment (
</commit_message>
<xml_diff>
--- a/comprehensive_demo.pptx
+++ b/comprehensive_demo.pptx
@@ -2291,12 +2291,12 @@
           </a:solidFill>
         </p:spPr>
         <p:txBody>
-          <a:bodyPr wrap="square" rtlCol="0" anchor="ctr">
+          <a:bodyPr wrap="square" rtlCol="0" anchor="t">
             <a:normAutofit/>
           </a:bodyPr>
           <a:lstStyle/>
           <a:p>
-            <a:pPr algn="ctr"/>
+            <a:pPr algn="l"/>
             <a:r>
               <a:rPr lang="en-US" sz="2362" dirty="0">
                 <a:solidFill>
@@ -2329,12 +2329,12 @@
           </a:solidFill>
         </p:spPr>
         <p:txBody>
-          <a:bodyPr wrap="square" rtlCol="0" anchor="ctr">
+          <a:bodyPr wrap="square" rtlCol="0" anchor="t">
             <a:normAutofit/>
           </a:bodyPr>
           <a:lstStyle/>
           <a:p>
-            <a:pPr algn="ctr"/>
+            <a:pPr algn="l"/>
             <a:r>
               <a:rPr lang="en-US" sz="2362" dirty="0">
                 <a:solidFill>
@@ -2367,12 +2367,12 @@
           </a:solidFill>
         </p:spPr>
         <p:txBody>
-          <a:bodyPr wrap="square" rtlCol="0" anchor="ctr">
+          <a:bodyPr wrap="square" rtlCol="0" anchor="t">
             <a:normAutofit/>
           </a:bodyPr>
           <a:lstStyle/>
           <a:p>
-            <a:pPr algn="ctr"/>
+            <a:pPr algn="l"/>
             <a:r>
               <a:rPr lang="en-US" sz="2362" dirty="0">
                 <a:solidFill>
@@ -2405,12 +2405,12 @@
           </a:solidFill>
         </p:spPr>
         <p:txBody>
-          <a:bodyPr wrap="square" rtlCol="0" anchor="ctr">
+          <a:bodyPr wrap="square" rtlCol="0" anchor="t">
             <a:normAutofit/>
           </a:bodyPr>
           <a:lstStyle/>
           <a:p>
-            <a:pPr algn="ctr"/>
+            <a:pPr algn="l"/>
             <a:r>
               <a:rPr lang="en-US" sz="2362" dirty="0">
                 <a:solidFill>
@@ -3442,12 +3442,12 @@
           </a:solidFill>
         </p:spPr>
         <p:txBody>
-          <a:bodyPr wrap="square" rtlCol="0" anchor="ctr">
+          <a:bodyPr wrap="square" rtlCol="0" anchor="t">
             <a:normAutofit/>
           </a:bodyPr>
           <a:lstStyle/>
           <a:p>
-            <a:pPr algn="ctr"/>
+            <a:pPr algn="l"/>
             <a:r>
               <a:rPr lang="en-US" sz="1889" dirty="0">
                 <a:solidFill>
@@ -3480,12 +3480,12 @@
           </a:solidFill>
         </p:spPr>
         <p:txBody>
-          <a:bodyPr wrap="square" rtlCol="0" anchor="ctr">
+          <a:bodyPr wrap="square" rtlCol="0" anchor="t">
             <a:normAutofit/>
           </a:bodyPr>
           <a:lstStyle/>
           <a:p>
-            <a:pPr algn="ctr"/>
+            <a:pPr algn="l"/>
             <a:r>
               <a:rPr lang="en-US" sz="1889" dirty="0">
                 <a:solidFill>
@@ -3518,12 +3518,12 @@
           </a:solidFill>
         </p:spPr>
         <p:txBody>
-          <a:bodyPr wrap="square" rtlCol="0" anchor="ctr">
+          <a:bodyPr wrap="square" rtlCol="0" anchor="t">
             <a:normAutofit/>
           </a:bodyPr>
           <a:lstStyle/>
           <a:p>
-            <a:pPr algn="ctr"/>
+            <a:pPr algn="l"/>
             <a:r>
               <a:rPr lang="en-US" sz="1889" dirty="0">
                 <a:solidFill>
@@ -3556,12 +3556,12 @@
           </a:solidFill>
         </p:spPr>
         <p:txBody>
-          <a:bodyPr wrap="square" rtlCol="0" anchor="ctr">
+          <a:bodyPr wrap="square" rtlCol="0" anchor="t">
             <a:normAutofit/>
           </a:bodyPr>
           <a:lstStyle/>
           <a:p>
-            <a:pPr algn="ctr"/>
+            <a:pPr algn="l"/>
             <a:r>
               <a:rPr lang="en-US" sz="1889" dirty="0">
                 <a:solidFill>

</xml_diff>